<commit_message>
update: better slides template
</commit_message>
<xml_diff>
--- a/slides/2016/linux_latency_breakdown.pptx
+++ b/slides/2016/linux_latency_breakdown.pptx
@@ -2,15 +2,15 @@
 <file path=ppt/presentation.xml><?xml version="1.0" encoding="utf-8"?>
 <p:presentation xmlns:a="http://schemas.openxmlformats.org/drawingml/2006/main" xmlns:r="http://schemas.openxmlformats.org/officeDocument/2006/relationships" xmlns:p="http://schemas.openxmlformats.org/presentationml/2006/main" saveSubsetFonts="1">
   <p:sldMasterIdLst>
-    <p:sldMasterId id="2147483648" r:id="rId1"/>
+    <p:sldMasterId id="2147483739" r:id="rId1"/>
   </p:sldMasterIdLst>
   <p:sldIdLst>
     <p:sldId id="256" r:id="rId2"/>
     <p:sldId id="257" r:id="rId3"/>
     <p:sldId id="259" r:id="rId4"/>
-    <p:sldId id="278" r:id="rId5"/>
-    <p:sldId id="277" r:id="rId6"/>
-    <p:sldId id="263" r:id="rId7"/>
+    <p:sldId id="277" r:id="rId5"/>
+    <p:sldId id="263" r:id="rId6"/>
+    <p:sldId id="278" r:id="rId7"/>
     <p:sldId id="258" r:id="rId8"/>
     <p:sldId id="260" r:id="rId9"/>
     <p:sldId id="261" r:id="rId10"/>
@@ -6882,7 +6882,7 @@
             <a:alphaOff val="0"/>
           </a:schemeClr>
         </a:solidFill>
-        <a:ln w="25400" cap="flat" cmpd="sng" algn="ctr">
+        <a:ln w="26425" cap="flat" cmpd="sng" algn="ctr">
           <a:solidFill>
             <a:schemeClr val="lt1">
               <a:hueOff val="0"/>
@@ -6910,12 +6910,12 @@
         </a:fontRef>
       </dsp:style>
       <dsp:txBody>
-        <a:bodyPr spcFirstLastPara="0" vert="horz" wrap="square" lIns="17145" tIns="17145" rIns="17145" bIns="17145" numCol="1" spcCol="1270" anchor="ctr" anchorCtr="0">
+        <a:bodyPr spcFirstLastPara="0" vert="horz" wrap="square" lIns="15875" tIns="15875" rIns="15875" bIns="15875" numCol="1" spcCol="1270" anchor="ctr" anchorCtr="0">
           <a:noAutofit/>
         </a:bodyPr>
         <a:lstStyle/>
         <a:p>
-          <a:pPr lvl="0" algn="ctr" defTabSz="1200150">
+          <a:pPr lvl="0" algn="ctr" defTabSz="1111250">
             <a:lnSpc>
               <a:spcPct val="90000"/>
             </a:lnSpc>
@@ -6927,10 +6927,10 @@
             </a:spcAft>
           </a:pPr>
           <a:r>
-            <a:rPr lang="en-US" sz="2700" kern="1200" dirty="0" smtClean="0"/>
+            <a:rPr lang="en-US" sz="2500" kern="1200" dirty="0" smtClean="0"/>
             <a:t>Total Run Time</a:t>
           </a:r>
-          <a:endParaRPr lang="en-US" sz="2700" kern="1200" dirty="0"/>
+          <a:endParaRPr lang="en-US" sz="2500" kern="1200" dirty="0"/>
         </a:p>
       </dsp:txBody>
       <dsp:txXfrm>
@@ -6966,7 +6966,7 @@
           </a:pathLst>
         </a:custGeom>
         <a:noFill/>
-        <a:ln w="25400" cap="flat" cmpd="sng" algn="ctr">
+        <a:ln w="26425" cap="flat" cmpd="sng" algn="ctr">
           <a:solidFill>
             <a:schemeClr val="accent1">
               <a:shade val="60000"/>
@@ -7040,7 +7040,7 @@
             <a:alphaOff val="0"/>
           </a:schemeClr>
         </a:solidFill>
-        <a:ln w="25400" cap="flat" cmpd="sng" algn="ctr">
+        <a:ln w="26425" cap="flat" cmpd="sng" algn="ctr">
           <a:solidFill>
             <a:schemeClr val="lt1">
               <a:hueOff val="0"/>
@@ -7068,12 +7068,12 @@
         </a:fontRef>
       </dsp:style>
       <dsp:txBody>
-        <a:bodyPr spcFirstLastPara="0" vert="horz" wrap="square" lIns="17145" tIns="17145" rIns="17145" bIns="17145" numCol="1" spcCol="1270" anchor="ctr" anchorCtr="0">
+        <a:bodyPr spcFirstLastPara="0" vert="horz" wrap="square" lIns="15875" tIns="15875" rIns="15875" bIns="15875" numCol="1" spcCol="1270" anchor="ctr" anchorCtr="0">
           <a:noAutofit/>
         </a:bodyPr>
         <a:lstStyle/>
         <a:p>
-          <a:pPr lvl="0" algn="ctr" defTabSz="1200150">
+          <a:pPr lvl="0" algn="ctr" defTabSz="1111250">
             <a:lnSpc>
               <a:spcPct val="90000"/>
             </a:lnSpc>
@@ -7085,10 +7085,10 @@
             </a:spcAft>
           </a:pPr>
           <a:r>
-            <a:rPr lang="en-US" sz="2700" kern="1200" dirty="0" smtClean="0"/>
+            <a:rPr lang="en-US" sz="2500" kern="1200" dirty="0" smtClean="0"/>
             <a:t>On CPU Time</a:t>
           </a:r>
-          <a:endParaRPr lang="en-US" sz="2700" kern="1200" dirty="0"/>
+          <a:endParaRPr lang="en-US" sz="2500" kern="1200" dirty="0"/>
         </a:p>
       </dsp:txBody>
       <dsp:txXfrm>
@@ -7124,7 +7124,7 @@
           </a:pathLst>
         </a:custGeom>
         <a:noFill/>
-        <a:ln w="25400" cap="flat" cmpd="sng" algn="ctr">
+        <a:ln w="26425" cap="flat" cmpd="sng" algn="ctr">
           <a:solidFill>
             <a:schemeClr val="accent1">
               <a:shade val="60000"/>
@@ -7198,7 +7198,7 @@
             <a:alphaOff val="0"/>
           </a:schemeClr>
         </a:solidFill>
-        <a:ln w="25400" cap="flat" cmpd="sng" algn="ctr">
+        <a:ln w="26425" cap="flat" cmpd="sng" algn="ctr">
           <a:solidFill>
             <a:schemeClr val="lt1">
               <a:hueOff val="0"/>
@@ -7226,12 +7226,12 @@
         </a:fontRef>
       </dsp:style>
       <dsp:txBody>
-        <a:bodyPr spcFirstLastPara="0" vert="horz" wrap="square" lIns="17145" tIns="17145" rIns="17145" bIns="17145" numCol="1" spcCol="1270" anchor="ctr" anchorCtr="0">
+        <a:bodyPr spcFirstLastPara="0" vert="horz" wrap="square" lIns="15875" tIns="15875" rIns="15875" bIns="15875" numCol="1" spcCol="1270" anchor="ctr" anchorCtr="0">
           <a:noAutofit/>
         </a:bodyPr>
         <a:lstStyle/>
         <a:p>
-          <a:pPr lvl="0" algn="ctr" defTabSz="1200150">
+          <a:pPr lvl="0" algn="ctr" defTabSz="1111250">
             <a:lnSpc>
               <a:spcPct val="90000"/>
             </a:lnSpc>
@@ -7243,10 +7243,10 @@
             </a:spcAft>
           </a:pPr>
           <a:r>
-            <a:rPr lang="en-US" sz="2700" kern="1200" dirty="0" smtClean="0"/>
+            <a:rPr lang="en-US" sz="2500" kern="1200" dirty="0" smtClean="0"/>
             <a:t>On Run Queue Time</a:t>
           </a:r>
-          <a:endParaRPr lang="en-US" sz="2700" kern="1200" dirty="0"/>
+          <a:endParaRPr lang="en-US" sz="2500" kern="1200" dirty="0"/>
         </a:p>
       </dsp:txBody>
       <dsp:txXfrm>
@@ -7282,7 +7282,7 @@
           </a:pathLst>
         </a:custGeom>
         <a:noFill/>
-        <a:ln w="25400" cap="flat" cmpd="sng" algn="ctr">
+        <a:ln w="26425" cap="flat" cmpd="sng" algn="ctr">
           <a:solidFill>
             <a:schemeClr val="accent1">
               <a:shade val="60000"/>
@@ -7356,7 +7356,7 @@
             <a:alphaOff val="0"/>
           </a:schemeClr>
         </a:solidFill>
-        <a:ln w="25400" cap="flat" cmpd="sng" algn="ctr">
+        <a:ln w="26425" cap="flat" cmpd="sng" algn="ctr">
           <a:solidFill>
             <a:schemeClr val="lt1">
               <a:hueOff val="0"/>
@@ -7384,12 +7384,12 @@
         </a:fontRef>
       </dsp:style>
       <dsp:txBody>
-        <a:bodyPr spcFirstLastPara="0" vert="horz" wrap="square" lIns="17145" tIns="17145" rIns="17145" bIns="17145" numCol="1" spcCol="1270" anchor="ctr" anchorCtr="0">
+        <a:bodyPr spcFirstLastPara="0" vert="horz" wrap="square" lIns="15875" tIns="15875" rIns="15875" bIns="15875" numCol="1" spcCol="1270" anchor="ctr" anchorCtr="0">
           <a:noAutofit/>
         </a:bodyPr>
         <a:lstStyle/>
         <a:p>
-          <a:pPr lvl="0" algn="ctr" defTabSz="1200150">
+          <a:pPr lvl="0" algn="ctr" defTabSz="1111250">
             <a:lnSpc>
               <a:spcPct val="90000"/>
             </a:lnSpc>
@@ -7401,10 +7401,10 @@
             </a:spcAft>
           </a:pPr>
           <a:r>
-            <a:rPr lang="en-US" sz="2700" kern="1200" dirty="0" smtClean="0"/>
+            <a:rPr lang="en-US" sz="2500" kern="1200" dirty="0" smtClean="0"/>
             <a:t>Sleep Time</a:t>
           </a:r>
-          <a:endParaRPr lang="en-US" sz="2700" kern="1200" dirty="0"/>
+          <a:endParaRPr lang="en-US" sz="2500" kern="1200" dirty="0"/>
         </a:p>
       </dsp:txBody>
       <dsp:txXfrm>
@@ -7440,7 +7440,7 @@
           </a:pathLst>
         </a:custGeom>
         <a:noFill/>
-        <a:ln w="25400" cap="flat" cmpd="sng" algn="ctr">
+        <a:ln w="26425" cap="flat" cmpd="sng" algn="ctr">
           <a:solidFill>
             <a:schemeClr val="accent1">
               <a:shade val="80000"/>
@@ -7514,7 +7514,7 @@
             <a:alphaOff val="0"/>
           </a:schemeClr>
         </a:solidFill>
-        <a:ln w="25400" cap="flat" cmpd="sng" algn="ctr">
+        <a:ln w="26425" cap="flat" cmpd="sng" algn="ctr">
           <a:solidFill>
             <a:schemeClr val="lt1">
               <a:hueOff val="0"/>
@@ -7542,12 +7542,12 @@
         </a:fontRef>
       </dsp:style>
       <dsp:txBody>
-        <a:bodyPr spcFirstLastPara="0" vert="horz" wrap="square" lIns="17145" tIns="17145" rIns="17145" bIns="17145" numCol="1" spcCol="1270" anchor="ctr" anchorCtr="0">
+        <a:bodyPr spcFirstLastPara="0" vert="horz" wrap="square" lIns="15875" tIns="15875" rIns="15875" bIns="15875" numCol="1" spcCol="1270" anchor="ctr" anchorCtr="0">
           <a:noAutofit/>
         </a:bodyPr>
         <a:lstStyle/>
         <a:p>
-          <a:pPr lvl="0" algn="ctr" defTabSz="1200150">
+          <a:pPr lvl="0" algn="ctr" defTabSz="1111250">
             <a:lnSpc>
               <a:spcPct val="90000"/>
             </a:lnSpc>
@@ -7559,18 +7559,18 @@
             </a:spcAft>
           </a:pPr>
           <a:r>
-            <a:rPr lang="en-US" altLang="zh-CN" sz="2700" kern="1200" smtClean="0"/>
+            <a:rPr lang="en-US" altLang="zh-CN" sz="2500" kern="1200" smtClean="0"/>
             <a:t>Block</a:t>
           </a:r>
           <a:r>
-            <a:rPr lang="zh-CN" altLang="en-US" sz="2700" kern="1200" smtClean="0"/>
+            <a:rPr lang="zh-CN" altLang="en-US" sz="2500" kern="1200" smtClean="0"/>
             <a:t> </a:t>
           </a:r>
           <a:r>
-            <a:rPr lang="en-US" altLang="zh-CN" sz="2700" kern="1200" smtClean="0"/>
+            <a:rPr lang="en-US" altLang="zh-CN" sz="2500" kern="1200" smtClean="0"/>
             <a:t>Time</a:t>
           </a:r>
-          <a:endParaRPr lang="en-US" sz="2700" kern="1200" dirty="0"/>
+          <a:endParaRPr lang="en-US" sz="2500" kern="1200" dirty="0"/>
         </a:p>
       </dsp:txBody>
       <dsp:txXfrm>
@@ -7606,7 +7606,7 @@
           </a:pathLst>
         </a:custGeom>
         <a:noFill/>
-        <a:ln w="25400" cap="flat" cmpd="sng" algn="ctr">
+        <a:ln w="26425" cap="flat" cmpd="sng" algn="ctr">
           <a:solidFill>
             <a:schemeClr val="accent1">
               <a:shade val="80000"/>
@@ -7680,7 +7680,7 @@
             <a:alphaOff val="0"/>
           </a:schemeClr>
         </a:solidFill>
-        <a:ln w="25400" cap="flat" cmpd="sng" algn="ctr">
+        <a:ln w="26425" cap="flat" cmpd="sng" algn="ctr">
           <a:solidFill>
             <a:schemeClr val="lt1">
               <a:hueOff val="0"/>
@@ -7708,12 +7708,12 @@
         </a:fontRef>
       </dsp:style>
       <dsp:txBody>
-        <a:bodyPr spcFirstLastPara="0" vert="horz" wrap="square" lIns="17145" tIns="17145" rIns="17145" bIns="17145" numCol="1" spcCol="1270" anchor="ctr" anchorCtr="0">
+        <a:bodyPr spcFirstLastPara="0" vert="horz" wrap="square" lIns="15875" tIns="15875" rIns="15875" bIns="15875" numCol="1" spcCol="1270" anchor="ctr" anchorCtr="0">
           <a:noAutofit/>
         </a:bodyPr>
         <a:lstStyle/>
         <a:p>
-          <a:pPr lvl="0" algn="ctr" defTabSz="1200150">
+          <a:pPr lvl="0" algn="ctr" defTabSz="1111250">
             <a:lnSpc>
               <a:spcPct val="90000"/>
             </a:lnSpc>
@@ -7725,18 +7725,18 @@
             </a:spcAft>
           </a:pPr>
           <a:r>
-            <a:rPr lang="en-US" altLang="zh-CN" sz="2700" kern="1200" dirty="0" smtClean="0"/>
+            <a:rPr lang="en-US" altLang="zh-CN" sz="2500" kern="1200" dirty="0" smtClean="0"/>
             <a:t>Sleep</a:t>
           </a:r>
           <a:r>
-            <a:rPr lang="zh-CN" altLang="en-US" sz="2700" kern="1200" dirty="0" smtClean="0"/>
+            <a:rPr lang="zh-CN" altLang="en-US" sz="2500" kern="1200" dirty="0" smtClean="0"/>
             <a:t> </a:t>
           </a:r>
           <a:r>
-            <a:rPr lang="en-US" altLang="zh-CN" sz="2700" kern="1200" dirty="0" smtClean="0"/>
+            <a:rPr lang="en-US" altLang="zh-CN" sz="2500" kern="1200" dirty="0" smtClean="0"/>
             <a:t>Time</a:t>
           </a:r>
-          <a:endParaRPr lang="en-US" sz="2700" kern="1200" dirty="0"/>
+          <a:endParaRPr lang="en-US" sz="2500" kern="1200" dirty="0"/>
         </a:p>
       </dsp:txBody>
       <dsp:txXfrm>
@@ -7779,7 +7779,7 @@
             <a:alphaOff val="0"/>
           </a:schemeClr>
         </a:solidFill>
-        <a:ln w="25400" cap="flat" cmpd="sng" algn="ctr">
+        <a:ln w="26425" cap="flat" cmpd="sng" algn="ctr">
           <a:solidFill>
             <a:schemeClr val="lt1">
               <a:hueOff val="0"/>
@@ -7807,12 +7807,12 @@
         </a:fontRef>
       </dsp:style>
       <dsp:txBody>
-        <a:bodyPr spcFirstLastPara="0" vert="horz" wrap="square" lIns="11430" tIns="11430" rIns="11430" bIns="11430" numCol="1" spcCol="1270" anchor="ctr" anchorCtr="0">
+        <a:bodyPr spcFirstLastPara="0" vert="horz" wrap="square" lIns="10795" tIns="10795" rIns="10795" bIns="10795" numCol="1" spcCol="1270" anchor="ctr" anchorCtr="0">
           <a:noAutofit/>
         </a:bodyPr>
         <a:lstStyle/>
         <a:p>
-          <a:pPr lvl="0" algn="ctr" defTabSz="800100">
+          <a:pPr lvl="0" algn="ctr" defTabSz="755650">
             <a:lnSpc>
               <a:spcPct val="90000"/>
             </a:lnSpc>
@@ -7824,10 +7824,10 @@
             </a:spcAft>
           </a:pPr>
           <a:r>
-            <a:rPr lang="en-US" sz="1800" kern="1200" dirty="0" smtClean="0"/>
+            <a:rPr lang="en-US" sz="1700" kern="1200" dirty="0" smtClean="0"/>
             <a:t>On CPU Time</a:t>
           </a:r>
-          <a:endParaRPr lang="en-US" sz="1800" kern="1200" dirty="0"/>
+          <a:endParaRPr lang="en-US" sz="1700" kern="1200" dirty="0"/>
         </a:p>
       </dsp:txBody>
       <dsp:txXfrm>
@@ -7863,7 +7863,7 @@
           </a:pathLst>
         </a:custGeom>
         <a:noFill/>
-        <a:ln w="25400" cap="flat" cmpd="sng" algn="ctr">
+        <a:ln w="26425" cap="flat" cmpd="sng" algn="ctr">
           <a:solidFill>
             <a:schemeClr val="accent1">
               <a:shade val="60000"/>
@@ -7937,7 +7937,7 @@
             <a:alphaOff val="0"/>
           </a:schemeClr>
         </a:solidFill>
-        <a:ln w="25400" cap="flat" cmpd="sng" algn="ctr">
+        <a:ln w="26425" cap="flat" cmpd="sng" algn="ctr">
           <a:solidFill>
             <a:schemeClr val="lt1">
               <a:hueOff val="0"/>
@@ -7965,12 +7965,12 @@
         </a:fontRef>
       </dsp:style>
       <dsp:txBody>
-        <a:bodyPr spcFirstLastPara="0" vert="horz" wrap="square" lIns="11430" tIns="11430" rIns="11430" bIns="11430" numCol="1" spcCol="1270" anchor="ctr" anchorCtr="0">
+        <a:bodyPr spcFirstLastPara="0" vert="horz" wrap="square" lIns="10795" tIns="10795" rIns="10795" bIns="10795" numCol="1" spcCol="1270" anchor="ctr" anchorCtr="0">
           <a:noAutofit/>
         </a:bodyPr>
         <a:lstStyle/>
         <a:p>
-          <a:pPr lvl="0" algn="ctr" defTabSz="800100">
+          <a:pPr lvl="0" algn="ctr" defTabSz="755650">
             <a:lnSpc>
               <a:spcPct val="90000"/>
             </a:lnSpc>
@@ -7982,10 +7982,10 @@
             </a:spcAft>
           </a:pPr>
           <a:r>
-            <a:rPr lang="en-US" sz="1800" kern="1200" dirty="0" smtClean="0"/>
+            <a:rPr lang="en-US" sz="1700" kern="1200" dirty="0" smtClean="0"/>
             <a:t>User</a:t>
           </a:r>
-          <a:endParaRPr lang="en-US" sz="1800" kern="1200" dirty="0"/>
+          <a:endParaRPr lang="en-US" sz="1700" kern="1200" dirty="0"/>
         </a:p>
       </dsp:txBody>
       <dsp:txXfrm>
@@ -8021,7 +8021,7 @@
           </a:pathLst>
         </a:custGeom>
         <a:noFill/>
-        <a:ln w="25400" cap="flat" cmpd="sng" algn="ctr">
+        <a:ln w="26425" cap="flat" cmpd="sng" algn="ctr">
           <a:solidFill>
             <a:schemeClr val="accent1">
               <a:shade val="80000"/>
@@ -8092,7 +8092,7 @@
             <a:lumMod val="75000"/>
           </a:schemeClr>
         </a:solidFill>
-        <a:ln w="25400" cap="flat" cmpd="sng" algn="ctr">
+        <a:ln w="26425" cap="flat" cmpd="sng" algn="ctr">
           <a:solidFill>
             <a:schemeClr val="lt1">
               <a:hueOff val="0"/>
@@ -8120,12 +8120,12 @@
         </a:fontRef>
       </dsp:style>
       <dsp:txBody>
-        <a:bodyPr spcFirstLastPara="0" vert="horz" wrap="square" lIns="11430" tIns="11430" rIns="11430" bIns="11430" numCol="1" spcCol="1270" anchor="ctr" anchorCtr="0">
+        <a:bodyPr spcFirstLastPara="0" vert="horz" wrap="square" lIns="10795" tIns="10795" rIns="10795" bIns="10795" numCol="1" spcCol="1270" anchor="ctr" anchorCtr="0">
           <a:noAutofit/>
         </a:bodyPr>
         <a:lstStyle/>
         <a:p>
-          <a:pPr lvl="0" algn="ctr" defTabSz="800100">
+          <a:pPr lvl="0" algn="ctr" defTabSz="755650">
             <a:lnSpc>
               <a:spcPct val="90000"/>
             </a:lnSpc>
@@ -8137,10 +8137,10 @@
             </a:spcAft>
           </a:pPr>
           <a:r>
-            <a:rPr lang="en-US" sz="1800" kern="1200" dirty="0" smtClean="0"/>
+            <a:rPr lang="en-US" sz="1700" kern="1200" dirty="0" smtClean="0"/>
             <a:t>Logical Loop</a:t>
           </a:r>
-          <a:endParaRPr lang="en-US" sz="1800" kern="1200" dirty="0"/>
+          <a:endParaRPr lang="en-US" sz="1700" kern="1200" dirty="0"/>
         </a:p>
       </dsp:txBody>
       <dsp:txXfrm>
@@ -8176,7 +8176,7 @@
           </a:pathLst>
         </a:custGeom>
         <a:noFill/>
-        <a:ln w="25400" cap="flat" cmpd="sng" algn="ctr">
+        <a:ln w="26425" cap="flat" cmpd="sng" algn="ctr">
           <a:solidFill>
             <a:schemeClr val="accent1">
               <a:shade val="80000"/>
@@ -8247,7 +8247,7 @@
             <a:lumMod val="75000"/>
           </a:schemeClr>
         </a:solidFill>
-        <a:ln w="25400" cap="flat" cmpd="sng" algn="ctr">
+        <a:ln w="26425" cap="flat" cmpd="sng" algn="ctr">
           <a:solidFill>
             <a:schemeClr val="lt1">
               <a:hueOff val="0"/>
@@ -8275,12 +8275,12 @@
         </a:fontRef>
       </dsp:style>
       <dsp:txBody>
-        <a:bodyPr spcFirstLastPara="0" vert="horz" wrap="square" lIns="11430" tIns="11430" rIns="11430" bIns="11430" numCol="1" spcCol="1270" anchor="ctr" anchorCtr="0">
+        <a:bodyPr spcFirstLastPara="0" vert="horz" wrap="square" lIns="10795" tIns="10795" rIns="10795" bIns="10795" numCol="1" spcCol="1270" anchor="ctr" anchorCtr="0">
           <a:noAutofit/>
         </a:bodyPr>
         <a:lstStyle/>
         <a:p>
-          <a:pPr lvl="0" algn="ctr" defTabSz="800100">
+          <a:pPr lvl="0" algn="ctr" defTabSz="755650">
             <a:lnSpc>
               <a:spcPct val="90000"/>
             </a:lnSpc>
@@ -8292,10 +8292,10 @@
             </a:spcAft>
           </a:pPr>
           <a:r>
-            <a:rPr lang="en-US" sz="1800" kern="1200" dirty="0" smtClean="0"/>
+            <a:rPr lang="en-US" sz="1700" kern="1200" dirty="0" smtClean="0"/>
             <a:t>Spin Lock Contention</a:t>
           </a:r>
-          <a:endParaRPr lang="en-US" sz="1800" kern="1200" dirty="0"/>
+          <a:endParaRPr lang="en-US" sz="1700" kern="1200" dirty="0"/>
         </a:p>
       </dsp:txBody>
       <dsp:txXfrm>
@@ -8331,7 +8331,7 @@
           </a:pathLst>
         </a:custGeom>
         <a:noFill/>
-        <a:ln w="25400" cap="flat" cmpd="sng" algn="ctr">
+        <a:ln w="26425" cap="flat" cmpd="sng" algn="ctr">
           <a:solidFill>
             <a:schemeClr val="accent1">
               <a:shade val="60000"/>
@@ -8405,7 +8405,7 @@
             <a:alphaOff val="0"/>
           </a:schemeClr>
         </a:solidFill>
-        <a:ln w="25400" cap="flat" cmpd="sng" algn="ctr">
+        <a:ln w="26425" cap="flat" cmpd="sng" algn="ctr">
           <a:solidFill>
             <a:schemeClr val="lt1">
               <a:hueOff val="0"/>
@@ -8433,12 +8433,12 @@
         </a:fontRef>
       </dsp:style>
       <dsp:txBody>
-        <a:bodyPr spcFirstLastPara="0" vert="horz" wrap="square" lIns="11430" tIns="11430" rIns="11430" bIns="11430" numCol="1" spcCol="1270" anchor="ctr" anchorCtr="0">
+        <a:bodyPr spcFirstLastPara="0" vert="horz" wrap="square" lIns="10795" tIns="10795" rIns="10795" bIns="10795" numCol="1" spcCol="1270" anchor="ctr" anchorCtr="0">
           <a:noAutofit/>
         </a:bodyPr>
         <a:lstStyle/>
         <a:p>
-          <a:pPr lvl="0" algn="ctr" defTabSz="800100">
+          <a:pPr lvl="0" algn="ctr" defTabSz="755650">
             <a:lnSpc>
               <a:spcPct val="90000"/>
             </a:lnSpc>
@@ -8450,10 +8450,10 @@
             </a:spcAft>
           </a:pPr>
           <a:r>
-            <a:rPr lang="en-US" sz="1800" kern="1200" dirty="0" smtClean="0"/>
+            <a:rPr lang="en-US" sz="1700" kern="1200" dirty="0" smtClean="0"/>
             <a:t>Kernel</a:t>
           </a:r>
-          <a:endParaRPr lang="en-US" sz="1800" kern="1200" dirty="0"/>
+          <a:endParaRPr lang="en-US" sz="1700" kern="1200" dirty="0"/>
         </a:p>
       </dsp:txBody>
       <dsp:txXfrm>
@@ -8489,7 +8489,7 @@
           </a:pathLst>
         </a:custGeom>
         <a:noFill/>
-        <a:ln w="25400" cap="flat" cmpd="sng" algn="ctr">
+        <a:ln w="26425" cap="flat" cmpd="sng" algn="ctr">
           <a:solidFill>
             <a:schemeClr val="accent1">
               <a:shade val="80000"/>
@@ -8560,7 +8560,7 @@
             <a:lumMod val="75000"/>
           </a:schemeClr>
         </a:solidFill>
-        <a:ln w="25400" cap="flat" cmpd="sng" algn="ctr">
+        <a:ln w="26425" cap="flat" cmpd="sng" algn="ctr">
           <a:solidFill>
             <a:schemeClr val="lt1">
               <a:hueOff val="0"/>
@@ -8588,12 +8588,12 @@
         </a:fontRef>
       </dsp:style>
       <dsp:txBody>
-        <a:bodyPr spcFirstLastPara="0" vert="horz" wrap="square" lIns="11430" tIns="11430" rIns="11430" bIns="11430" numCol="1" spcCol="1270" anchor="ctr" anchorCtr="0">
+        <a:bodyPr spcFirstLastPara="0" vert="horz" wrap="square" lIns="10795" tIns="10795" rIns="10795" bIns="10795" numCol="1" spcCol="1270" anchor="ctr" anchorCtr="0">
           <a:noAutofit/>
         </a:bodyPr>
         <a:lstStyle/>
         <a:p>
-          <a:pPr lvl="0" algn="ctr" defTabSz="800100">
+          <a:pPr lvl="0" algn="ctr" defTabSz="755650">
             <a:lnSpc>
               <a:spcPct val="90000"/>
             </a:lnSpc>
@@ -8605,10 +8605,10 @@
             </a:spcAft>
           </a:pPr>
           <a:r>
-            <a:rPr lang="en-US" sz="1800" kern="1200" dirty="0" smtClean="0"/>
+            <a:rPr lang="en-US" sz="1700" kern="1200" dirty="0" smtClean="0"/>
             <a:t>Logical Loop</a:t>
           </a:r>
-          <a:endParaRPr lang="en-US" sz="1800" kern="1200" dirty="0"/>
+          <a:endParaRPr lang="en-US" sz="1700" kern="1200" dirty="0"/>
         </a:p>
       </dsp:txBody>
       <dsp:txXfrm>
@@ -8644,7 +8644,7 @@
           </a:pathLst>
         </a:custGeom>
         <a:noFill/>
-        <a:ln w="25400" cap="flat" cmpd="sng" algn="ctr">
+        <a:ln w="26425" cap="flat" cmpd="sng" algn="ctr">
           <a:solidFill>
             <a:schemeClr val="accent1">
               <a:shade val="80000"/>
@@ -8715,7 +8715,7 @@
             <a:lumMod val="75000"/>
           </a:schemeClr>
         </a:solidFill>
-        <a:ln w="25400" cap="flat" cmpd="sng" algn="ctr">
+        <a:ln w="26425" cap="flat" cmpd="sng" algn="ctr">
           <a:solidFill>
             <a:schemeClr val="lt1">
               <a:hueOff val="0"/>
@@ -8743,12 +8743,12 @@
         </a:fontRef>
       </dsp:style>
       <dsp:txBody>
-        <a:bodyPr spcFirstLastPara="0" vert="horz" wrap="square" lIns="11430" tIns="11430" rIns="11430" bIns="11430" numCol="1" spcCol="1270" anchor="ctr" anchorCtr="0">
+        <a:bodyPr spcFirstLastPara="0" vert="horz" wrap="square" lIns="10795" tIns="10795" rIns="10795" bIns="10795" numCol="1" spcCol="1270" anchor="ctr" anchorCtr="0">
           <a:noAutofit/>
         </a:bodyPr>
         <a:lstStyle/>
         <a:p>
-          <a:pPr lvl="0" algn="ctr" defTabSz="800100">
+          <a:pPr lvl="0" algn="ctr" defTabSz="755650">
             <a:lnSpc>
               <a:spcPct val="90000"/>
             </a:lnSpc>
@@ -8760,10 +8760,10 @@
             </a:spcAft>
           </a:pPr>
           <a:r>
-            <a:rPr lang="en-US" sz="1800" kern="1200" dirty="0" smtClean="0"/>
+            <a:rPr lang="en-US" sz="1700" kern="1200" dirty="0" smtClean="0"/>
             <a:t>Spin Lock Contention</a:t>
           </a:r>
-          <a:endParaRPr lang="en-US" sz="1800" kern="1200" dirty="0"/>
+          <a:endParaRPr lang="en-US" sz="1700" kern="1200" dirty="0"/>
         </a:p>
       </dsp:txBody>
       <dsp:txXfrm>
@@ -8799,7 +8799,7 @@
           </a:pathLst>
         </a:custGeom>
         <a:noFill/>
-        <a:ln w="25400" cap="flat" cmpd="sng" algn="ctr">
+        <a:ln w="26425" cap="flat" cmpd="sng" algn="ctr">
           <a:solidFill>
             <a:schemeClr val="accent1">
               <a:shade val="60000"/>
@@ -8873,7 +8873,7 @@
             <a:alphaOff val="0"/>
           </a:schemeClr>
         </a:solidFill>
-        <a:ln w="25400" cap="flat" cmpd="sng" algn="ctr">
+        <a:ln w="26425" cap="flat" cmpd="sng" algn="ctr">
           <a:solidFill>
             <a:schemeClr val="lt1">
               <a:hueOff val="0"/>
@@ -8901,12 +8901,12 @@
         </a:fontRef>
       </dsp:style>
       <dsp:txBody>
-        <a:bodyPr spcFirstLastPara="0" vert="horz" wrap="square" lIns="11430" tIns="11430" rIns="11430" bIns="11430" numCol="1" spcCol="1270" anchor="ctr" anchorCtr="0">
+        <a:bodyPr spcFirstLastPara="0" vert="horz" wrap="square" lIns="10795" tIns="10795" rIns="10795" bIns="10795" numCol="1" spcCol="1270" anchor="ctr" anchorCtr="0">
           <a:noAutofit/>
         </a:bodyPr>
         <a:lstStyle/>
         <a:p>
-          <a:pPr lvl="0" algn="ctr" defTabSz="800100">
+          <a:pPr lvl="0" algn="ctr" defTabSz="755650">
             <a:lnSpc>
               <a:spcPct val="90000"/>
             </a:lnSpc>
@@ -8918,10 +8918,10 @@
             </a:spcAft>
           </a:pPr>
           <a:r>
-            <a:rPr lang="en-US" sz="1800" kern="1200" dirty="0" smtClean="0"/>
+            <a:rPr lang="en-US" sz="1700" kern="1200" dirty="0" smtClean="0"/>
             <a:t>IRQ</a:t>
           </a:r>
-          <a:endParaRPr lang="en-US" sz="1800" kern="1200" dirty="0"/>
+          <a:endParaRPr lang="en-US" sz="1700" kern="1200" dirty="0"/>
         </a:p>
       </dsp:txBody>
       <dsp:txXfrm>
@@ -8957,7 +8957,7 @@
           </a:pathLst>
         </a:custGeom>
         <a:noFill/>
-        <a:ln w="25400" cap="flat" cmpd="sng" algn="ctr">
+        <a:ln w="26425" cap="flat" cmpd="sng" algn="ctr">
           <a:solidFill>
             <a:schemeClr val="accent1">
               <a:shade val="80000"/>
@@ -9028,7 +9028,7 @@
             <a:lumMod val="75000"/>
           </a:schemeClr>
         </a:solidFill>
-        <a:ln w="25400" cap="flat" cmpd="sng" algn="ctr">
+        <a:ln w="26425" cap="flat" cmpd="sng" algn="ctr">
           <a:solidFill>
             <a:schemeClr val="lt1">
               <a:hueOff val="0"/>
@@ -9056,12 +9056,12 @@
         </a:fontRef>
       </dsp:style>
       <dsp:txBody>
-        <a:bodyPr spcFirstLastPara="0" vert="horz" wrap="square" lIns="11430" tIns="11430" rIns="11430" bIns="11430" numCol="1" spcCol="1270" anchor="ctr" anchorCtr="0">
+        <a:bodyPr spcFirstLastPara="0" vert="horz" wrap="square" lIns="10795" tIns="10795" rIns="10795" bIns="10795" numCol="1" spcCol="1270" anchor="ctr" anchorCtr="0">
           <a:noAutofit/>
         </a:bodyPr>
         <a:lstStyle/>
         <a:p>
-          <a:pPr lvl="0" algn="ctr" defTabSz="800100">
+          <a:pPr lvl="0" algn="ctr" defTabSz="755650">
             <a:lnSpc>
               <a:spcPct val="90000"/>
             </a:lnSpc>
@@ -9073,10 +9073,10 @@
             </a:spcAft>
           </a:pPr>
           <a:r>
-            <a:rPr lang="en-US" sz="1800" kern="1200" dirty="0" smtClean="0"/>
+            <a:rPr lang="en-US" sz="1700" kern="1200" dirty="0" smtClean="0"/>
             <a:t>IRQ Balance</a:t>
           </a:r>
-          <a:endParaRPr lang="en-US" sz="1800" kern="1200" dirty="0"/>
+          <a:endParaRPr lang="en-US" sz="1700" kern="1200" dirty="0"/>
         </a:p>
       </dsp:txBody>
       <dsp:txXfrm>
@@ -9112,7 +9112,7 @@
           </a:pathLst>
         </a:custGeom>
         <a:noFill/>
-        <a:ln w="25400" cap="flat" cmpd="sng" algn="ctr">
+        <a:ln w="26425" cap="flat" cmpd="sng" algn="ctr">
           <a:solidFill>
             <a:schemeClr val="accent1">
               <a:shade val="80000"/>
@@ -9183,7 +9183,7 @@
             <a:lumMod val="75000"/>
           </a:schemeClr>
         </a:solidFill>
-        <a:ln w="25400" cap="flat" cmpd="sng" algn="ctr">
+        <a:ln w="26425" cap="flat" cmpd="sng" algn="ctr">
           <a:solidFill>
             <a:schemeClr val="lt1">
               <a:hueOff val="0"/>
@@ -9211,12 +9211,12 @@
         </a:fontRef>
       </dsp:style>
       <dsp:txBody>
-        <a:bodyPr spcFirstLastPara="0" vert="horz" wrap="square" lIns="11430" tIns="11430" rIns="11430" bIns="11430" numCol="1" spcCol="1270" anchor="ctr" anchorCtr="0">
+        <a:bodyPr spcFirstLastPara="0" vert="horz" wrap="square" lIns="10795" tIns="10795" rIns="10795" bIns="10795" numCol="1" spcCol="1270" anchor="ctr" anchorCtr="0">
           <a:noAutofit/>
         </a:bodyPr>
         <a:lstStyle/>
         <a:p>
-          <a:pPr lvl="0" algn="ctr" defTabSz="800100">
+          <a:pPr lvl="0" algn="ctr" defTabSz="755650">
             <a:lnSpc>
               <a:spcPct val="90000"/>
             </a:lnSpc>
@@ -9228,10 +9228,10 @@
             </a:spcAft>
           </a:pPr>
           <a:r>
-            <a:rPr lang="en-US" sz="1800" kern="1200" dirty="0" smtClean="0"/>
+            <a:rPr lang="en-US" sz="1700" kern="1200" dirty="0" smtClean="0"/>
             <a:t>IRQ Loop</a:t>
           </a:r>
-          <a:endParaRPr lang="en-US" sz="1800" kern="1200" dirty="0"/>
+          <a:endParaRPr lang="en-US" sz="1700" kern="1200" dirty="0"/>
         </a:p>
       </dsp:txBody>
       <dsp:txXfrm>
@@ -9267,7 +9267,7 @@
           </a:pathLst>
         </a:custGeom>
         <a:noFill/>
-        <a:ln w="25400" cap="flat" cmpd="sng" algn="ctr">
+        <a:ln w="26425" cap="flat" cmpd="sng" algn="ctr">
           <a:solidFill>
             <a:schemeClr val="accent1">
               <a:shade val="80000"/>
@@ -9338,7 +9338,7 @@
             <a:lumMod val="75000"/>
           </a:schemeClr>
         </a:solidFill>
-        <a:ln w="25400" cap="flat" cmpd="sng" algn="ctr">
+        <a:ln w="26425" cap="flat" cmpd="sng" algn="ctr">
           <a:solidFill>
             <a:schemeClr val="lt1">
               <a:hueOff val="0"/>
@@ -9366,12 +9366,12 @@
         </a:fontRef>
       </dsp:style>
       <dsp:txBody>
-        <a:bodyPr spcFirstLastPara="0" vert="horz" wrap="square" lIns="11430" tIns="11430" rIns="11430" bIns="11430" numCol="1" spcCol="1270" anchor="ctr" anchorCtr="0">
+        <a:bodyPr spcFirstLastPara="0" vert="horz" wrap="square" lIns="10795" tIns="10795" rIns="10795" bIns="10795" numCol="1" spcCol="1270" anchor="ctr" anchorCtr="0">
           <a:noAutofit/>
         </a:bodyPr>
         <a:lstStyle/>
         <a:p>
-          <a:pPr lvl="0" algn="ctr" defTabSz="800100">
+          <a:pPr lvl="0" algn="ctr" defTabSz="755650">
             <a:lnSpc>
               <a:spcPct val="90000"/>
             </a:lnSpc>
@@ -9383,26 +9383,26 @@
             </a:spcAft>
           </a:pPr>
           <a:r>
-            <a:rPr lang="en-US" altLang="zh-CN" sz="1800" kern="1200" dirty="0" smtClean="0"/>
+            <a:rPr lang="en-US" altLang="zh-CN" sz="1700" kern="1200" dirty="0" smtClean="0"/>
             <a:t>Long</a:t>
           </a:r>
           <a:r>
-            <a:rPr lang="zh-CN" altLang="en-US" sz="1800" kern="1200" dirty="0" smtClean="0"/>
+            <a:rPr lang="zh-CN" altLang="en-US" sz="1700" kern="1200" dirty="0" smtClean="0"/>
             <a:t> </a:t>
           </a:r>
           <a:r>
-            <a:rPr lang="en-US" altLang="zh-CN" sz="1800" kern="1200" dirty="0" smtClean="0"/>
+            <a:rPr lang="en-US" altLang="zh-CN" sz="1700" kern="1200" dirty="0" smtClean="0"/>
             <a:t>IRQ</a:t>
           </a:r>
           <a:r>
-            <a:rPr lang="zh-CN" altLang="en-US" sz="1800" kern="1200" dirty="0" smtClean="0"/>
+            <a:rPr lang="zh-CN" altLang="en-US" sz="1700" kern="1200" dirty="0" smtClean="0"/>
             <a:t> </a:t>
           </a:r>
           <a:r>
-            <a:rPr lang="en-US" altLang="zh-CN" sz="1800" kern="1200" dirty="0" smtClean="0"/>
+            <a:rPr lang="en-US" altLang="zh-CN" sz="1700" kern="1200" dirty="0" smtClean="0"/>
             <a:t>Off</a:t>
           </a:r>
-          <a:endParaRPr lang="en-US" sz="1800" kern="1200" dirty="0"/>
+          <a:endParaRPr lang="en-US" sz="1700" kern="1200" dirty="0"/>
         </a:p>
       </dsp:txBody>
       <dsp:txXfrm>
@@ -9445,7 +9445,7 @@
             <a:alphaOff val="0"/>
           </a:schemeClr>
         </a:solidFill>
-        <a:ln w="25400" cap="flat" cmpd="sng" algn="ctr">
+        <a:ln w="26425" cap="flat" cmpd="sng" algn="ctr">
           <a:solidFill>
             <a:schemeClr val="lt1">
               <a:hueOff val="0"/>
@@ -9529,7 +9529,7 @@
           </a:pathLst>
         </a:custGeom>
         <a:noFill/>
-        <a:ln w="25400" cap="flat" cmpd="sng" algn="ctr">
+        <a:ln w="26425" cap="flat" cmpd="sng" algn="ctr">
           <a:solidFill>
             <a:schemeClr val="accent1">
               <a:shade val="60000"/>
@@ -9603,7 +9603,7 @@
             <a:alphaOff val="0"/>
           </a:schemeClr>
         </a:solidFill>
-        <a:ln w="25400" cap="flat" cmpd="sng" algn="ctr">
+        <a:ln w="26425" cap="flat" cmpd="sng" algn="ctr">
           <a:solidFill>
             <a:schemeClr val="lt1">
               <a:hueOff val="0"/>
@@ -9631,12 +9631,12 @@
         </a:fontRef>
       </dsp:style>
       <dsp:txBody>
-        <a:bodyPr spcFirstLastPara="0" vert="horz" wrap="square" lIns="10795" tIns="10795" rIns="10795" bIns="10795" numCol="1" spcCol="1270" anchor="ctr" anchorCtr="0">
+        <a:bodyPr spcFirstLastPara="0" vert="horz" wrap="square" lIns="10160" tIns="10160" rIns="10160" bIns="10160" numCol="1" spcCol="1270" anchor="ctr" anchorCtr="0">
           <a:noAutofit/>
         </a:bodyPr>
         <a:lstStyle/>
         <a:p>
-          <a:pPr lvl="0" algn="ctr" defTabSz="755650">
+          <a:pPr lvl="0" algn="ctr" defTabSz="711200">
             <a:lnSpc>
               <a:spcPct val="90000"/>
             </a:lnSpc>
@@ -9648,10 +9648,10 @@
             </a:spcAft>
           </a:pPr>
           <a:r>
-            <a:rPr lang="en-US" sz="1700" kern="1200" dirty="0" smtClean="0"/>
+            <a:rPr lang="en-US" sz="1600" kern="1200" dirty="0" smtClean="0"/>
             <a:t>Tick Preemption</a:t>
           </a:r>
-          <a:endParaRPr lang="en-US" sz="1700" kern="1200" dirty="0"/>
+          <a:endParaRPr lang="en-US" sz="1600" kern="1200" dirty="0"/>
         </a:p>
       </dsp:txBody>
       <dsp:txXfrm>
@@ -9687,7 +9687,7 @@
           </a:pathLst>
         </a:custGeom>
         <a:noFill/>
-        <a:ln w="25400" cap="flat" cmpd="sng" algn="ctr">
+        <a:ln w="26425" cap="flat" cmpd="sng" algn="ctr">
           <a:solidFill>
             <a:schemeClr val="accent1">
               <a:shade val="80000"/>
@@ -9758,7 +9758,7 @@
             <a:lumMod val="75000"/>
           </a:schemeClr>
         </a:solidFill>
-        <a:ln w="25400" cap="flat" cmpd="sng" algn="ctr">
+        <a:ln w="26425" cap="flat" cmpd="sng" algn="ctr">
           <a:solidFill>
             <a:schemeClr val="lt1">
               <a:hueOff val="0"/>
@@ -9786,12 +9786,12 @@
         </a:fontRef>
       </dsp:style>
       <dsp:txBody>
-        <a:bodyPr spcFirstLastPara="0" vert="horz" wrap="square" lIns="10795" tIns="10795" rIns="10795" bIns="10795" numCol="1" spcCol="1270" anchor="ctr" anchorCtr="0">
+        <a:bodyPr spcFirstLastPara="0" vert="horz" wrap="square" lIns="10160" tIns="10160" rIns="10160" bIns="10160" numCol="1" spcCol="1270" anchor="ctr" anchorCtr="0">
           <a:noAutofit/>
         </a:bodyPr>
         <a:lstStyle/>
         <a:p>
-          <a:pPr lvl="0" algn="ctr" defTabSz="755650">
+          <a:pPr lvl="0" algn="ctr" defTabSz="711200">
             <a:lnSpc>
               <a:spcPct val="90000"/>
             </a:lnSpc>
@@ -9803,10 +9803,10 @@
             </a:spcAft>
           </a:pPr>
           <a:r>
-            <a:rPr lang="en-US" sz="1700" kern="1200" dirty="0" smtClean="0"/>
+            <a:rPr lang="en-US" sz="1600" kern="1200" dirty="0" smtClean="0"/>
             <a:t>Sched Granularity</a:t>
           </a:r>
-          <a:endParaRPr lang="en-US" sz="1700" kern="1200" dirty="0"/>
+          <a:endParaRPr lang="en-US" sz="1600" kern="1200" dirty="0"/>
         </a:p>
       </dsp:txBody>
       <dsp:txXfrm>
@@ -9842,7 +9842,7 @@
           </a:pathLst>
         </a:custGeom>
         <a:noFill/>
-        <a:ln w="25400" cap="flat" cmpd="sng" algn="ctr">
+        <a:ln w="26425" cap="flat" cmpd="sng" algn="ctr">
           <a:solidFill>
             <a:schemeClr val="accent1">
               <a:shade val="80000"/>
@@ -9913,7 +9913,7 @@
             <a:lumMod val="75000"/>
           </a:schemeClr>
         </a:solidFill>
-        <a:ln w="25400" cap="flat" cmpd="sng" algn="ctr">
+        <a:ln w="26425" cap="flat" cmpd="sng" algn="ctr">
           <a:solidFill>
             <a:schemeClr val="lt1">
               <a:hueOff val="0"/>
@@ -9941,12 +9941,12 @@
         </a:fontRef>
       </dsp:style>
       <dsp:txBody>
-        <a:bodyPr spcFirstLastPara="0" vert="horz" wrap="square" lIns="10795" tIns="10795" rIns="10795" bIns="10795" numCol="1" spcCol="1270" anchor="ctr" anchorCtr="0">
+        <a:bodyPr spcFirstLastPara="0" vert="horz" wrap="square" lIns="10160" tIns="10160" rIns="10160" bIns="10160" numCol="1" spcCol="1270" anchor="ctr" anchorCtr="0">
           <a:noAutofit/>
         </a:bodyPr>
         <a:lstStyle/>
         <a:p>
-          <a:pPr lvl="0" algn="ctr" defTabSz="755650">
+          <a:pPr lvl="0" algn="ctr" defTabSz="711200">
             <a:lnSpc>
               <a:spcPct val="90000"/>
             </a:lnSpc>
@@ -9958,10 +9958,10 @@
             </a:spcAft>
           </a:pPr>
           <a:r>
-            <a:rPr lang="en-US" sz="1700" kern="1200" dirty="0" smtClean="0"/>
+            <a:rPr lang="en-US" sz="1600" kern="1200" dirty="0" smtClean="0"/>
             <a:t>Sched Latency</a:t>
           </a:r>
-          <a:endParaRPr lang="en-US" sz="1700" kern="1200" dirty="0"/>
+          <a:endParaRPr lang="en-US" sz="1600" kern="1200" dirty="0"/>
         </a:p>
       </dsp:txBody>
       <dsp:txXfrm>
@@ -9997,7 +9997,7 @@
           </a:pathLst>
         </a:custGeom>
         <a:noFill/>
-        <a:ln w="25400" cap="flat" cmpd="sng" algn="ctr">
+        <a:ln w="26425" cap="flat" cmpd="sng" algn="ctr">
           <a:solidFill>
             <a:schemeClr val="accent1">
               <a:shade val="80000"/>
@@ -10068,7 +10068,7 @@
             <a:lumMod val="75000"/>
           </a:schemeClr>
         </a:solidFill>
-        <a:ln w="25400" cap="flat" cmpd="sng" algn="ctr">
+        <a:ln w="26425" cap="flat" cmpd="sng" algn="ctr">
           <a:solidFill>
             <a:schemeClr val="lt1">
               <a:hueOff val="0"/>
@@ -10096,12 +10096,12 @@
         </a:fontRef>
       </dsp:style>
       <dsp:txBody>
-        <a:bodyPr spcFirstLastPara="0" vert="horz" wrap="square" lIns="10795" tIns="10795" rIns="10795" bIns="10795" numCol="1" spcCol="1270" anchor="ctr" anchorCtr="0">
+        <a:bodyPr spcFirstLastPara="0" vert="horz" wrap="square" lIns="10160" tIns="10160" rIns="10160" bIns="10160" numCol="1" spcCol="1270" anchor="ctr" anchorCtr="0">
           <a:noAutofit/>
         </a:bodyPr>
         <a:lstStyle/>
         <a:p>
-          <a:pPr lvl="0" algn="ctr" defTabSz="755650">
+          <a:pPr lvl="0" algn="ctr" defTabSz="711200">
             <a:lnSpc>
               <a:spcPct val="90000"/>
             </a:lnSpc>
@@ -10113,10 +10113,10 @@
             </a:spcAft>
           </a:pPr>
           <a:r>
-            <a:rPr lang="en-US" sz="1700" kern="1200" dirty="0" smtClean="0"/>
+            <a:rPr lang="en-US" sz="1600" kern="1200" dirty="0" smtClean="0"/>
             <a:t>CPU Bandwidth</a:t>
           </a:r>
-          <a:endParaRPr lang="en-US" sz="1700" kern="1200" dirty="0"/>
+          <a:endParaRPr lang="en-US" sz="1600" kern="1200" dirty="0"/>
         </a:p>
       </dsp:txBody>
       <dsp:txXfrm>
@@ -10152,7 +10152,7 @@
           </a:pathLst>
         </a:custGeom>
         <a:noFill/>
-        <a:ln w="25400" cap="flat" cmpd="sng" algn="ctr">
+        <a:ln w="26425" cap="flat" cmpd="sng" algn="ctr">
           <a:solidFill>
             <a:schemeClr val="accent1">
               <a:shade val="60000"/>
@@ -10226,7 +10226,7 @@
             <a:alphaOff val="0"/>
           </a:schemeClr>
         </a:solidFill>
-        <a:ln w="25400" cap="flat" cmpd="sng" algn="ctr">
+        <a:ln w="26425" cap="flat" cmpd="sng" algn="ctr">
           <a:solidFill>
             <a:schemeClr val="lt1">
               <a:hueOff val="0"/>
@@ -10254,12 +10254,12 @@
         </a:fontRef>
       </dsp:style>
       <dsp:txBody>
-        <a:bodyPr spcFirstLastPara="0" vert="horz" wrap="square" lIns="10795" tIns="10795" rIns="10795" bIns="10795" numCol="1" spcCol="1270" anchor="ctr" anchorCtr="0">
+        <a:bodyPr spcFirstLastPara="0" vert="horz" wrap="square" lIns="10160" tIns="10160" rIns="10160" bIns="10160" numCol="1" spcCol="1270" anchor="ctr" anchorCtr="0">
           <a:noAutofit/>
         </a:bodyPr>
         <a:lstStyle/>
         <a:p>
-          <a:pPr lvl="0" algn="ctr" defTabSz="755650">
+          <a:pPr lvl="0" algn="ctr" defTabSz="711200">
             <a:lnSpc>
               <a:spcPct val="90000"/>
             </a:lnSpc>
@@ -10271,10 +10271,10 @@
             </a:spcAft>
           </a:pPr>
           <a:r>
-            <a:rPr lang="en-US" sz="1700" kern="1200" dirty="0" smtClean="0"/>
+            <a:rPr lang="en-US" sz="1600" kern="1200" dirty="0" smtClean="0"/>
             <a:t>Wake Up Preemption</a:t>
           </a:r>
-          <a:endParaRPr lang="en-US" sz="1700" kern="1200" dirty="0"/>
+          <a:endParaRPr lang="en-US" sz="1600" kern="1200" dirty="0"/>
         </a:p>
       </dsp:txBody>
       <dsp:txXfrm>
@@ -10310,7 +10310,7 @@
           </a:pathLst>
         </a:custGeom>
         <a:noFill/>
-        <a:ln w="25400" cap="flat" cmpd="sng" algn="ctr">
+        <a:ln w="26425" cap="flat" cmpd="sng" algn="ctr">
           <a:solidFill>
             <a:schemeClr val="accent1">
               <a:shade val="80000"/>
@@ -10381,7 +10381,7 @@
             <a:lumMod val="75000"/>
           </a:schemeClr>
         </a:solidFill>
-        <a:ln w="25400" cap="flat" cmpd="sng" algn="ctr">
+        <a:ln w="26425" cap="flat" cmpd="sng" algn="ctr">
           <a:solidFill>
             <a:schemeClr val="lt1">
               <a:hueOff val="0"/>
@@ -10409,12 +10409,12 @@
         </a:fontRef>
       </dsp:style>
       <dsp:txBody>
-        <a:bodyPr spcFirstLastPara="0" vert="horz" wrap="square" lIns="10795" tIns="10795" rIns="10795" bIns="10795" numCol="1" spcCol="1270" anchor="ctr" anchorCtr="0">
+        <a:bodyPr spcFirstLastPara="0" vert="horz" wrap="square" lIns="10160" tIns="10160" rIns="10160" bIns="10160" numCol="1" spcCol="1270" anchor="ctr" anchorCtr="0">
           <a:noAutofit/>
         </a:bodyPr>
         <a:lstStyle/>
         <a:p>
-          <a:pPr lvl="0" algn="ctr" defTabSz="755650">
+          <a:pPr lvl="0" algn="ctr" defTabSz="711200">
             <a:lnSpc>
               <a:spcPct val="90000"/>
             </a:lnSpc>
@@ -10426,10 +10426,10 @@
             </a:spcAft>
           </a:pPr>
           <a:r>
-            <a:rPr lang="en-US" sz="1700" kern="1200" dirty="0" smtClean="0"/>
+            <a:rPr lang="en-US" sz="1600" kern="1200" dirty="0" smtClean="0"/>
             <a:t>Wakeup Granularity</a:t>
           </a:r>
-          <a:endParaRPr lang="en-US" sz="1700" kern="1200" dirty="0"/>
+          <a:endParaRPr lang="en-US" sz="1600" kern="1200" dirty="0"/>
         </a:p>
       </dsp:txBody>
       <dsp:txXfrm>
@@ -10465,7 +10465,7 @@
           </a:pathLst>
         </a:custGeom>
         <a:noFill/>
-        <a:ln w="25400" cap="flat" cmpd="sng" algn="ctr">
+        <a:ln w="26425" cap="flat" cmpd="sng" algn="ctr">
           <a:solidFill>
             <a:schemeClr val="accent1">
               <a:shade val="80000"/>
@@ -10536,7 +10536,7 @@
             <a:lumMod val="75000"/>
           </a:schemeClr>
         </a:solidFill>
-        <a:ln w="25400" cap="flat" cmpd="sng" algn="ctr">
+        <a:ln w="26425" cap="flat" cmpd="sng" algn="ctr">
           <a:solidFill>
             <a:schemeClr val="lt1">
               <a:hueOff val="0"/>
@@ -10564,12 +10564,12 @@
         </a:fontRef>
       </dsp:style>
       <dsp:txBody>
-        <a:bodyPr spcFirstLastPara="0" vert="horz" wrap="square" lIns="10795" tIns="10795" rIns="10795" bIns="10795" numCol="1" spcCol="1270" anchor="ctr" anchorCtr="0">
+        <a:bodyPr spcFirstLastPara="0" vert="horz" wrap="square" lIns="10160" tIns="10160" rIns="10160" bIns="10160" numCol="1" spcCol="1270" anchor="ctr" anchorCtr="0">
           <a:noAutofit/>
         </a:bodyPr>
         <a:lstStyle/>
         <a:p>
-          <a:pPr lvl="0" algn="ctr" defTabSz="755650">
+          <a:pPr lvl="0" algn="ctr" defTabSz="711200">
             <a:lnSpc>
               <a:spcPct val="90000"/>
             </a:lnSpc>
@@ -10581,10 +10581,10 @@
             </a:spcAft>
           </a:pPr>
           <a:r>
-            <a:rPr lang="en-US" sz="1700" kern="1200" dirty="0" smtClean="0"/>
+            <a:rPr lang="en-US" sz="1600" kern="1200" dirty="0" smtClean="0"/>
             <a:t>Cache Locality</a:t>
           </a:r>
-          <a:endParaRPr lang="en-US" sz="1700" kern="1200" dirty="0"/>
+          <a:endParaRPr lang="en-US" sz="1600" kern="1200" dirty="0"/>
         </a:p>
       </dsp:txBody>
       <dsp:txXfrm>
@@ -10620,7 +10620,7 @@
           </a:pathLst>
         </a:custGeom>
         <a:noFill/>
-        <a:ln w="25400" cap="flat" cmpd="sng" algn="ctr">
+        <a:ln w="26425" cap="flat" cmpd="sng" algn="ctr">
           <a:solidFill>
             <a:schemeClr val="accent1">
               <a:shade val="60000"/>
@@ -10694,7 +10694,7 @@
             <a:alphaOff val="0"/>
           </a:schemeClr>
         </a:solidFill>
-        <a:ln w="25400" cap="flat" cmpd="sng" algn="ctr">
+        <a:ln w="26425" cap="flat" cmpd="sng" algn="ctr">
           <a:solidFill>
             <a:schemeClr val="lt1">
               <a:hueOff val="0"/>
@@ -10722,12 +10722,12 @@
         </a:fontRef>
       </dsp:style>
       <dsp:txBody>
-        <a:bodyPr spcFirstLastPara="0" vert="horz" wrap="square" lIns="10795" tIns="10795" rIns="10795" bIns="10795" numCol="1" spcCol="1270" anchor="ctr" anchorCtr="0">
+        <a:bodyPr spcFirstLastPara="0" vert="horz" wrap="square" lIns="10160" tIns="10160" rIns="10160" bIns="10160" numCol="1" spcCol="1270" anchor="ctr" anchorCtr="0">
           <a:noAutofit/>
         </a:bodyPr>
         <a:lstStyle/>
         <a:p>
-          <a:pPr lvl="0" algn="ctr" defTabSz="755650">
+          <a:pPr lvl="0" algn="ctr" defTabSz="711200">
             <a:lnSpc>
               <a:spcPct val="90000"/>
             </a:lnSpc>
@@ -10739,10 +10739,10 @@
             </a:spcAft>
           </a:pPr>
           <a:r>
-            <a:rPr lang="en-US" sz="1700" kern="1200" dirty="0" smtClean="0"/>
+            <a:rPr lang="en-US" sz="1600" kern="1200" dirty="0" smtClean="0"/>
             <a:t>CPU Load Balance</a:t>
           </a:r>
-          <a:endParaRPr lang="en-US" sz="1700" kern="1200" dirty="0"/>
+          <a:endParaRPr lang="en-US" sz="1600" kern="1200" dirty="0"/>
         </a:p>
       </dsp:txBody>
       <dsp:txXfrm>
@@ -10778,7 +10778,7 @@
           </a:pathLst>
         </a:custGeom>
         <a:noFill/>
-        <a:ln w="25400" cap="flat" cmpd="sng" algn="ctr">
+        <a:ln w="26425" cap="flat" cmpd="sng" algn="ctr">
           <a:solidFill>
             <a:schemeClr val="accent1">
               <a:shade val="80000"/>
@@ -10849,7 +10849,7 @@
             <a:lumMod val="75000"/>
           </a:schemeClr>
         </a:solidFill>
-        <a:ln w="25400" cap="flat" cmpd="sng" algn="ctr">
+        <a:ln w="26425" cap="flat" cmpd="sng" algn="ctr">
           <a:solidFill>
             <a:schemeClr val="lt1">
               <a:hueOff val="0"/>
@@ -10877,12 +10877,12 @@
         </a:fontRef>
       </dsp:style>
       <dsp:txBody>
-        <a:bodyPr spcFirstLastPara="0" vert="horz" wrap="square" lIns="10795" tIns="10795" rIns="10795" bIns="10795" numCol="1" spcCol="1270" anchor="ctr" anchorCtr="0">
+        <a:bodyPr spcFirstLastPara="0" vert="horz" wrap="square" lIns="10160" tIns="10160" rIns="10160" bIns="10160" numCol="1" spcCol="1270" anchor="ctr" anchorCtr="0">
           <a:noAutofit/>
         </a:bodyPr>
         <a:lstStyle/>
         <a:p>
-          <a:pPr lvl="0" algn="ctr" defTabSz="755650">
+          <a:pPr lvl="0" algn="ctr" defTabSz="711200">
             <a:lnSpc>
               <a:spcPct val="90000"/>
             </a:lnSpc>
@@ -10894,10 +10894,10 @@
             </a:spcAft>
           </a:pPr>
           <a:r>
-            <a:rPr lang="en-US" sz="1700" kern="1200" dirty="0" smtClean="0"/>
+            <a:rPr lang="en-US" sz="1600" kern="1200" dirty="0" smtClean="0"/>
             <a:t>Migration Cost</a:t>
           </a:r>
-          <a:endParaRPr lang="en-US" sz="1700" kern="1200" dirty="0"/>
+          <a:endParaRPr lang="en-US" sz="1600" kern="1200" dirty="0"/>
         </a:p>
       </dsp:txBody>
       <dsp:txXfrm>
@@ -10933,7 +10933,7 @@
           </a:pathLst>
         </a:custGeom>
         <a:noFill/>
-        <a:ln w="25400" cap="flat" cmpd="sng" algn="ctr">
+        <a:ln w="26425" cap="flat" cmpd="sng" algn="ctr">
           <a:solidFill>
             <a:schemeClr val="accent1">
               <a:shade val="80000"/>
@@ -11004,7 +11004,7 @@
             <a:lumMod val="75000"/>
           </a:schemeClr>
         </a:solidFill>
-        <a:ln w="25400" cap="flat" cmpd="sng" algn="ctr">
+        <a:ln w="26425" cap="flat" cmpd="sng" algn="ctr">
           <a:solidFill>
             <a:schemeClr val="lt1">
               <a:hueOff val="0"/>
@@ -11032,12 +11032,12 @@
         </a:fontRef>
       </dsp:style>
       <dsp:txBody>
-        <a:bodyPr spcFirstLastPara="0" vert="horz" wrap="square" lIns="10795" tIns="10795" rIns="10795" bIns="10795" numCol="1" spcCol="1270" anchor="ctr" anchorCtr="0">
+        <a:bodyPr spcFirstLastPara="0" vert="horz" wrap="square" lIns="10160" tIns="10160" rIns="10160" bIns="10160" numCol="1" spcCol="1270" anchor="ctr" anchorCtr="0">
           <a:noAutofit/>
         </a:bodyPr>
         <a:lstStyle/>
         <a:p>
-          <a:pPr lvl="0" algn="ctr" defTabSz="755650">
+          <a:pPr lvl="0" algn="ctr" defTabSz="711200">
             <a:lnSpc>
               <a:spcPct val="90000"/>
             </a:lnSpc>
@@ -11049,10 +11049,10 @@
             </a:spcAft>
           </a:pPr>
           <a:r>
-            <a:rPr lang="en-US" sz="1700" kern="1200" dirty="0" smtClean="0"/>
+            <a:rPr lang="en-US" sz="1600" kern="1200" dirty="0" smtClean="0"/>
             <a:t>Cache Locality</a:t>
           </a:r>
-          <a:endParaRPr lang="en-US" sz="1700" kern="1200" dirty="0"/>
+          <a:endParaRPr lang="en-US" sz="1600" kern="1200" dirty="0"/>
         </a:p>
       </dsp:txBody>
       <dsp:txXfrm>
@@ -11095,7 +11095,7 @@
             <a:alphaOff val="0"/>
           </a:schemeClr>
         </a:solidFill>
-        <a:ln w="25400" cap="flat" cmpd="sng" algn="ctr">
+        <a:ln w="26425" cap="flat" cmpd="sng" algn="ctr">
           <a:solidFill>
             <a:schemeClr val="lt1">
               <a:hueOff val="0"/>
@@ -11123,12 +11123,12 @@
         </a:fontRef>
       </dsp:style>
       <dsp:txBody>
-        <a:bodyPr spcFirstLastPara="0" vert="horz" wrap="square" lIns="10160" tIns="10160" rIns="10160" bIns="10160" numCol="1" spcCol="1270" anchor="ctr" anchorCtr="0">
+        <a:bodyPr spcFirstLastPara="0" vert="horz" wrap="square" lIns="9525" tIns="9525" rIns="9525" bIns="9525" numCol="1" spcCol="1270" anchor="ctr" anchorCtr="0">
           <a:noAutofit/>
         </a:bodyPr>
         <a:lstStyle/>
         <a:p>
-          <a:pPr lvl="0" algn="ctr" defTabSz="711200">
+          <a:pPr lvl="0" algn="ctr" defTabSz="666750">
             <a:lnSpc>
               <a:spcPct val="90000"/>
             </a:lnSpc>
@@ -11140,10 +11140,10 @@
             </a:spcAft>
           </a:pPr>
           <a:r>
-            <a:rPr lang="en-US" sz="1600" kern="1200" dirty="0" smtClean="0"/>
+            <a:rPr lang="en-US" sz="1500" kern="1200" dirty="0" smtClean="0"/>
             <a:t>Sleep time</a:t>
           </a:r>
-          <a:endParaRPr lang="en-US" sz="1600" kern="1200" dirty="0"/>
+          <a:endParaRPr lang="en-US" sz="1500" kern="1200" dirty="0"/>
         </a:p>
       </dsp:txBody>
       <dsp:txXfrm>
@@ -11179,7 +11179,7 @@
           </a:pathLst>
         </a:custGeom>
         <a:noFill/>
-        <a:ln w="25400" cap="flat" cmpd="sng" algn="ctr">
+        <a:ln w="26425" cap="flat" cmpd="sng" algn="ctr">
           <a:solidFill>
             <a:schemeClr val="accent1">
               <a:shade val="60000"/>
@@ -11253,7 +11253,7 @@
             <a:alphaOff val="0"/>
           </a:schemeClr>
         </a:solidFill>
-        <a:ln w="25400" cap="flat" cmpd="sng" algn="ctr">
+        <a:ln w="26425" cap="flat" cmpd="sng" algn="ctr">
           <a:solidFill>
             <a:schemeClr val="lt1">
               <a:hueOff val="0"/>
@@ -11281,12 +11281,12 @@
         </a:fontRef>
       </dsp:style>
       <dsp:txBody>
-        <a:bodyPr spcFirstLastPara="0" vert="horz" wrap="square" lIns="10160" tIns="10160" rIns="10160" bIns="10160" numCol="1" spcCol="1270" anchor="ctr" anchorCtr="0">
+        <a:bodyPr spcFirstLastPara="0" vert="horz" wrap="square" lIns="9525" tIns="9525" rIns="9525" bIns="9525" numCol="1" spcCol="1270" anchor="ctr" anchorCtr="0">
           <a:noAutofit/>
         </a:bodyPr>
         <a:lstStyle/>
         <a:p>
-          <a:pPr lvl="0" algn="ctr" defTabSz="711200">
+          <a:pPr lvl="0" algn="ctr" defTabSz="666750">
             <a:lnSpc>
               <a:spcPct val="90000"/>
             </a:lnSpc>
@@ -11298,13 +11298,13 @@
             </a:spcAft>
           </a:pPr>
           <a:r>
-            <a:rPr lang="en-US" altLang="zh-CN" sz="1600" kern="1200" dirty="0" smtClean="0"/>
+            <a:rPr lang="en-US" altLang="zh-CN" sz="1500" kern="1200" dirty="0" smtClean="0"/>
             <a:t>Block time</a:t>
           </a:r>
-          <a:endParaRPr lang="zh-CN" altLang="en-US" sz="1600" kern="1200" dirty="0" smtClean="0"/>
-        </a:p>
-        <a:p>
-          <a:pPr lvl="0" algn="ctr" defTabSz="711200">
+          <a:endParaRPr lang="zh-CN" altLang="en-US" sz="1500" kern="1200" dirty="0" smtClean="0"/>
+        </a:p>
+        <a:p>
+          <a:pPr lvl="0" algn="ctr" defTabSz="666750">
             <a:lnSpc>
               <a:spcPct val="90000"/>
             </a:lnSpc>
@@ -11316,10 +11316,10 @@
             </a:spcAft>
           </a:pPr>
           <a:r>
-            <a:rPr lang="en-US" sz="1600" kern="1200" dirty="0" smtClean="0"/>
+            <a:rPr lang="en-US" sz="1500" kern="1200" dirty="0" smtClean="0"/>
             <a:t>(Uninterruptible)</a:t>
           </a:r>
-          <a:endParaRPr lang="en-US" sz="1600" kern="1200" dirty="0"/>
+          <a:endParaRPr lang="en-US" sz="1500" kern="1200" dirty="0"/>
         </a:p>
       </dsp:txBody>
       <dsp:txXfrm>
@@ -11355,7 +11355,7 @@
           </a:pathLst>
         </a:custGeom>
         <a:noFill/>
-        <a:ln w="25400" cap="flat" cmpd="sng" algn="ctr">
+        <a:ln w="26425" cap="flat" cmpd="sng" algn="ctr">
           <a:solidFill>
             <a:schemeClr val="accent1">
               <a:shade val="80000"/>
@@ -11426,7 +11426,7 @@
             <a:lumMod val="75000"/>
           </a:schemeClr>
         </a:solidFill>
-        <a:ln w="25400" cap="flat" cmpd="sng" algn="ctr">
+        <a:ln w="26425" cap="flat" cmpd="sng" algn="ctr">
           <a:solidFill>
             <a:schemeClr val="lt1">
               <a:hueOff val="0"/>
@@ -11454,12 +11454,12 @@
         </a:fontRef>
       </dsp:style>
       <dsp:txBody>
-        <a:bodyPr spcFirstLastPara="0" vert="horz" wrap="square" lIns="10160" tIns="10160" rIns="10160" bIns="10160" numCol="1" spcCol="1270" anchor="ctr" anchorCtr="0">
+        <a:bodyPr spcFirstLastPara="0" vert="horz" wrap="square" lIns="9525" tIns="9525" rIns="9525" bIns="9525" numCol="1" spcCol="1270" anchor="ctr" anchorCtr="0">
           <a:noAutofit/>
         </a:bodyPr>
         <a:lstStyle/>
         <a:p>
-          <a:pPr lvl="0" algn="ctr" defTabSz="711200">
+          <a:pPr lvl="0" algn="ctr" defTabSz="666750">
             <a:lnSpc>
               <a:spcPct val="90000"/>
             </a:lnSpc>
@@ -11471,10 +11471,10 @@
             </a:spcAft>
           </a:pPr>
           <a:r>
-            <a:rPr lang="en-US" sz="1600" kern="1200" dirty="0" smtClean="0"/>
+            <a:rPr lang="en-US" sz="1500" kern="1200" dirty="0" smtClean="0"/>
             <a:t>IO Wait</a:t>
           </a:r>
-          <a:endParaRPr lang="en-US" sz="1600" kern="1200" dirty="0"/>
+          <a:endParaRPr lang="en-US" sz="1500" kern="1200" dirty="0"/>
         </a:p>
       </dsp:txBody>
       <dsp:txXfrm>
@@ -11510,7 +11510,7 @@
           </a:pathLst>
         </a:custGeom>
         <a:noFill/>
-        <a:ln w="25400" cap="flat" cmpd="sng" algn="ctr">
+        <a:ln w="26425" cap="flat" cmpd="sng" algn="ctr">
           <a:solidFill>
             <a:schemeClr val="accent1">
               <a:shade val="80000"/>
@@ -11581,7 +11581,7 @@
             <a:lumMod val="75000"/>
           </a:schemeClr>
         </a:solidFill>
-        <a:ln w="25400" cap="flat" cmpd="sng" algn="ctr">
+        <a:ln w="26425" cap="flat" cmpd="sng" algn="ctr">
           <a:solidFill>
             <a:schemeClr val="lt1">
               <a:hueOff val="0"/>
@@ -11609,12 +11609,12 @@
         </a:fontRef>
       </dsp:style>
       <dsp:txBody>
-        <a:bodyPr spcFirstLastPara="0" vert="horz" wrap="square" lIns="10160" tIns="10160" rIns="10160" bIns="10160" numCol="1" spcCol="1270" anchor="ctr" anchorCtr="0">
+        <a:bodyPr spcFirstLastPara="0" vert="horz" wrap="square" lIns="9525" tIns="9525" rIns="9525" bIns="9525" numCol="1" spcCol="1270" anchor="ctr" anchorCtr="0">
           <a:noAutofit/>
         </a:bodyPr>
         <a:lstStyle/>
         <a:p>
-          <a:pPr lvl="0" algn="ctr" defTabSz="711200">
+          <a:pPr lvl="0" algn="ctr" defTabSz="666750">
             <a:lnSpc>
               <a:spcPct val="90000"/>
             </a:lnSpc>
@@ -11626,18 +11626,18 @@
             </a:spcAft>
           </a:pPr>
           <a:r>
-            <a:rPr lang="en-US" altLang="zh-CN" sz="1600" kern="1200" dirty="0" smtClean="0"/>
+            <a:rPr lang="en-US" altLang="zh-CN" sz="1500" kern="1200" dirty="0" smtClean="0"/>
             <a:t>Memory</a:t>
           </a:r>
           <a:r>
-            <a:rPr lang="zh-CN" altLang="en-US" sz="1600" kern="1200" dirty="0" smtClean="0"/>
+            <a:rPr lang="zh-CN" altLang="en-US" sz="1500" kern="1200" dirty="0" smtClean="0"/>
             <a:t> </a:t>
           </a:r>
           <a:r>
-            <a:rPr lang="en-US" altLang="zh-CN" sz="1600" kern="1200" dirty="0" smtClean="0"/>
+            <a:rPr lang="en-US" altLang="zh-CN" sz="1500" kern="1200" dirty="0" smtClean="0"/>
             <a:t>Pressure</a:t>
           </a:r>
-          <a:endParaRPr lang="en-US" sz="1600" kern="1200" dirty="0"/>
+          <a:endParaRPr lang="en-US" sz="1500" kern="1200" dirty="0"/>
         </a:p>
       </dsp:txBody>
       <dsp:txXfrm>
@@ -11673,7 +11673,7 @@
           </a:pathLst>
         </a:custGeom>
         <a:noFill/>
-        <a:ln w="25400" cap="flat" cmpd="sng" algn="ctr">
+        <a:ln w="26425" cap="flat" cmpd="sng" algn="ctr">
           <a:solidFill>
             <a:schemeClr val="accent1">
               <a:shade val="80000"/>
@@ -11744,7 +11744,7 @@
             <a:lumMod val="75000"/>
           </a:schemeClr>
         </a:solidFill>
-        <a:ln w="25400" cap="flat" cmpd="sng" algn="ctr">
+        <a:ln w="26425" cap="flat" cmpd="sng" algn="ctr">
           <a:solidFill>
             <a:schemeClr val="lt1">
               <a:hueOff val="0"/>
@@ -11772,12 +11772,12 @@
         </a:fontRef>
       </dsp:style>
       <dsp:txBody>
-        <a:bodyPr spcFirstLastPara="0" vert="horz" wrap="square" lIns="10160" tIns="10160" rIns="10160" bIns="10160" numCol="1" spcCol="1270" anchor="ctr" anchorCtr="0">
+        <a:bodyPr spcFirstLastPara="0" vert="horz" wrap="square" lIns="9525" tIns="9525" rIns="9525" bIns="9525" numCol="1" spcCol="1270" anchor="ctr" anchorCtr="0">
           <a:noAutofit/>
         </a:bodyPr>
         <a:lstStyle/>
         <a:p>
-          <a:pPr lvl="0" algn="ctr" defTabSz="711200">
+          <a:pPr lvl="0" algn="ctr" defTabSz="666750">
             <a:lnSpc>
               <a:spcPct val="90000"/>
             </a:lnSpc>
@@ -11789,26 +11789,26 @@
             </a:spcAft>
           </a:pPr>
           <a:r>
-            <a:rPr lang="en-US" altLang="zh-CN" sz="1600" kern="1200" dirty="0" smtClean="0"/>
+            <a:rPr lang="en-US" altLang="zh-CN" sz="1500" kern="1200" dirty="0" smtClean="0"/>
             <a:t>Disk</a:t>
           </a:r>
           <a:r>
-            <a:rPr lang="zh-CN" altLang="en-US" sz="1600" kern="1200" dirty="0" smtClean="0"/>
+            <a:rPr lang="zh-CN" altLang="en-US" sz="1500" kern="1200" dirty="0" smtClean="0"/>
             <a:t> </a:t>
           </a:r>
           <a:r>
-            <a:rPr lang="en-US" altLang="zh-CN" sz="1600" kern="1200" dirty="0" smtClean="0"/>
+            <a:rPr lang="en-US" altLang="zh-CN" sz="1500" kern="1200" dirty="0" smtClean="0"/>
             <a:t>IO</a:t>
           </a:r>
           <a:r>
-            <a:rPr lang="zh-CN" altLang="en-US" sz="1600" kern="1200" dirty="0" smtClean="0"/>
+            <a:rPr lang="zh-CN" altLang="en-US" sz="1500" kern="1200" dirty="0" smtClean="0"/>
             <a:t> </a:t>
           </a:r>
           <a:r>
-            <a:rPr lang="en-US" altLang="zh-CN" sz="1600" kern="1200" dirty="0" smtClean="0"/>
+            <a:rPr lang="en-US" altLang="zh-CN" sz="1500" kern="1200" dirty="0" smtClean="0"/>
             <a:t>Pressure</a:t>
           </a:r>
-          <a:endParaRPr lang="en-US" sz="1600" kern="1200" dirty="0"/>
+          <a:endParaRPr lang="en-US" sz="1500" kern="1200" dirty="0"/>
         </a:p>
       </dsp:txBody>
       <dsp:txXfrm>
@@ -11844,7 +11844,7 @@
           </a:pathLst>
         </a:custGeom>
         <a:noFill/>
-        <a:ln w="25400" cap="flat" cmpd="sng" algn="ctr">
+        <a:ln w="26425" cap="flat" cmpd="sng" algn="ctr">
           <a:solidFill>
             <a:schemeClr val="accent1">
               <a:shade val="80000"/>
@@ -11915,7 +11915,7 @@
             <a:lumMod val="75000"/>
           </a:schemeClr>
         </a:solidFill>
-        <a:ln w="25400" cap="flat" cmpd="sng" algn="ctr">
+        <a:ln w="26425" cap="flat" cmpd="sng" algn="ctr">
           <a:solidFill>
             <a:schemeClr val="lt1">
               <a:hueOff val="0"/>
@@ -11943,12 +11943,12 @@
         </a:fontRef>
       </dsp:style>
       <dsp:txBody>
-        <a:bodyPr spcFirstLastPara="0" vert="horz" wrap="square" lIns="10160" tIns="10160" rIns="10160" bIns="10160" numCol="1" spcCol="1270" anchor="ctr" anchorCtr="0">
+        <a:bodyPr spcFirstLastPara="0" vert="horz" wrap="square" lIns="9525" tIns="9525" rIns="9525" bIns="9525" numCol="1" spcCol="1270" anchor="ctr" anchorCtr="0">
           <a:noAutofit/>
         </a:bodyPr>
         <a:lstStyle/>
         <a:p>
-          <a:pPr lvl="0" algn="ctr" defTabSz="711200">
+          <a:pPr lvl="0" algn="ctr" defTabSz="666750">
             <a:lnSpc>
               <a:spcPct val="90000"/>
             </a:lnSpc>
@@ -11960,10 +11960,10 @@
             </a:spcAft>
           </a:pPr>
           <a:r>
-            <a:rPr lang="en-US" sz="1600" kern="1200" dirty="0" smtClean="0"/>
+            <a:rPr lang="en-US" sz="1500" kern="1200" dirty="0" smtClean="0"/>
             <a:t>Lock contention</a:t>
           </a:r>
-          <a:endParaRPr lang="en-US" sz="1600" kern="1200" dirty="0"/>
+          <a:endParaRPr lang="en-US" sz="1500" kern="1200" dirty="0"/>
         </a:p>
       </dsp:txBody>
       <dsp:txXfrm>
@@ -11999,7 +11999,7 @@
           </a:pathLst>
         </a:custGeom>
         <a:noFill/>
-        <a:ln w="25400" cap="flat" cmpd="sng" algn="ctr">
+        <a:ln w="26425" cap="flat" cmpd="sng" algn="ctr">
           <a:solidFill>
             <a:schemeClr val="accent1">
               <a:shade val="80000"/>
@@ -12070,7 +12070,7 @@
             <a:lumMod val="75000"/>
           </a:schemeClr>
         </a:solidFill>
-        <a:ln w="25400" cap="flat" cmpd="sng" algn="ctr">
+        <a:ln w="26425" cap="flat" cmpd="sng" algn="ctr">
           <a:solidFill>
             <a:schemeClr val="lt1">
               <a:hueOff val="0"/>
@@ -12098,12 +12098,12 @@
         </a:fontRef>
       </dsp:style>
       <dsp:txBody>
-        <a:bodyPr spcFirstLastPara="0" vert="horz" wrap="square" lIns="10160" tIns="10160" rIns="10160" bIns="10160" numCol="1" spcCol="1270" anchor="ctr" anchorCtr="0">
+        <a:bodyPr spcFirstLastPara="0" vert="horz" wrap="square" lIns="9525" tIns="9525" rIns="9525" bIns="9525" numCol="1" spcCol="1270" anchor="ctr" anchorCtr="0">
           <a:noAutofit/>
         </a:bodyPr>
         <a:lstStyle/>
         <a:p>
-          <a:pPr lvl="0" algn="ctr" defTabSz="711200">
+          <a:pPr lvl="0" algn="ctr" defTabSz="666750">
             <a:lnSpc>
               <a:spcPct val="90000"/>
             </a:lnSpc>
@@ -12115,10 +12115,10 @@
             </a:spcAft>
           </a:pPr>
           <a:r>
-            <a:rPr lang="en-US" sz="1600" kern="1200" dirty="0" smtClean="0"/>
+            <a:rPr lang="en-US" sz="1500" kern="1200" dirty="0" smtClean="0"/>
             <a:t>Wait an event</a:t>
           </a:r>
-          <a:endParaRPr lang="en-US" sz="1600" kern="1200" dirty="0"/>
+          <a:endParaRPr lang="en-US" sz="1500" kern="1200" dirty="0"/>
         </a:p>
       </dsp:txBody>
       <dsp:txXfrm>
@@ -12154,7 +12154,7 @@
           </a:pathLst>
         </a:custGeom>
         <a:noFill/>
-        <a:ln w="25400" cap="flat" cmpd="sng" algn="ctr">
+        <a:ln w="26425" cap="flat" cmpd="sng" algn="ctr">
           <a:solidFill>
             <a:schemeClr val="accent1">
               <a:shade val="60000"/>
@@ -12228,7 +12228,7 @@
             <a:alphaOff val="0"/>
           </a:schemeClr>
         </a:solidFill>
-        <a:ln w="25400" cap="flat" cmpd="sng" algn="ctr">
+        <a:ln w="26425" cap="flat" cmpd="sng" algn="ctr">
           <a:solidFill>
             <a:schemeClr val="lt1">
               <a:hueOff val="0"/>
@@ -12256,12 +12256,12 @@
         </a:fontRef>
       </dsp:style>
       <dsp:txBody>
-        <a:bodyPr spcFirstLastPara="0" vert="horz" wrap="square" lIns="10160" tIns="10160" rIns="10160" bIns="10160" numCol="1" spcCol="1270" anchor="ctr" anchorCtr="0">
+        <a:bodyPr spcFirstLastPara="0" vert="horz" wrap="square" lIns="9525" tIns="9525" rIns="9525" bIns="9525" numCol="1" spcCol="1270" anchor="ctr" anchorCtr="0">
           <a:noAutofit/>
         </a:bodyPr>
         <a:lstStyle/>
         <a:p>
-          <a:pPr lvl="0" algn="ctr" defTabSz="711200">
+          <a:pPr lvl="0" algn="ctr" defTabSz="666750">
             <a:lnSpc>
               <a:spcPct val="90000"/>
             </a:lnSpc>
@@ -12273,13 +12273,13 @@
             </a:spcAft>
           </a:pPr>
           <a:r>
-            <a:rPr lang="en-US" altLang="zh-CN" sz="1600" kern="1200" dirty="0" smtClean="0"/>
+            <a:rPr lang="en-US" altLang="zh-CN" sz="1500" kern="1200" dirty="0" smtClean="0"/>
             <a:t>Sleep time</a:t>
           </a:r>
-          <a:endParaRPr lang="zh-CN" altLang="en-US" sz="1600" kern="1200" dirty="0" smtClean="0"/>
-        </a:p>
-        <a:p>
-          <a:pPr lvl="0" algn="ctr" defTabSz="711200">
+          <a:endParaRPr lang="zh-CN" altLang="en-US" sz="1500" kern="1200" dirty="0" smtClean="0"/>
+        </a:p>
+        <a:p>
+          <a:pPr lvl="0" algn="ctr" defTabSz="666750">
             <a:lnSpc>
               <a:spcPct val="90000"/>
             </a:lnSpc>
@@ -12291,10 +12291,10 @@
             </a:spcAft>
           </a:pPr>
           <a:r>
-            <a:rPr lang="en-US" sz="1600" kern="1200" dirty="0" smtClean="0"/>
+            <a:rPr lang="en-US" sz="1500" kern="1200" dirty="0" smtClean="0"/>
             <a:t>(Interruptible)</a:t>
           </a:r>
-          <a:endParaRPr lang="en-US" sz="1600" kern="1200" dirty="0"/>
+          <a:endParaRPr lang="en-US" sz="1500" kern="1200" dirty="0"/>
         </a:p>
       </dsp:txBody>
       <dsp:txXfrm>
@@ -12330,7 +12330,7 @@
           </a:pathLst>
         </a:custGeom>
         <a:noFill/>
-        <a:ln w="25400" cap="flat" cmpd="sng" algn="ctr">
+        <a:ln w="26425" cap="flat" cmpd="sng" algn="ctr">
           <a:solidFill>
             <a:schemeClr val="accent1">
               <a:shade val="80000"/>
@@ -12401,7 +12401,7 @@
             <a:lumMod val="75000"/>
           </a:schemeClr>
         </a:solidFill>
-        <a:ln w="25400" cap="flat" cmpd="sng" algn="ctr">
+        <a:ln w="26425" cap="flat" cmpd="sng" algn="ctr">
           <a:solidFill>
             <a:schemeClr val="lt1">
               <a:hueOff val="0"/>
@@ -12429,12 +12429,12 @@
         </a:fontRef>
       </dsp:style>
       <dsp:txBody>
-        <a:bodyPr spcFirstLastPara="0" vert="horz" wrap="square" lIns="10160" tIns="10160" rIns="10160" bIns="10160" numCol="1" spcCol="1270" anchor="ctr" anchorCtr="0">
+        <a:bodyPr spcFirstLastPara="0" vert="horz" wrap="square" lIns="9525" tIns="9525" rIns="9525" bIns="9525" numCol="1" spcCol="1270" anchor="ctr" anchorCtr="0">
           <a:noAutofit/>
         </a:bodyPr>
         <a:lstStyle/>
         <a:p>
-          <a:pPr lvl="0" algn="ctr" defTabSz="711200">
+          <a:pPr lvl="0" algn="ctr" defTabSz="666750">
             <a:lnSpc>
               <a:spcPct val="90000"/>
             </a:lnSpc>
@@ -12446,10 +12446,10 @@
             </a:spcAft>
           </a:pPr>
           <a:r>
-            <a:rPr lang="en-US" sz="1600" kern="1200" dirty="0" smtClean="0"/>
+            <a:rPr lang="en-US" sz="1500" kern="1200" dirty="0" smtClean="0"/>
             <a:t>Lock Contention</a:t>
           </a:r>
-          <a:endParaRPr lang="en-US" sz="1600" kern="1200" dirty="0"/>
+          <a:endParaRPr lang="en-US" sz="1500" kern="1200" dirty="0"/>
         </a:p>
       </dsp:txBody>
       <dsp:txXfrm>
@@ -12485,7 +12485,7 @@
           </a:pathLst>
         </a:custGeom>
         <a:noFill/>
-        <a:ln w="25400" cap="flat" cmpd="sng" algn="ctr">
+        <a:ln w="26425" cap="flat" cmpd="sng" algn="ctr">
           <a:solidFill>
             <a:schemeClr val="accent1">
               <a:shade val="80000"/>
@@ -12556,7 +12556,7 @@
             <a:lumMod val="75000"/>
           </a:schemeClr>
         </a:solidFill>
-        <a:ln w="25400" cap="flat" cmpd="sng" algn="ctr">
+        <a:ln w="26425" cap="flat" cmpd="sng" algn="ctr">
           <a:solidFill>
             <a:schemeClr val="lt1">
               <a:hueOff val="0"/>
@@ -12584,12 +12584,12 @@
         </a:fontRef>
       </dsp:style>
       <dsp:txBody>
-        <a:bodyPr spcFirstLastPara="0" vert="horz" wrap="square" lIns="10160" tIns="10160" rIns="10160" bIns="10160" numCol="1" spcCol="1270" anchor="ctr" anchorCtr="0">
+        <a:bodyPr spcFirstLastPara="0" vert="horz" wrap="square" lIns="9525" tIns="9525" rIns="9525" bIns="9525" numCol="1" spcCol="1270" anchor="ctr" anchorCtr="0">
           <a:noAutofit/>
         </a:bodyPr>
         <a:lstStyle/>
         <a:p>
-          <a:pPr lvl="0" algn="ctr" defTabSz="711200">
+          <a:pPr lvl="0" algn="ctr" defTabSz="666750">
             <a:lnSpc>
               <a:spcPct val="90000"/>
             </a:lnSpc>
@@ -12601,10 +12601,10 @@
             </a:spcAft>
           </a:pPr>
           <a:r>
-            <a:rPr lang="en-US" sz="1600" kern="1200" dirty="0" smtClean="0"/>
+            <a:rPr lang="en-US" sz="1500" kern="1200" dirty="0" smtClean="0"/>
             <a:t>Wait an event</a:t>
           </a:r>
-          <a:endParaRPr lang="en-US" sz="1600" kern="1200" dirty="0"/>
+          <a:endParaRPr lang="en-US" sz="1500" kern="1200" dirty="0"/>
         </a:p>
       </dsp:txBody>
       <dsp:txXfrm>
@@ -18034,7 +18034,7 @@
 
 <file path=ppt/slideLayouts/slideLayout1.xml><?xml version="1.0" encoding="utf-8"?>
 <p:sldLayout xmlns:a="http://schemas.openxmlformats.org/drawingml/2006/main" xmlns:r="http://schemas.openxmlformats.org/officeDocument/2006/relationships" xmlns:p="http://schemas.openxmlformats.org/presentationml/2006/main" type="title" preserve="1">
-  <p:cSld name="Title Slide">
+  <p:cSld name="标题幻灯片">
     <p:spTree>
       <p:nvGrpSpPr>
         <p:cNvPr id="1" name=""/>
@@ -18061,19 +18061,25 @@
         </p:nvSpPr>
         <p:spPr>
           <a:xfrm>
-            <a:off x="685800" y="2130425"/>
-            <a:ext cx="7772400" cy="1470025"/>
+            <a:off x="685800" y="1371600"/>
+            <a:ext cx="7848600" cy="1927225"/>
           </a:xfrm>
         </p:spPr>
         <p:txBody>
-          <a:bodyPr/>
-          <a:lstStyle/>
+          <a:bodyPr anchor="b">
+            <a:noAutofit/>
+          </a:bodyPr>
+          <a:lstStyle>
+            <a:lvl1pPr>
+              <a:defRPr sz="5400" cap="all" baseline="0"/>
+            </a:lvl1pPr>
+          </a:lstStyle>
           <a:p>
             <a:r>
-              <a:rPr lang="en-US" smtClean="0"/>
-              <a:t>Click to edit Master title style</a:t>
-            </a:r>
-            <a:endParaRPr lang="en-US"/>
+              <a:rPr lang="zh-CN" altLang="x-none" smtClean="0"/>
+              <a:t>单击此处编辑母版标题样式</a:t>
+            </a:r>
+            <a:endParaRPr lang="en-US" dirty="0"/>
           </a:p>
         </p:txBody>
       </p:sp>
@@ -18089,19 +18095,20 @@
         </p:nvSpPr>
         <p:spPr>
           <a:xfrm>
-            <a:off x="1371600" y="3886200"/>
+            <a:off x="685800" y="3505200"/>
             <a:ext cx="6400800" cy="1752600"/>
           </a:xfrm>
         </p:spPr>
         <p:txBody>
           <a:bodyPr/>
           <a:lstStyle>
-            <a:lvl1pPr marL="0" indent="0" algn="ctr">
+            <a:lvl1pPr marL="0" indent="0" algn="l">
               <a:buNone/>
               <a:defRPr>
                 <a:solidFill>
                   <a:schemeClr val="tx1">
-                    <a:tint val="75000"/>
+                    <a:lumMod val="75000"/>
+                    <a:lumOff val="25000"/>
                   </a:schemeClr>
                 </a:solidFill>
               </a:defRPr>
@@ -18189,10 +18196,10 @@
           </a:lstStyle>
           <a:p>
             <a:r>
-              <a:rPr lang="en-US" smtClean="0"/>
-              <a:t>Click to edit Master subtitle style</a:t>
-            </a:r>
-            <a:endParaRPr lang="en-US"/>
+              <a:rPr lang="zh-CN" altLang="x-none" smtClean="0"/>
+              <a:t>单击此处编辑母版副标题样式</a:t>
+            </a:r>
+            <a:endParaRPr lang="en-US" dirty="0"/>
           </a:p>
         </p:txBody>
       </p:sp>
@@ -18263,6 +18270,41 @@
           </a:p>
         </p:txBody>
       </p:sp>
+      <p:cxnSp>
+        <p:nvCxnSpPr>
+          <p:cNvPr id="8" name="Straight Connector 7"/>
+          <p:cNvCxnSpPr/>
+          <p:nvPr/>
+        </p:nvCxnSpPr>
+        <p:spPr>
+          <a:xfrm>
+            <a:off x="685800" y="3398520"/>
+            <a:ext cx="7848600" cy="1588"/>
+          </a:xfrm>
+          <a:prstGeom prst="line">
+            <a:avLst/>
+          </a:prstGeom>
+          <a:ln w="19050">
+            <a:solidFill>
+              <a:schemeClr val="tx2"/>
+            </a:solidFill>
+          </a:ln>
+        </p:spPr>
+        <p:style>
+          <a:lnRef idx="1">
+            <a:schemeClr val="accent1"/>
+          </a:lnRef>
+          <a:fillRef idx="0">
+            <a:schemeClr val="accent1"/>
+          </a:fillRef>
+          <a:effectRef idx="0">
+            <a:schemeClr val="accent1"/>
+          </a:effectRef>
+          <a:fontRef idx="minor">
+            <a:schemeClr val="tx1"/>
+          </a:fontRef>
+        </p:style>
+      </p:cxnSp>
     </p:spTree>
   </p:cSld>
   <p:clrMapOvr>
@@ -18273,7 +18315,7 @@
 
 <file path=ppt/slideLayouts/slideLayout10.xml><?xml version="1.0" encoding="utf-8"?>
 <p:sldLayout xmlns:a="http://schemas.openxmlformats.org/drawingml/2006/main" xmlns:r="http://schemas.openxmlformats.org/officeDocument/2006/relationships" xmlns:p="http://schemas.openxmlformats.org/presentationml/2006/main" type="vertTx" preserve="1">
-  <p:cSld name="Title and Vertical Text">
+  <p:cSld name="标题和竖排文本">
     <p:spTree>
       <p:nvGrpSpPr>
         <p:cNvPr id="1" name=""/>
@@ -18304,8 +18346,8 @@
           <a:lstStyle/>
           <a:p>
             <a:r>
-              <a:rPr lang="en-US" smtClean="0"/>
-              <a:t>Click to edit Master title style</a:t>
+              <a:rPr lang="zh-CN" altLang="x-none" smtClean="0"/>
+              <a:t>单击此处编辑母版标题样式</a:t>
             </a:r>
             <a:endParaRPr lang="en-US"/>
           </a:p>
@@ -18328,36 +18370,36 @@
           <a:p>
             <a:pPr lvl="0"/>
             <a:r>
-              <a:rPr lang="en-US" smtClean="0"/>
-              <a:t>Click to edit Master text styles</a:t>
+              <a:rPr lang="zh-CN" altLang="x-none" smtClean="0"/>
+              <a:t>单击此处编辑母版文本样式</a:t>
             </a:r>
           </a:p>
           <a:p>
             <a:pPr lvl="1"/>
             <a:r>
-              <a:rPr lang="en-US" smtClean="0"/>
-              <a:t>Second level</a:t>
+              <a:rPr lang="zh-CN" altLang="x-none" smtClean="0"/>
+              <a:t>二级</a:t>
             </a:r>
           </a:p>
           <a:p>
             <a:pPr lvl="2"/>
             <a:r>
-              <a:rPr lang="en-US" smtClean="0"/>
-              <a:t>Third level</a:t>
+              <a:rPr lang="zh-CN" altLang="x-none" smtClean="0"/>
+              <a:t>三级</a:t>
             </a:r>
           </a:p>
           <a:p>
             <a:pPr lvl="3"/>
             <a:r>
-              <a:rPr lang="en-US" smtClean="0"/>
-              <a:t>Fourth level</a:t>
+              <a:rPr lang="zh-CN" altLang="x-none" smtClean="0"/>
+              <a:t>四级</a:t>
             </a:r>
           </a:p>
           <a:p>
             <a:pPr lvl="4"/>
             <a:r>
-              <a:rPr lang="en-US" smtClean="0"/>
-              <a:t>Fifth level</a:t>
+              <a:rPr lang="zh-CN" altLang="x-none" smtClean="0"/>
+              <a:t>五级</a:t>
             </a:r>
             <a:endParaRPr lang="en-US"/>
           </a:p>
@@ -18440,7 +18482,7 @@
 
 <file path=ppt/slideLayouts/slideLayout11.xml><?xml version="1.0" encoding="utf-8"?>
 <p:sldLayout xmlns:a="http://schemas.openxmlformats.org/drawingml/2006/main" xmlns:r="http://schemas.openxmlformats.org/officeDocument/2006/relationships" xmlns:p="http://schemas.openxmlformats.org/presentationml/2006/main" type="vertTitleAndTx" preserve="1">
-  <p:cSld name="Vertical Title and Text">
+  <p:cSld name="竖排标题和文本">
     <p:spTree>
       <p:nvGrpSpPr>
         <p:cNvPr id="1" name=""/>
@@ -18467,19 +18509,19 @@
         </p:nvSpPr>
         <p:spPr>
           <a:xfrm>
-            <a:off x="6629400" y="274638"/>
-            <a:ext cx="2057400" cy="5851525"/>
+            <a:off x="6629400" y="609600"/>
+            <a:ext cx="2057400" cy="5867400"/>
           </a:xfrm>
         </p:spPr>
         <p:txBody>
-          <a:bodyPr vert="eaVert"/>
+          <a:bodyPr vert="eaVert" anchor="b"/>
           <a:lstStyle/>
           <a:p>
             <a:r>
-              <a:rPr lang="en-US" smtClean="0"/>
-              <a:t>Click to edit Master title style</a:t>
-            </a:r>
-            <a:endParaRPr lang="en-US"/>
+              <a:rPr lang="zh-CN" altLang="x-none" smtClean="0"/>
+              <a:t>单击此处编辑母版标题样式</a:t>
+            </a:r>
+            <a:endParaRPr lang="en-US" dirty="0"/>
           </a:p>
         </p:txBody>
       </p:sp>
@@ -18495,8 +18537,8 @@
         </p:nvSpPr>
         <p:spPr>
           <a:xfrm>
-            <a:off x="457200" y="274638"/>
-            <a:ext cx="6019800" cy="5851525"/>
+            <a:off x="457200" y="609600"/>
+            <a:ext cx="6019800" cy="5867400"/>
           </a:xfrm>
         </p:spPr>
         <p:txBody>
@@ -18505,38 +18547,38 @@
           <a:p>
             <a:pPr lvl="0"/>
             <a:r>
-              <a:rPr lang="en-US" smtClean="0"/>
-              <a:t>Click to edit Master text styles</a:t>
+              <a:rPr lang="zh-CN" altLang="x-none" smtClean="0"/>
+              <a:t>单击此处编辑母版文本样式</a:t>
             </a:r>
           </a:p>
           <a:p>
             <a:pPr lvl="1"/>
             <a:r>
-              <a:rPr lang="en-US" smtClean="0"/>
-              <a:t>Second level</a:t>
+              <a:rPr lang="zh-CN" altLang="x-none" smtClean="0"/>
+              <a:t>二级</a:t>
             </a:r>
           </a:p>
           <a:p>
             <a:pPr lvl="2"/>
             <a:r>
-              <a:rPr lang="en-US" smtClean="0"/>
-              <a:t>Third level</a:t>
+              <a:rPr lang="zh-CN" altLang="x-none" smtClean="0"/>
+              <a:t>三级</a:t>
             </a:r>
           </a:p>
           <a:p>
             <a:pPr lvl="3"/>
             <a:r>
-              <a:rPr lang="en-US" smtClean="0"/>
-              <a:t>Fourth level</a:t>
+              <a:rPr lang="zh-CN" altLang="x-none" smtClean="0"/>
+              <a:t>四级</a:t>
             </a:r>
           </a:p>
           <a:p>
             <a:pPr lvl="4"/>
             <a:r>
-              <a:rPr lang="en-US" smtClean="0"/>
-              <a:t>Fifth level</a:t>
-            </a:r>
-            <a:endParaRPr lang="en-US"/>
+              <a:rPr lang="zh-CN" altLang="x-none" smtClean="0"/>
+              <a:t>五级</a:t>
+            </a:r>
+            <a:endParaRPr lang="en-US" dirty="0"/>
           </a:p>
         </p:txBody>
       </p:sp>
@@ -18617,7 +18659,7 @@
 
 <file path=ppt/slideLayouts/slideLayout2.xml><?xml version="1.0" encoding="utf-8"?>
 <p:sldLayout xmlns:a="http://schemas.openxmlformats.org/drawingml/2006/main" xmlns:r="http://schemas.openxmlformats.org/officeDocument/2006/relationships" xmlns:p="http://schemas.openxmlformats.org/presentationml/2006/main" type="obj" preserve="1">
-  <p:cSld name="Title and Content">
+  <p:cSld name="标题和内容">
     <p:spTree>
       <p:nvGrpSpPr>
         <p:cNvPr id="1" name=""/>
@@ -18648,8 +18690,8 @@
           <a:lstStyle/>
           <a:p>
             <a:r>
-              <a:rPr lang="en-US" smtClean="0"/>
-              <a:t>Click to edit Master title style</a:t>
+              <a:rPr lang="zh-CN" altLang="x-none" smtClean="0"/>
+              <a:t>单击此处编辑母版标题样式</a:t>
             </a:r>
             <a:endParaRPr lang="en-US"/>
           </a:p>
@@ -18672,36 +18714,36 @@
           <a:p>
             <a:pPr lvl="0"/>
             <a:r>
-              <a:rPr lang="en-US" smtClean="0"/>
-              <a:t>Click to edit Master text styles</a:t>
+              <a:rPr lang="zh-CN" altLang="x-none" smtClean="0"/>
+              <a:t>单击此处编辑母版文本样式</a:t>
             </a:r>
           </a:p>
           <a:p>
             <a:pPr lvl="1"/>
             <a:r>
-              <a:rPr lang="en-US" smtClean="0"/>
-              <a:t>Second level</a:t>
+              <a:rPr lang="zh-CN" altLang="x-none" smtClean="0"/>
+              <a:t>二级</a:t>
             </a:r>
           </a:p>
           <a:p>
             <a:pPr lvl="2"/>
             <a:r>
-              <a:rPr lang="en-US" smtClean="0"/>
-              <a:t>Third level</a:t>
+              <a:rPr lang="zh-CN" altLang="x-none" smtClean="0"/>
+              <a:t>三级</a:t>
             </a:r>
           </a:p>
           <a:p>
             <a:pPr lvl="3"/>
             <a:r>
-              <a:rPr lang="en-US" smtClean="0"/>
-              <a:t>Fourth level</a:t>
+              <a:rPr lang="zh-CN" altLang="x-none" smtClean="0"/>
+              <a:t>四级</a:t>
             </a:r>
           </a:p>
           <a:p>
             <a:pPr lvl="4"/>
             <a:r>
-              <a:rPr lang="en-US" smtClean="0"/>
-              <a:t>Fifth level</a:t>
+              <a:rPr lang="zh-CN" altLang="x-none" smtClean="0"/>
+              <a:t>五级</a:t>
             </a:r>
             <a:endParaRPr lang="en-US"/>
           </a:p>
@@ -18784,7 +18826,12 @@
 
 <file path=ppt/slideLayouts/slideLayout3.xml><?xml version="1.0" encoding="utf-8"?>
 <p:sldLayout xmlns:a="http://schemas.openxmlformats.org/drawingml/2006/main" xmlns:r="http://schemas.openxmlformats.org/officeDocument/2006/relationships" xmlns:p="http://schemas.openxmlformats.org/presentationml/2006/main" type="secHead" preserve="1">
-  <p:cSld name="Section Header">
+  <p:cSld name="节标题">
+    <p:bg>
+      <p:bgRef idx="1001">
+        <a:schemeClr val="bg2"/>
+      </p:bgRef>
+    </p:bg>
     <p:spTree>
       <p:nvGrpSpPr>
         <p:cNvPr id="1" name=""/>
@@ -18811,23 +18858,25 @@
         </p:nvSpPr>
         <p:spPr>
           <a:xfrm>
-            <a:off x="722313" y="4406900"/>
-            <a:ext cx="7772400" cy="1362075"/>
+            <a:off x="722313" y="2362200"/>
+            <a:ext cx="7772400" cy="2200275"/>
           </a:xfrm>
         </p:spPr>
         <p:txBody>
-          <a:bodyPr anchor="t"/>
+          <a:bodyPr anchor="b">
+            <a:normAutofit/>
+          </a:bodyPr>
           <a:lstStyle>
             <a:lvl1pPr algn="l">
-              <a:defRPr sz="4000" b="1" cap="all"/>
+              <a:defRPr sz="4800" b="0" cap="all"/>
             </a:lvl1pPr>
           </a:lstStyle>
           <a:p>
             <a:r>
-              <a:rPr lang="en-US" smtClean="0"/>
-              <a:t>Click to edit Master title style</a:t>
-            </a:r>
-            <a:endParaRPr lang="en-US"/>
+              <a:rPr lang="zh-CN" altLang="x-none" smtClean="0"/>
+              <a:t>单击此处编辑母版标题样式</a:t>
+            </a:r>
+            <a:endParaRPr lang="en-US" dirty="0"/>
           </a:p>
         </p:txBody>
       </p:sp>
@@ -18843,20 +18892,20 @@
         </p:nvSpPr>
         <p:spPr>
           <a:xfrm>
-            <a:off x="722313" y="2906713"/>
+            <a:off x="722313" y="4626864"/>
             <a:ext cx="7772400" cy="1500187"/>
           </a:xfrm>
         </p:spPr>
         <p:txBody>
-          <a:bodyPr anchor="b"/>
+          <a:bodyPr anchor="t">
+            <a:normAutofit/>
+          </a:bodyPr>
           <a:lstStyle>
             <a:lvl1pPr marL="0" indent="0">
               <a:buNone/>
-              <a:defRPr sz="2000">
+              <a:defRPr sz="2400">
                 <a:solidFill>
-                  <a:schemeClr val="tx1">
-                    <a:tint val="75000"/>
-                  </a:schemeClr>
+                  <a:schemeClr val="tx2"/>
                 </a:solidFill>
               </a:defRPr>
             </a:lvl1pPr>
@@ -18944,8 +18993,8 @@
           <a:p>
             <a:pPr lvl="0"/>
             <a:r>
-              <a:rPr lang="en-US" smtClean="0"/>
-              <a:t>Click to edit Master text styles</a:t>
+              <a:rPr lang="zh-CN" altLang="x-none" smtClean="0"/>
+              <a:t>单击此处编辑母版文本样式</a:t>
             </a:r>
           </a:p>
         </p:txBody>
@@ -19017,17 +19066,52 @@
           </a:p>
         </p:txBody>
       </p:sp>
+      <p:cxnSp>
+        <p:nvCxnSpPr>
+          <p:cNvPr id="7" name="Straight Connector 6"/>
+          <p:cNvCxnSpPr/>
+          <p:nvPr/>
+        </p:nvCxnSpPr>
+        <p:spPr>
+          <a:xfrm>
+            <a:off x="731520" y="4599432"/>
+            <a:ext cx="7848600" cy="1588"/>
+          </a:xfrm>
+          <a:prstGeom prst="line">
+            <a:avLst/>
+          </a:prstGeom>
+          <a:ln w="19050">
+            <a:solidFill>
+              <a:schemeClr val="tx2"/>
+            </a:solidFill>
+          </a:ln>
+        </p:spPr>
+        <p:style>
+          <a:lnRef idx="1">
+            <a:schemeClr val="accent1"/>
+          </a:lnRef>
+          <a:fillRef idx="0">
+            <a:schemeClr val="accent1"/>
+          </a:fillRef>
+          <a:effectRef idx="0">
+            <a:schemeClr val="accent1"/>
+          </a:effectRef>
+          <a:fontRef idx="minor">
+            <a:schemeClr val="tx1"/>
+          </a:fontRef>
+        </p:style>
+      </p:cxnSp>
     </p:spTree>
   </p:cSld>
   <p:clrMapOvr>
-    <a:masterClrMapping/>
+    <a:overrideClrMapping bg1="dk1" tx1="lt1" bg2="dk2" tx2="lt2" accent1="accent1" accent2="accent2" accent3="accent3" accent4="accent4" accent5="accent5" accent6="accent6" hlink="hlink" folHlink="folHlink"/>
   </p:clrMapOvr>
 </p:sldLayout>
 </file>
 
 <file path=ppt/slideLayouts/slideLayout4.xml><?xml version="1.0" encoding="utf-8"?>
 <p:sldLayout xmlns:a="http://schemas.openxmlformats.org/drawingml/2006/main" xmlns:r="http://schemas.openxmlformats.org/officeDocument/2006/relationships" xmlns:p="http://schemas.openxmlformats.org/presentationml/2006/main" type="twoObj" preserve="1">
-  <p:cSld name="Two Content">
+  <p:cSld name="两项内容">
     <p:spTree>
       <p:nvGrpSpPr>
         <p:cNvPr id="1" name=""/>
@@ -19058,8 +19142,8 @@
           <a:lstStyle/>
           <a:p>
             <a:r>
-              <a:rPr lang="en-US" smtClean="0"/>
-              <a:t>Click to edit Master title style</a:t>
+              <a:rPr lang="zh-CN" altLang="x-none" smtClean="0"/>
+              <a:t>单击此处编辑母版标题样式</a:t>
             </a:r>
             <a:endParaRPr lang="en-US"/>
           </a:p>
@@ -19077,8 +19161,8 @@
         </p:nvSpPr>
         <p:spPr>
           <a:xfrm>
-            <a:off x="457200" y="1600200"/>
-            <a:ext cx="4038600" cy="4525963"/>
+            <a:off x="457200" y="1673352"/>
+            <a:ext cx="4038600" cy="4718304"/>
           </a:xfrm>
         </p:spPr>
         <p:txBody>
@@ -19115,38 +19199,38 @@
           <a:p>
             <a:pPr lvl="0"/>
             <a:r>
-              <a:rPr lang="en-US" smtClean="0"/>
-              <a:t>Click to edit Master text styles</a:t>
+              <a:rPr lang="zh-CN" altLang="x-none" smtClean="0"/>
+              <a:t>单击此处编辑母版文本样式</a:t>
             </a:r>
           </a:p>
           <a:p>
             <a:pPr lvl="1"/>
             <a:r>
-              <a:rPr lang="en-US" smtClean="0"/>
-              <a:t>Second level</a:t>
+              <a:rPr lang="zh-CN" altLang="x-none" smtClean="0"/>
+              <a:t>二级</a:t>
             </a:r>
           </a:p>
           <a:p>
             <a:pPr lvl="2"/>
             <a:r>
-              <a:rPr lang="en-US" smtClean="0"/>
-              <a:t>Third level</a:t>
+              <a:rPr lang="zh-CN" altLang="x-none" smtClean="0"/>
+              <a:t>三级</a:t>
             </a:r>
           </a:p>
           <a:p>
             <a:pPr lvl="3"/>
             <a:r>
-              <a:rPr lang="en-US" smtClean="0"/>
-              <a:t>Fourth level</a:t>
+              <a:rPr lang="zh-CN" altLang="x-none" smtClean="0"/>
+              <a:t>四级</a:t>
             </a:r>
           </a:p>
           <a:p>
             <a:pPr lvl="4"/>
             <a:r>
-              <a:rPr lang="en-US" smtClean="0"/>
-              <a:t>Fifth level</a:t>
-            </a:r>
-            <a:endParaRPr lang="en-US"/>
+              <a:rPr lang="zh-CN" altLang="x-none" smtClean="0"/>
+              <a:t>五级</a:t>
+            </a:r>
+            <a:endParaRPr lang="en-US" dirty="0"/>
           </a:p>
         </p:txBody>
       </p:sp>
@@ -19162,8 +19246,8 @@
         </p:nvSpPr>
         <p:spPr>
           <a:xfrm>
-            <a:off x="4648200" y="1600200"/>
-            <a:ext cx="4038600" cy="4525963"/>
+            <a:off x="4648200" y="1673352"/>
+            <a:ext cx="4038600" cy="4718304"/>
           </a:xfrm>
         </p:spPr>
         <p:txBody>
@@ -19200,38 +19284,38 @@
           <a:p>
             <a:pPr lvl="0"/>
             <a:r>
-              <a:rPr lang="en-US" smtClean="0"/>
-              <a:t>Click to edit Master text styles</a:t>
+              <a:rPr lang="zh-CN" altLang="x-none" smtClean="0"/>
+              <a:t>单击此处编辑母版文本样式</a:t>
             </a:r>
           </a:p>
           <a:p>
             <a:pPr lvl="1"/>
             <a:r>
-              <a:rPr lang="en-US" smtClean="0"/>
-              <a:t>Second level</a:t>
+              <a:rPr lang="zh-CN" altLang="x-none" smtClean="0"/>
+              <a:t>二级</a:t>
             </a:r>
           </a:p>
           <a:p>
             <a:pPr lvl="2"/>
             <a:r>
-              <a:rPr lang="en-US" smtClean="0"/>
-              <a:t>Third level</a:t>
+              <a:rPr lang="zh-CN" altLang="x-none" smtClean="0"/>
+              <a:t>三级</a:t>
             </a:r>
           </a:p>
           <a:p>
             <a:pPr lvl="3"/>
             <a:r>
-              <a:rPr lang="en-US" smtClean="0"/>
-              <a:t>Fourth level</a:t>
+              <a:rPr lang="zh-CN" altLang="x-none" smtClean="0"/>
+              <a:t>四级</a:t>
             </a:r>
           </a:p>
           <a:p>
             <a:pPr lvl="4"/>
             <a:r>
-              <a:rPr lang="en-US" smtClean="0"/>
-              <a:t>Fifth level</a:t>
-            </a:r>
-            <a:endParaRPr lang="en-US"/>
+              <a:rPr lang="zh-CN" altLang="x-none" smtClean="0"/>
+              <a:t>五级</a:t>
+            </a:r>
+            <a:endParaRPr lang="en-US" dirty="0"/>
           </a:p>
         </p:txBody>
       </p:sp>
@@ -19312,7 +19396,7 @@
 
 <file path=ppt/slideLayouts/slideLayout5.xml><?xml version="1.0" encoding="utf-8"?>
 <p:sldLayout xmlns:a="http://schemas.openxmlformats.org/drawingml/2006/main" xmlns:r="http://schemas.openxmlformats.org/officeDocument/2006/relationships" xmlns:p="http://schemas.openxmlformats.org/presentationml/2006/main" type="twoTxTwoObj" preserve="1">
-  <p:cSld name="Comparison">
+  <p:cSld name="比较">
     <p:spTree>
       <p:nvGrpSpPr>
         <p:cNvPr id="1" name=""/>
@@ -19347,10 +19431,10 @@
           </a:lstStyle>
           <a:p>
             <a:r>
-              <a:rPr lang="en-US" smtClean="0"/>
-              <a:t>Click to edit Master title style</a:t>
-            </a:r>
-            <a:endParaRPr lang="en-US"/>
+              <a:rPr lang="zh-CN" altLang="x-none" smtClean="0"/>
+              <a:t>单击此处编辑母版标题样式</a:t>
+            </a:r>
+            <a:endParaRPr lang="en-US" dirty="0"/>
           </a:p>
         </p:txBody>
       </p:sp>
@@ -19366,16 +19450,39 @@
         </p:nvSpPr>
         <p:spPr>
           <a:xfrm>
-            <a:off x="457200" y="1535113"/>
-            <a:ext cx="4040188" cy="639762"/>
+            <a:off x="457200" y="1676400"/>
+            <a:ext cx="3931920" cy="639762"/>
           </a:xfrm>
+          <a:noFill/>
+          <a:ln>
+            <a:noFill/>
+          </a:ln>
+          <a:effectLst/>
         </p:spPr>
+        <p:style>
+          <a:lnRef idx="3">
+            <a:schemeClr val="lt1"/>
+          </a:lnRef>
+          <a:fillRef idx="1">
+            <a:schemeClr val="accent2"/>
+          </a:fillRef>
+          <a:effectRef idx="1">
+            <a:schemeClr val="accent2"/>
+          </a:effectRef>
+          <a:fontRef idx="none"/>
+        </p:style>
         <p:txBody>
-          <a:bodyPr anchor="b"/>
+          <a:bodyPr anchor="ctr">
+            <a:normAutofit/>
+          </a:bodyPr>
           <a:lstStyle>
-            <a:lvl1pPr marL="0" indent="0">
+            <a:lvl1pPr marL="0" indent="0" algn="ctr">
               <a:buNone/>
-              <a:defRPr sz="2400" b="1"/>
+              <a:defRPr sz="2000" b="0">
+                <a:solidFill>
+                  <a:schemeClr val="tx2"/>
+                </a:solidFill>
+              </a:defRPr>
             </a:lvl1pPr>
             <a:lvl2pPr marL="457200" indent="0">
               <a:buNone/>
@@ -19413,8 +19520,8 @@
           <a:p>
             <a:pPr lvl="0"/>
             <a:r>
-              <a:rPr lang="en-US" smtClean="0"/>
-              <a:t>Click to edit Master text styles</a:t>
+              <a:rPr lang="zh-CN" altLang="x-none" smtClean="0"/>
+              <a:t>单击此处编辑母版文本样式</a:t>
             </a:r>
           </a:p>
         </p:txBody>
@@ -19431,8 +19538,8 @@
         </p:nvSpPr>
         <p:spPr>
           <a:xfrm>
-            <a:off x="457200" y="2174875"/>
-            <a:ext cx="4040188" cy="3951288"/>
+            <a:off x="457200" y="2438400"/>
+            <a:ext cx="3931920" cy="3951288"/>
           </a:xfrm>
         </p:spPr>
         <p:txBody>
@@ -19469,38 +19576,38 @@
           <a:p>
             <a:pPr lvl="0"/>
             <a:r>
-              <a:rPr lang="en-US" smtClean="0"/>
-              <a:t>Click to edit Master text styles</a:t>
+              <a:rPr lang="zh-CN" altLang="x-none" smtClean="0"/>
+              <a:t>单击此处编辑母版文本样式</a:t>
             </a:r>
           </a:p>
           <a:p>
             <a:pPr lvl="1"/>
             <a:r>
-              <a:rPr lang="en-US" smtClean="0"/>
-              <a:t>Second level</a:t>
+              <a:rPr lang="zh-CN" altLang="x-none" smtClean="0"/>
+              <a:t>二级</a:t>
             </a:r>
           </a:p>
           <a:p>
             <a:pPr lvl="2"/>
             <a:r>
-              <a:rPr lang="en-US" smtClean="0"/>
-              <a:t>Third level</a:t>
+              <a:rPr lang="zh-CN" altLang="x-none" smtClean="0"/>
+              <a:t>三级</a:t>
             </a:r>
           </a:p>
           <a:p>
             <a:pPr lvl="3"/>
             <a:r>
-              <a:rPr lang="en-US" smtClean="0"/>
-              <a:t>Fourth level</a:t>
+              <a:rPr lang="zh-CN" altLang="x-none" smtClean="0"/>
+              <a:t>四级</a:t>
             </a:r>
           </a:p>
           <a:p>
             <a:pPr lvl="4"/>
             <a:r>
-              <a:rPr lang="en-US" smtClean="0"/>
-              <a:t>Fifth level</a:t>
-            </a:r>
-            <a:endParaRPr lang="en-US"/>
+              <a:rPr lang="zh-CN" altLang="x-none" smtClean="0"/>
+              <a:t>五级</a:t>
+            </a:r>
+            <a:endParaRPr lang="en-US" dirty="0"/>
           </a:p>
         </p:txBody>
       </p:sp>
@@ -19516,16 +19623,42 @@
         </p:nvSpPr>
         <p:spPr>
           <a:xfrm>
-            <a:off x="4645025" y="1535113"/>
-            <a:ext cx="4041775" cy="639762"/>
+            <a:off x="4754880" y="1676400"/>
+            <a:ext cx="3931920" cy="639762"/>
           </a:xfrm>
+          <a:noFill/>
+          <a:ln>
+            <a:noFill/>
+          </a:ln>
+          <a:effectLst/>
         </p:spPr>
+        <p:style>
+          <a:lnRef idx="3">
+            <a:schemeClr val="lt1"/>
+          </a:lnRef>
+          <a:fillRef idx="1">
+            <a:schemeClr val="accent2"/>
+          </a:fillRef>
+          <a:effectRef idx="1">
+            <a:schemeClr val="accent2"/>
+          </a:effectRef>
+          <a:fontRef idx="none"/>
+        </p:style>
         <p:txBody>
-          <a:bodyPr anchor="b"/>
+          <a:bodyPr anchor="ctr">
+            <a:normAutofit/>
+          </a:bodyPr>
           <a:lstStyle>
-            <a:lvl1pPr marL="0" indent="0">
+            <a:lvl1pPr marL="0" indent="0" algn="ctr">
               <a:buNone/>
-              <a:defRPr sz="2400" b="1"/>
+              <a:defRPr lang="en-US" sz="2000" b="0" kern="1200" dirty="0" smtClean="0">
+                <a:solidFill>
+                  <a:schemeClr val="tx2"/>
+                </a:solidFill>
+                <a:latin typeface="+mn-lt"/>
+                <a:ea typeface="+mn-ea"/>
+                <a:cs typeface="+mn-cs"/>
+              </a:defRPr>
             </a:lvl1pPr>
             <a:lvl2pPr marL="457200" indent="0">
               <a:buNone/>
@@ -19563,8 +19696,8 @@
           <a:p>
             <a:pPr lvl="0"/>
             <a:r>
-              <a:rPr lang="en-US" smtClean="0"/>
-              <a:t>Click to edit Master text styles</a:t>
+              <a:rPr lang="zh-CN" altLang="x-none" smtClean="0"/>
+              <a:t>单击此处编辑母版文本样式</a:t>
             </a:r>
           </a:p>
         </p:txBody>
@@ -19581,8 +19714,8 @@
         </p:nvSpPr>
         <p:spPr>
           <a:xfrm>
-            <a:off x="4645025" y="2174875"/>
-            <a:ext cx="4041775" cy="3951288"/>
+            <a:off x="4754880" y="2438400"/>
+            <a:ext cx="3931920" cy="3951288"/>
           </a:xfrm>
         </p:spPr>
         <p:txBody>
@@ -19619,38 +19752,38 @@
           <a:p>
             <a:pPr lvl="0"/>
             <a:r>
-              <a:rPr lang="en-US" smtClean="0"/>
-              <a:t>Click to edit Master text styles</a:t>
+              <a:rPr lang="zh-CN" altLang="x-none" smtClean="0"/>
+              <a:t>单击此处编辑母版文本样式</a:t>
             </a:r>
           </a:p>
           <a:p>
             <a:pPr lvl="1"/>
             <a:r>
-              <a:rPr lang="en-US" smtClean="0"/>
-              <a:t>Second level</a:t>
+              <a:rPr lang="zh-CN" altLang="x-none" smtClean="0"/>
+              <a:t>二级</a:t>
             </a:r>
           </a:p>
           <a:p>
             <a:pPr lvl="2"/>
             <a:r>
-              <a:rPr lang="en-US" smtClean="0"/>
-              <a:t>Third level</a:t>
+              <a:rPr lang="zh-CN" altLang="x-none" smtClean="0"/>
+              <a:t>三级</a:t>
             </a:r>
           </a:p>
           <a:p>
             <a:pPr lvl="3"/>
             <a:r>
-              <a:rPr lang="en-US" smtClean="0"/>
-              <a:t>Fourth level</a:t>
+              <a:rPr lang="zh-CN" altLang="x-none" smtClean="0"/>
+              <a:t>四级</a:t>
             </a:r>
           </a:p>
           <a:p>
             <a:pPr lvl="4"/>
             <a:r>
-              <a:rPr lang="en-US" smtClean="0"/>
-              <a:t>Fifth level</a:t>
-            </a:r>
-            <a:endParaRPr lang="en-US"/>
+              <a:rPr lang="zh-CN" altLang="x-none" smtClean="0"/>
+              <a:t>五级</a:t>
+            </a:r>
+            <a:endParaRPr lang="en-US" dirty="0"/>
           </a:p>
         </p:txBody>
       </p:sp>
@@ -19721,6 +19854,41 @@
           </a:p>
         </p:txBody>
       </p:sp>
+      <p:cxnSp>
+        <p:nvCxnSpPr>
+          <p:cNvPr id="11" name="Straight Connector 10"/>
+          <p:cNvCxnSpPr/>
+          <p:nvPr/>
+        </p:nvCxnSpPr>
+        <p:spPr>
+          <a:xfrm rot="5400000">
+            <a:off x="2217817" y="4045823"/>
+            <a:ext cx="4709160" cy="794"/>
+          </a:xfrm>
+          <a:prstGeom prst="line">
+            <a:avLst/>
+          </a:prstGeom>
+          <a:ln w="19050">
+            <a:solidFill>
+              <a:schemeClr val="tx2"/>
+            </a:solidFill>
+          </a:ln>
+        </p:spPr>
+        <p:style>
+          <a:lnRef idx="1">
+            <a:schemeClr val="accent1"/>
+          </a:lnRef>
+          <a:fillRef idx="0">
+            <a:schemeClr val="accent1"/>
+          </a:fillRef>
+          <a:effectRef idx="0">
+            <a:schemeClr val="accent1"/>
+          </a:effectRef>
+          <a:fontRef idx="minor">
+            <a:schemeClr val="tx1"/>
+          </a:fontRef>
+        </p:style>
+      </p:cxnSp>
     </p:spTree>
   </p:cSld>
   <p:clrMapOvr>
@@ -19731,7 +19899,7 @@
 
 <file path=ppt/slideLayouts/slideLayout6.xml><?xml version="1.0" encoding="utf-8"?>
 <p:sldLayout xmlns:a="http://schemas.openxmlformats.org/drawingml/2006/main" xmlns:r="http://schemas.openxmlformats.org/officeDocument/2006/relationships" xmlns:p="http://schemas.openxmlformats.org/presentationml/2006/main" type="titleOnly" preserve="1">
-  <p:cSld name="Title Only">
+  <p:cSld name="仅标题">
     <p:spTree>
       <p:nvGrpSpPr>
         <p:cNvPr id="1" name=""/>
@@ -19762,8 +19930,8 @@
           <a:lstStyle/>
           <a:p>
             <a:r>
-              <a:rPr lang="en-US" smtClean="0"/>
-              <a:t>Click to edit Master title style</a:t>
+              <a:rPr lang="zh-CN" altLang="x-none" smtClean="0"/>
+              <a:t>单击此处编辑母版标题样式</a:t>
             </a:r>
             <a:endParaRPr lang="en-US"/>
           </a:p>
@@ -19846,7 +20014,7 @@
 
 <file path=ppt/slideLayouts/slideLayout7.xml><?xml version="1.0" encoding="utf-8"?>
 <p:sldLayout xmlns:a="http://schemas.openxmlformats.org/drawingml/2006/main" xmlns:r="http://schemas.openxmlformats.org/officeDocument/2006/relationships" xmlns:p="http://schemas.openxmlformats.org/presentationml/2006/main" type="blank" preserve="1">
-  <p:cSld name="Blank">
+  <p:cSld name="空白">
     <p:spTree>
       <p:nvGrpSpPr>
         <p:cNvPr id="1" name=""/>
@@ -19938,7 +20106,7 @@
 
 <file path=ppt/slideLayouts/slideLayout8.xml><?xml version="1.0" encoding="utf-8"?>
 <p:sldLayout xmlns:a="http://schemas.openxmlformats.org/drawingml/2006/main" xmlns:r="http://schemas.openxmlformats.org/officeDocument/2006/relationships" xmlns:p="http://schemas.openxmlformats.org/presentationml/2006/main" type="objTx" preserve="1">
-  <p:cSld name="Content with Caption">
+  <p:cSld name="内容与标题">
     <p:spTree>
       <p:nvGrpSpPr>
         <p:cNvPr id="1" name=""/>
@@ -19965,23 +20133,25 @@
         </p:nvSpPr>
         <p:spPr>
           <a:xfrm>
-            <a:off x="457200" y="273050"/>
-            <a:ext cx="3008313" cy="1162050"/>
+            <a:off x="457200" y="792080"/>
+            <a:ext cx="2139696" cy="1261872"/>
           </a:xfrm>
         </p:spPr>
         <p:txBody>
-          <a:bodyPr anchor="b"/>
+          <a:bodyPr anchor="b">
+            <a:noAutofit/>
+          </a:bodyPr>
           <a:lstStyle>
             <a:lvl1pPr algn="l">
-              <a:defRPr sz="2000" b="1"/>
+              <a:defRPr sz="2400" b="0"/>
             </a:lvl1pPr>
           </a:lstStyle>
           <a:p>
             <a:r>
-              <a:rPr lang="en-US" smtClean="0"/>
-              <a:t>Click to edit Master title style</a:t>
-            </a:r>
-            <a:endParaRPr lang="en-US"/>
+              <a:rPr lang="zh-CN" altLang="x-none" smtClean="0"/>
+              <a:t>单击此处编辑母版标题样式</a:t>
+            </a:r>
+            <a:endParaRPr lang="en-US" dirty="0"/>
           </a:p>
         </p:txBody>
       </p:sp>
@@ -19997,8 +20167,8 @@
         </p:nvSpPr>
         <p:spPr>
           <a:xfrm>
-            <a:off x="3575050" y="273050"/>
-            <a:ext cx="5111750" cy="5853113"/>
+            <a:off x="2971800" y="792080"/>
+            <a:ext cx="5715000" cy="5577840"/>
           </a:xfrm>
         </p:spPr>
         <p:txBody>
@@ -20035,38 +20205,38 @@
           <a:p>
             <a:pPr lvl="0"/>
             <a:r>
-              <a:rPr lang="en-US" smtClean="0"/>
-              <a:t>Click to edit Master text styles</a:t>
+              <a:rPr lang="zh-CN" altLang="x-none" smtClean="0"/>
+              <a:t>单击此处编辑母版文本样式</a:t>
             </a:r>
           </a:p>
           <a:p>
             <a:pPr lvl="1"/>
             <a:r>
-              <a:rPr lang="en-US" smtClean="0"/>
-              <a:t>Second level</a:t>
+              <a:rPr lang="zh-CN" altLang="x-none" smtClean="0"/>
+              <a:t>二级</a:t>
             </a:r>
           </a:p>
           <a:p>
             <a:pPr lvl="2"/>
             <a:r>
-              <a:rPr lang="en-US" smtClean="0"/>
-              <a:t>Third level</a:t>
+              <a:rPr lang="zh-CN" altLang="x-none" smtClean="0"/>
+              <a:t>三级</a:t>
             </a:r>
           </a:p>
           <a:p>
             <a:pPr lvl="3"/>
             <a:r>
-              <a:rPr lang="en-US" smtClean="0"/>
-              <a:t>Fourth level</a:t>
+              <a:rPr lang="zh-CN" altLang="x-none" smtClean="0"/>
+              <a:t>四级</a:t>
             </a:r>
           </a:p>
           <a:p>
             <a:pPr lvl="4"/>
             <a:r>
-              <a:rPr lang="en-US" smtClean="0"/>
-              <a:t>Fifth level</a:t>
-            </a:r>
-            <a:endParaRPr lang="en-US"/>
+              <a:rPr lang="zh-CN" altLang="x-none" smtClean="0"/>
+              <a:t>五级</a:t>
+            </a:r>
+            <a:endParaRPr lang="en-US" dirty="0"/>
           </a:p>
         </p:txBody>
       </p:sp>
@@ -20082,8 +20252,8 @@
         </p:nvSpPr>
         <p:spPr>
           <a:xfrm>
-            <a:off x="457200" y="1435100"/>
-            <a:ext cx="3008313" cy="4691063"/>
+            <a:off x="457201" y="2130552"/>
+            <a:ext cx="2139696" cy="4243615"/>
           </a:xfrm>
         </p:spPr>
         <p:txBody>
@@ -20129,8 +20299,8 @@
           <a:p>
             <a:pPr lvl="0"/>
             <a:r>
-              <a:rPr lang="en-US" smtClean="0"/>
-              <a:t>Click to edit Master text styles</a:t>
+              <a:rPr lang="zh-CN" altLang="x-none" smtClean="0"/>
+              <a:t>单击此处编辑母版文本样式</a:t>
             </a:r>
           </a:p>
         </p:txBody>
@@ -20202,6 +20372,41 @@
           </a:p>
         </p:txBody>
       </p:sp>
+      <p:cxnSp>
+        <p:nvCxnSpPr>
+          <p:cNvPr id="9" name="Straight Connector 8"/>
+          <p:cNvCxnSpPr/>
+          <p:nvPr/>
+        </p:nvCxnSpPr>
+        <p:spPr>
+          <a:xfrm rot="5400000">
+            <a:off x="-13116" y="3580206"/>
+            <a:ext cx="5577840" cy="1588"/>
+          </a:xfrm>
+          <a:prstGeom prst="line">
+            <a:avLst/>
+          </a:prstGeom>
+          <a:ln w="19050">
+            <a:solidFill>
+              <a:schemeClr val="tx2"/>
+            </a:solidFill>
+          </a:ln>
+        </p:spPr>
+        <p:style>
+          <a:lnRef idx="1">
+            <a:schemeClr val="accent1"/>
+          </a:lnRef>
+          <a:fillRef idx="0">
+            <a:schemeClr val="accent1"/>
+          </a:fillRef>
+          <a:effectRef idx="0">
+            <a:schemeClr val="accent1"/>
+          </a:effectRef>
+          <a:fontRef idx="minor">
+            <a:schemeClr val="tx1"/>
+          </a:fontRef>
+        </p:style>
+      </p:cxnSp>
     </p:spTree>
   </p:cSld>
   <p:clrMapOvr>
@@ -20212,7 +20417,7 @@
 
 <file path=ppt/slideLayouts/slideLayout9.xml><?xml version="1.0" encoding="utf-8"?>
 <p:sldLayout xmlns:a="http://schemas.openxmlformats.org/drawingml/2006/main" xmlns:r="http://schemas.openxmlformats.org/officeDocument/2006/relationships" xmlns:p="http://schemas.openxmlformats.org/presentationml/2006/main" type="picTx" preserve="1">
-  <p:cSld name="Picture with Caption">
+  <p:cSld name="图片与标题">
     <p:spTree>
       <p:nvGrpSpPr>
         <p:cNvPr id="1" name=""/>
@@ -20239,23 +20444,25 @@
         </p:nvSpPr>
         <p:spPr>
           <a:xfrm>
-            <a:off x="1792288" y="4800600"/>
-            <a:ext cx="5486400" cy="566738"/>
+            <a:off x="457200" y="792480"/>
+            <a:ext cx="2142680" cy="1264920"/>
           </a:xfrm>
         </p:spPr>
         <p:txBody>
-          <a:bodyPr anchor="b"/>
+          <a:bodyPr anchor="b">
+            <a:normAutofit/>
+          </a:bodyPr>
           <a:lstStyle>
             <a:lvl1pPr algn="l">
-              <a:defRPr sz="2000" b="1"/>
+              <a:defRPr sz="2400" b="0"/>
             </a:lvl1pPr>
           </a:lstStyle>
           <a:p>
             <a:r>
-              <a:rPr lang="en-US" smtClean="0"/>
-              <a:t>Click to edit Master title style</a:t>
-            </a:r>
-            <a:endParaRPr lang="en-US"/>
+              <a:rPr lang="zh-CN" altLang="x-none" smtClean="0"/>
+              <a:t>单击此处编辑母版标题样式</a:t>
+            </a:r>
+            <a:endParaRPr lang="en-US" dirty="0"/>
           </a:p>
         </p:txBody>
       </p:sp>
@@ -20271,9 +20478,25 @@
         </p:nvSpPr>
         <p:spPr>
           <a:xfrm>
-            <a:off x="1792288" y="612775"/>
-            <a:ext cx="5486400" cy="4114800"/>
+            <a:off x="2858610" y="838201"/>
+            <a:ext cx="5904390" cy="5500456"/>
           </a:xfrm>
+          <a:solidFill>
+            <a:schemeClr val="bg2"/>
+          </a:solidFill>
+          <a:ln w="76200">
+            <a:solidFill>
+              <a:srgbClr val="FFFFFF"/>
+            </a:solidFill>
+            <a:miter lim="800000"/>
+          </a:ln>
+          <a:effectLst>
+            <a:outerShdw blurRad="50800" dist="12700" dir="5400000" algn="t" rotWithShape="0">
+              <a:prstClr val="black">
+                <a:alpha val="59000"/>
+              </a:prstClr>
+            </a:outerShdw>
+          </a:effectLst>
         </p:spPr>
         <p:txBody>
           <a:bodyPr/>
@@ -20316,7 +20539,11 @@
             </a:lvl9pPr>
           </a:lstStyle>
           <a:p>
-            <a:endParaRPr lang="en-US"/>
+            <a:r>
+              <a:rPr lang="zh-CN" altLang="x-none" smtClean="0"/>
+              <a:t>将图片拖动到占位符，或单击添加图标</a:t>
+            </a:r>
+            <a:endParaRPr lang="en-US" dirty="0"/>
           </a:p>
         </p:txBody>
       </p:sp>
@@ -20332,8 +20559,8 @@
         </p:nvSpPr>
         <p:spPr>
           <a:xfrm>
-            <a:off x="1792288" y="5367338"/>
-            <a:ext cx="5486400" cy="804862"/>
+            <a:off x="457200" y="2133600"/>
+            <a:ext cx="2139696" cy="4242816"/>
           </a:xfrm>
         </p:spPr>
         <p:txBody>
@@ -20379,8 +20606,8 @@
           <a:p>
             <a:pPr lvl="0"/>
             <a:r>
-              <a:rPr lang="en-US" smtClean="0"/>
-              <a:t>Click to edit Master text styles</a:t>
+              <a:rPr lang="zh-CN" altLang="x-none" smtClean="0"/>
+              <a:t>单击此处编辑母版文本样式</a:t>
             </a:r>
           </a:p>
         </p:txBody>
@@ -20484,6 +20711,52 @@
       </p:grpSpPr>
       <p:sp>
         <p:nvSpPr>
+          <p:cNvPr id="10" name="Rectangle 9"/>
+          <p:cNvSpPr/>
+          <p:nvPr/>
+        </p:nvSpPr>
+        <p:spPr>
+          <a:xfrm>
+            <a:off x="0" y="220786"/>
+            <a:ext cx="9144000" cy="228600"/>
+          </a:xfrm>
+          <a:prstGeom prst="rect">
+            <a:avLst/>
+          </a:prstGeom>
+          <a:solidFill>
+            <a:srgbClr val="FFFFFF"/>
+          </a:solidFill>
+          <a:ln>
+            <a:noFill/>
+          </a:ln>
+        </p:spPr>
+        <p:style>
+          <a:lnRef idx="2">
+            <a:schemeClr val="accent1">
+              <a:shade val="50000"/>
+            </a:schemeClr>
+          </a:lnRef>
+          <a:fillRef idx="1">
+            <a:schemeClr val="accent1"/>
+          </a:fillRef>
+          <a:effectRef idx="0">
+            <a:schemeClr val="accent1"/>
+          </a:effectRef>
+          <a:fontRef idx="minor">
+            <a:schemeClr val="lt1"/>
+          </a:fontRef>
+        </p:style>
+        <p:txBody>
+          <a:bodyPr rtlCol="0" anchor="ctr"/>
+          <a:lstStyle/>
+          <a:p>
+            <a:pPr algn="ctr"/>
+            <a:endParaRPr lang="en-US"/>
+          </a:p>
+        </p:txBody>
+      </p:sp>
+      <p:sp>
+        <p:nvSpPr>
           <p:cNvPr id="2" name="Title Placeholder 1"/>
           <p:cNvSpPr>
             <a:spLocks noGrp="1"/>
@@ -20494,8 +20767,8 @@
         </p:nvSpPr>
         <p:spPr>
           <a:xfrm>
-            <a:off x="457200" y="274638"/>
-            <a:ext cx="8229600" cy="1143000"/>
+            <a:off x="457200" y="533400"/>
+            <a:ext cx="8229600" cy="990600"/>
           </a:xfrm>
           <a:prstGeom prst="rect">
             <a:avLst/>
@@ -20508,10 +20781,10 @@
           <a:lstStyle/>
           <a:p>
             <a:r>
-              <a:rPr lang="en-US" smtClean="0"/>
-              <a:t>Click to edit Master title style</a:t>
-            </a:r>
-            <a:endParaRPr lang="en-US"/>
+              <a:rPr lang="zh-CN" altLang="x-none" smtClean="0"/>
+              <a:t>单击此处编辑母版标题样式</a:t>
+            </a:r>
+            <a:endParaRPr lang="en-US" dirty="0"/>
           </a:p>
         </p:txBody>
       </p:sp>
@@ -20528,7 +20801,7 @@
         <p:spPr>
           <a:xfrm>
             <a:off x="457200" y="1600200"/>
-            <a:ext cx="8229600" cy="4525963"/>
+            <a:ext cx="8229600" cy="4876800"/>
           </a:xfrm>
           <a:prstGeom prst="rect">
             <a:avLst/>
@@ -20542,37 +20815,83 @@
           <a:p>
             <a:pPr lvl="0"/>
             <a:r>
-              <a:rPr lang="en-US" smtClean="0"/>
-              <a:t>Click to edit Master text styles</a:t>
+              <a:rPr lang="zh-CN" altLang="x-none" smtClean="0"/>
+              <a:t>单击此处编辑母版文本样式</a:t>
             </a:r>
           </a:p>
           <a:p>
             <a:pPr lvl="1"/>
             <a:r>
-              <a:rPr lang="en-US" smtClean="0"/>
-              <a:t>Second level</a:t>
+              <a:rPr lang="zh-CN" altLang="x-none" smtClean="0"/>
+              <a:t>二级</a:t>
             </a:r>
           </a:p>
           <a:p>
             <a:pPr lvl="2"/>
             <a:r>
-              <a:rPr lang="en-US" smtClean="0"/>
-              <a:t>Third level</a:t>
+              <a:rPr lang="zh-CN" altLang="x-none" smtClean="0"/>
+              <a:t>三级</a:t>
             </a:r>
           </a:p>
           <a:p>
             <a:pPr lvl="3"/>
             <a:r>
-              <a:rPr lang="en-US" smtClean="0"/>
-              <a:t>Fourth level</a:t>
+              <a:rPr lang="zh-CN" altLang="x-none" smtClean="0"/>
+              <a:t>四级</a:t>
             </a:r>
           </a:p>
           <a:p>
             <a:pPr lvl="4"/>
             <a:r>
-              <a:rPr lang="en-US" smtClean="0"/>
-              <a:t>Fifth level</a:t>
-            </a:r>
+              <a:rPr lang="zh-CN" altLang="x-none" smtClean="0"/>
+              <a:t>五级</a:t>
+            </a:r>
+            <a:endParaRPr lang="en-US" dirty="0"/>
+          </a:p>
+        </p:txBody>
+      </p:sp>
+      <p:sp>
+        <p:nvSpPr>
+          <p:cNvPr id="7" name="Rectangle 6"/>
+          <p:cNvSpPr/>
+          <p:nvPr/>
+        </p:nvSpPr>
+        <p:spPr>
+          <a:xfrm>
+            <a:off x="0" y="0"/>
+            <a:ext cx="9144000" cy="365760"/>
+          </a:xfrm>
+          <a:prstGeom prst="rect">
+            <a:avLst/>
+          </a:prstGeom>
+          <a:solidFill>
+            <a:schemeClr val="accent1"/>
+          </a:solidFill>
+          <a:ln>
+            <a:noFill/>
+          </a:ln>
+        </p:spPr>
+        <p:style>
+          <a:lnRef idx="2">
+            <a:schemeClr val="accent1">
+              <a:shade val="50000"/>
+            </a:schemeClr>
+          </a:lnRef>
+          <a:fillRef idx="1">
+            <a:schemeClr val="accent1"/>
+          </a:fillRef>
+          <a:effectRef idx="0">
+            <a:schemeClr val="accent1"/>
+          </a:effectRef>
+          <a:fontRef idx="minor">
+            <a:schemeClr val="lt1"/>
+          </a:fontRef>
+        </p:style>
+        <p:txBody>
+          <a:bodyPr rtlCol="0" anchor="ctr"/>
+          <a:lstStyle/>
+          <a:p>
+            <a:pPr algn="ctr"/>
             <a:endParaRPr lang="en-US"/>
           </a:p>
         </p:txBody>
@@ -20589,8 +20908,8 @@
         </p:nvSpPr>
         <p:spPr>
           <a:xfrm>
-            <a:off x="457200" y="6356350"/>
-            <a:ext cx="2133600" cy="365125"/>
+            <a:off x="457200" y="18288"/>
+            <a:ext cx="2895600" cy="329184"/>
           </a:xfrm>
           <a:prstGeom prst="rect">
             <a:avLst/>
@@ -20602,9 +20921,7 @@
             <a:lvl1pPr algn="l">
               <a:defRPr sz="1200">
                 <a:solidFill>
-                  <a:schemeClr val="tx1">
-                    <a:tint val="75000"/>
-                  </a:schemeClr>
+                  <a:srgbClr val="FFFFFF"/>
                 </a:solidFill>
               </a:defRPr>
             </a:lvl1pPr>
@@ -20631,8 +20948,8 @@
         </p:nvSpPr>
         <p:spPr>
           <a:xfrm>
-            <a:off x="3124200" y="6356350"/>
-            <a:ext cx="2895600" cy="365125"/>
+            <a:off x="3429000" y="18288"/>
+            <a:ext cx="4114800" cy="329184"/>
           </a:xfrm>
           <a:prstGeom prst="rect">
             <a:avLst/>
@@ -20644,9 +20961,7 @@
             <a:lvl1pPr algn="ctr">
               <a:defRPr sz="1200">
                 <a:solidFill>
-                  <a:schemeClr val="tx1">
-                    <a:tint val="75000"/>
-                  </a:schemeClr>
+                  <a:srgbClr val="FFFFFF"/>
                 </a:solidFill>
               </a:defRPr>
             </a:lvl1pPr>
@@ -20668,8 +20983,8 @@
         </p:nvSpPr>
         <p:spPr>
           <a:xfrm>
-            <a:off x="6553200" y="6356350"/>
-            <a:ext cx="2133600" cy="365125"/>
+            <a:off x="7620000" y="18288"/>
+            <a:ext cx="1066800" cy="329184"/>
           </a:xfrm>
           <a:prstGeom prst="rect">
             <a:avLst/>
@@ -20678,12 +20993,10 @@
         <p:txBody>
           <a:bodyPr vert="horz" lIns="91440" tIns="45720" rIns="91440" bIns="45720" rtlCol="0" anchor="ctr"/>
           <a:lstStyle>
-            <a:lvl1pPr algn="r">
-              <a:defRPr sz="1200">
+            <a:lvl1pPr algn="l">
+              <a:defRPr sz="1400" b="1">
                 <a:solidFill>
-                  <a:schemeClr val="tx1">
-                    <a:tint val="75000"/>
-                  </a:schemeClr>
+                  <a:srgbClr val="FFFFFF"/>
                 </a:solidFill>
               </a:defRPr>
             </a:lvl1pPr>
@@ -20702,28 +21015,28 @@
   </p:cSld>
   <p:clrMap bg1="lt1" tx1="dk1" bg2="lt2" tx2="dk2" accent1="accent1" accent2="accent2" accent3="accent3" accent4="accent4" accent5="accent5" accent6="accent6" hlink="hlink" folHlink="folHlink"/>
   <p:sldLayoutIdLst>
-    <p:sldLayoutId id="2147483649" r:id="rId1"/>
-    <p:sldLayoutId id="2147483650" r:id="rId2"/>
-    <p:sldLayoutId id="2147483651" r:id="rId3"/>
-    <p:sldLayoutId id="2147483652" r:id="rId4"/>
-    <p:sldLayoutId id="2147483653" r:id="rId5"/>
-    <p:sldLayoutId id="2147483654" r:id="rId6"/>
-    <p:sldLayoutId id="2147483655" r:id="rId7"/>
-    <p:sldLayoutId id="2147483656" r:id="rId8"/>
-    <p:sldLayoutId id="2147483657" r:id="rId9"/>
-    <p:sldLayoutId id="2147483658" r:id="rId10"/>
-    <p:sldLayoutId id="2147483659" r:id="rId11"/>
+    <p:sldLayoutId id="2147483740" r:id="rId1"/>
+    <p:sldLayoutId id="2147483741" r:id="rId2"/>
+    <p:sldLayoutId id="2147483742" r:id="rId3"/>
+    <p:sldLayoutId id="2147483743" r:id="rId4"/>
+    <p:sldLayoutId id="2147483744" r:id="rId5"/>
+    <p:sldLayoutId id="2147483745" r:id="rId6"/>
+    <p:sldLayoutId id="2147483746" r:id="rId7"/>
+    <p:sldLayoutId id="2147483747" r:id="rId8"/>
+    <p:sldLayoutId id="2147483748" r:id="rId9"/>
+    <p:sldLayoutId id="2147483749" r:id="rId10"/>
+    <p:sldLayoutId id="2147483750" r:id="rId11"/>
   </p:sldLayoutIdLst>
   <p:txStyles>
     <p:titleStyle>
-      <a:lvl1pPr algn="ctr" defTabSz="914400" rtl="0" eaLnBrk="1" latinLnBrk="0" hangingPunct="1">
+      <a:lvl1pPr algn="l" defTabSz="914400" rtl="0" eaLnBrk="1" latinLnBrk="0" hangingPunct="1">
         <a:spcBef>
           <a:spcPct val="0"/>
         </a:spcBef>
         <a:buNone/>
-        <a:defRPr sz="4400" kern="1200">
+        <a:defRPr sz="4000" kern="1200" spc="-100" baseline="0">
           <a:solidFill>
-            <a:schemeClr val="tx1"/>
+            <a:schemeClr val="tx2"/>
           </a:solidFill>
           <a:latin typeface="+mj-lt"/>
           <a:ea typeface="+mj-ea"/>
@@ -20732,40 +21045,14 @@
       </a:lvl1pPr>
     </p:titleStyle>
     <p:bodyStyle>
-      <a:lvl1pPr marL="342900" indent="-342900" algn="l" defTabSz="914400" rtl="0" eaLnBrk="1" latinLnBrk="0" hangingPunct="1">
+      <a:lvl1pPr marL="182880" indent="-182880" algn="l" defTabSz="914400" rtl="0" eaLnBrk="1" latinLnBrk="0" hangingPunct="1">
         <a:spcBef>
           <a:spcPct val="20000"/>
         </a:spcBef>
-        <a:buFont typeface="Arial" pitchFamily="34" charset="0"/>
-        <a:buChar char="•"/>
-        <a:defRPr sz="3200" kern="1200">
-          <a:solidFill>
-            <a:schemeClr val="tx1"/>
-          </a:solidFill>
-          <a:latin typeface="+mn-lt"/>
-          <a:ea typeface="+mn-ea"/>
-          <a:cs typeface="+mn-cs"/>
-        </a:defRPr>
-      </a:lvl1pPr>
-      <a:lvl2pPr marL="742950" indent="-285750" algn="l" defTabSz="914400" rtl="0" eaLnBrk="1" latinLnBrk="0" hangingPunct="1">
-        <a:spcBef>
-          <a:spcPct val="20000"/>
-        </a:spcBef>
-        <a:buFont typeface="Arial" pitchFamily="34" charset="0"/>
-        <a:buChar char="–"/>
-        <a:defRPr sz="2800" kern="1200">
-          <a:solidFill>
-            <a:schemeClr val="tx1"/>
-          </a:solidFill>
-          <a:latin typeface="+mn-lt"/>
-          <a:ea typeface="+mn-ea"/>
-          <a:cs typeface="+mn-cs"/>
-        </a:defRPr>
-      </a:lvl2pPr>
-      <a:lvl3pPr marL="1143000" indent="-228600" algn="l" defTabSz="914400" rtl="0" eaLnBrk="1" latinLnBrk="0" hangingPunct="1">
-        <a:spcBef>
-          <a:spcPct val="20000"/>
-        </a:spcBef>
+        <a:buClr>
+          <a:schemeClr val="accent1"/>
+        </a:buClr>
+        <a:buSzPct val="85000"/>
         <a:buFont typeface="Arial" pitchFamily="34" charset="0"/>
         <a:buChar char="•"/>
         <a:defRPr sz="2400" kern="1200">
@@ -20776,41 +21063,15 @@
           <a:ea typeface="+mn-ea"/>
           <a:cs typeface="+mn-cs"/>
         </a:defRPr>
-      </a:lvl3pPr>
-      <a:lvl4pPr marL="1600200" indent="-228600" algn="l" defTabSz="914400" rtl="0" eaLnBrk="1" latinLnBrk="0" hangingPunct="1">
+      </a:lvl1pPr>
+      <a:lvl2pPr marL="457200" indent="-182880" algn="l" defTabSz="914400" rtl="0" eaLnBrk="1" latinLnBrk="0" hangingPunct="1">
         <a:spcBef>
           <a:spcPct val="20000"/>
         </a:spcBef>
-        <a:buFont typeface="Arial" pitchFamily="34" charset="0"/>
-        <a:buChar char="–"/>
-        <a:defRPr sz="2000" kern="1200">
-          <a:solidFill>
-            <a:schemeClr val="tx1"/>
-          </a:solidFill>
-          <a:latin typeface="+mn-lt"/>
-          <a:ea typeface="+mn-ea"/>
-          <a:cs typeface="+mn-cs"/>
-        </a:defRPr>
-      </a:lvl4pPr>
-      <a:lvl5pPr marL="2057400" indent="-228600" algn="l" defTabSz="914400" rtl="0" eaLnBrk="1" latinLnBrk="0" hangingPunct="1">
-        <a:spcBef>
-          <a:spcPct val="20000"/>
-        </a:spcBef>
-        <a:buFont typeface="Arial" pitchFamily="34" charset="0"/>
-        <a:buChar char="»"/>
-        <a:defRPr sz="2000" kern="1200">
-          <a:solidFill>
-            <a:schemeClr val="tx1"/>
-          </a:solidFill>
-          <a:latin typeface="+mn-lt"/>
-          <a:ea typeface="+mn-ea"/>
-          <a:cs typeface="+mn-cs"/>
-        </a:defRPr>
-      </a:lvl5pPr>
-      <a:lvl6pPr marL="2514600" indent="-228600" algn="l" defTabSz="914400" rtl="0" eaLnBrk="1" latinLnBrk="0" hangingPunct="1">
-        <a:spcBef>
-          <a:spcPct val="20000"/>
-        </a:spcBef>
+        <a:buClr>
+          <a:schemeClr val="accent1"/>
+        </a:buClr>
+        <a:buSzPct val="85000"/>
         <a:buFont typeface="Arial" pitchFamily="34" charset="0"/>
         <a:buChar char="•"/>
         <a:defRPr sz="2000" kern="1200">
@@ -20821,14 +21082,91 @@
           <a:ea typeface="+mn-ea"/>
           <a:cs typeface="+mn-cs"/>
         </a:defRPr>
-      </a:lvl6pPr>
-      <a:lvl7pPr marL="2971800" indent="-228600" algn="l" defTabSz="914400" rtl="0" eaLnBrk="1" latinLnBrk="0" hangingPunct="1">
+      </a:lvl2pPr>
+      <a:lvl3pPr marL="731520" indent="-182880" algn="l" defTabSz="914400" rtl="0" eaLnBrk="1" latinLnBrk="0" hangingPunct="1">
         <a:spcBef>
           <a:spcPct val="20000"/>
         </a:spcBef>
+        <a:buClr>
+          <a:schemeClr val="accent1"/>
+        </a:buClr>
+        <a:buSzPct val="90000"/>
         <a:buFont typeface="Arial" pitchFamily="34" charset="0"/>
         <a:buChar char="•"/>
-        <a:defRPr sz="2000" kern="1200">
+        <a:defRPr sz="1800" kern="1200">
+          <a:solidFill>
+            <a:schemeClr val="tx1"/>
+          </a:solidFill>
+          <a:latin typeface="+mn-lt"/>
+          <a:ea typeface="+mn-ea"/>
+          <a:cs typeface="+mn-cs"/>
+        </a:defRPr>
+      </a:lvl3pPr>
+      <a:lvl4pPr marL="1005840" indent="-182880" algn="l" defTabSz="914400" rtl="0" eaLnBrk="1" latinLnBrk="0" hangingPunct="1">
+        <a:spcBef>
+          <a:spcPct val="20000"/>
+        </a:spcBef>
+        <a:buClr>
+          <a:schemeClr val="accent1"/>
+        </a:buClr>
+        <a:buFont typeface="Arial" pitchFamily="34" charset="0"/>
+        <a:buChar char="•"/>
+        <a:defRPr sz="1600" kern="1200">
+          <a:solidFill>
+            <a:schemeClr val="tx1"/>
+          </a:solidFill>
+          <a:latin typeface="+mn-lt"/>
+          <a:ea typeface="+mn-ea"/>
+          <a:cs typeface="+mn-cs"/>
+        </a:defRPr>
+      </a:lvl4pPr>
+      <a:lvl5pPr marL="1188720" indent="-137160" algn="l" defTabSz="914400" rtl="0" eaLnBrk="1" latinLnBrk="0" hangingPunct="1">
+        <a:spcBef>
+          <a:spcPct val="20000"/>
+        </a:spcBef>
+        <a:buClr>
+          <a:schemeClr val="accent1"/>
+        </a:buClr>
+        <a:buSzPct val="100000"/>
+        <a:buFont typeface="Arial" pitchFamily="34" charset="0"/>
+        <a:buChar char="•"/>
+        <a:defRPr sz="1400" kern="1200" baseline="0">
+          <a:solidFill>
+            <a:schemeClr val="tx1"/>
+          </a:solidFill>
+          <a:latin typeface="+mn-lt"/>
+          <a:ea typeface="+mn-ea"/>
+          <a:cs typeface="+mn-cs"/>
+        </a:defRPr>
+      </a:lvl5pPr>
+      <a:lvl6pPr marL="1371600" indent="-182880" algn="l" defTabSz="914400" rtl="0" eaLnBrk="1" latinLnBrk="0" hangingPunct="1">
+        <a:spcBef>
+          <a:spcPct val="20000"/>
+        </a:spcBef>
+        <a:buClr>
+          <a:schemeClr val="accent1"/>
+        </a:buClr>
+        <a:buFont typeface="Arial" pitchFamily="34" charset="0"/>
+        <a:buChar char="•"/>
+        <a:defRPr sz="1300" kern="1200">
+          <a:solidFill>
+            <a:schemeClr val="tx1"/>
+          </a:solidFill>
+          <a:latin typeface="+mn-lt"/>
+          <a:ea typeface="+mn-ea"/>
+          <a:cs typeface="+mn-cs"/>
+        </a:defRPr>
+      </a:lvl6pPr>
+      <a:lvl7pPr marL="1554480" indent="-182880" algn="l" defTabSz="914400" rtl="0" eaLnBrk="1" latinLnBrk="0" hangingPunct="1">
+        <a:spcBef>
+          <a:spcPct val="20000"/>
+        </a:spcBef>
+        <a:buClr>
+          <a:schemeClr val="accent1"/>
+        </a:buClr>
+        <a:buFont typeface="Arial" pitchFamily="34" charset="0"/>
+        <a:buChar char="•"/>
+        <a:defRPr sz="1300" kern="1200">
           <a:solidFill>
             <a:schemeClr val="tx1"/>
           </a:solidFill>
@@ -20837,13 +21175,16 @@
           <a:cs typeface="+mn-cs"/>
         </a:defRPr>
       </a:lvl7pPr>
-      <a:lvl8pPr marL="3429000" indent="-228600" algn="l" defTabSz="914400" rtl="0" eaLnBrk="1" latinLnBrk="0" hangingPunct="1">
+      <a:lvl8pPr marL="1737360" indent="-182880" algn="l" defTabSz="914400" rtl="0" eaLnBrk="1" latinLnBrk="0" hangingPunct="1">
         <a:spcBef>
           <a:spcPct val="20000"/>
         </a:spcBef>
+        <a:buClr>
+          <a:schemeClr val="accent1"/>
+        </a:buClr>
         <a:buFont typeface="Arial" pitchFamily="34" charset="0"/>
         <a:buChar char="•"/>
-        <a:defRPr sz="2000" kern="1200">
+        <a:defRPr sz="1300" kern="1200">
           <a:solidFill>
             <a:schemeClr val="tx1"/>
           </a:solidFill>
@@ -20852,13 +21193,16 @@
           <a:cs typeface="+mn-cs"/>
         </a:defRPr>
       </a:lvl8pPr>
-      <a:lvl9pPr marL="3886200" indent="-228600" algn="l" defTabSz="914400" rtl="0" eaLnBrk="1" latinLnBrk="0" hangingPunct="1">
+      <a:lvl9pPr marL="1920240" indent="-182880" algn="l" defTabSz="914400" rtl="0" eaLnBrk="1" latinLnBrk="0" hangingPunct="1">
         <a:spcBef>
           <a:spcPct val="20000"/>
         </a:spcBef>
+        <a:buClr>
+          <a:schemeClr val="accent1"/>
+        </a:buClr>
         <a:buFont typeface="Arial" pitchFamily="34" charset="0"/>
         <a:buChar char="•"/>
-        <a:defRPr sz="2000" kern="1200">
+        <a:defRPr sz="1300" kern="1200">
           <a:solidFill>
             <a:schemeClr val="tx1"/>
           </a:solidFill>
@@ -20996,7 +21340,9 @@
         </p:nvSpPr>
         <p:spPr/>
         <p:txBody>
-          <a:bodyPr/>
+          <a:bodyPr>
+            <a:normAutofit/>
+          </a:bodyPr>
           <a:lstStyle/>
           <a:p>
             <a:r>
@@ -21019,16 +21365,14 @@
         </p:nvSpPr>
         <p:spPr/>
         <p:txBody>
-          <a:bodyPr/>
+          <a:bodyPr>
+            <a:normAutofit/>
+          </a:bodyPr>
           <a:lstStyle/>
           <a:p>
             <a:r>
               <a:rPr lang="en-US" dirty="0" smtClean="0"/>
-              <a:t>Oliver </a:t>
-            </a:r>
-            <a:r>
-              <a:rPr lang="en-US" dirty="0" smtClean="0"/>
-              <a:t>Yang (</a:t>
+              <a:t>Oliver Yang (</a:t>
             </a:r>
             <a:r>
               <a:rPr lang="en-US" altLang="zh-CN" dirty="0" smtClean="0"/>
@@ -21302,7 +21646,7 @@
         <p:spPr/>
         <p:txBody>
           <a:bodyPr>
-            <a:normAutofit lnSpcReduction="10000"/>
+            <a:normAutofit/>
           </a:bodyPr>
           <a:lstStyle/>
           <a:p>
@@ -21561,7 +21905,7 @@
         <p:spPr/>
         <p:txBody>
           <a:bodyPr>
-            <a:normAutofit fontScale="85000" lnSpcReduction="10000"/>
+            <a:normAutofit/>
           </a:bodyPr>
           <a:lstStyle/>
           <a:p>
@@ -22056,7 +22400,7 @@
         <p:spPr/>
         <p:txBody>
           <a:bodyPr>
-            <a:normAutofit lnSpcReduction="10000"/>
+            <a:normAutofit/>
           </a:bodyPr>
           <a:lstStyle/>
           <a:p>
@@ -22680,34 +23024,6 @@
           </a:p>
         </p:txBody>
       </p:sp>
-      <p:sp>
-        <p:nvSpPr>
-          <p:cNvPr id="4" name="Rectangle 3"/>
-          <p:cNvSpPr/>
-          <p:nvPr/>
-        </p:nvSpPr>
-        <p:spPr>
-          <a:xfrm>
-            <a:off x="4128609" y="3244334"/>
-            <a:ext cx="886781" cy="369332"/>
-          </a:xfrm>
-          <a:prstGeom prst="rect">
-            <a:avLst/>
-          </a:prstGeom>
-        </p:spPr>
-        <p:txBody>
-          <a:bodyPr wrap="none">
-            <a:spAutoFit/>
-          </a:bodyPr>
-          <a:lstStyle/>
-          <a:p>
-            <a:r>
-              <a:rPr lang="en-US" dirty="0"/>
-              <a:t>138430</a:t>
-            </a:r>
-          </a:p>
-        </p:txBody>
-      </p:sp>
     </p:spTree>
     <p:extLst>
       <p:ext uri="{BB962C8B-B14F-4D97-AF65-F5344CB8AC3E}">
@@ -22756,213 +23072,6 @@
             <a:pPr algn="l"/>
             <a:r>
               <a:rPr lang="en-US" dirty="0" smtClean="0"/>
-              <a:t>Performance Trade-off</a:t>
-            </a:r>
-            <a:endParaRPr lang="en-US" dirty="0"/>
-          </a:p>
-        </p:txBody>
-      </p:sp>
-      <p:sp>
-        <p:nvSpPr>
-          <p:cNvPr id="3" name="Content Placeholder 2"/>
-          <p:cNvSpPr>
-            <a:spLocks noGrp="1"/>
-          </p:cNvSpPr>
-          <p:nvPr>
-            <p:ph idx="1"/>
-          </p:nvPr>
-        </p:nvSpPr>
-        <p:spPr/>
-        <p:txBody>
-          <a:bodyPr>
-            <a:normAutofit fontScale="85000" lnSpcReduction="20000"/>
-          </a:bodyPr>
-          <a:lstStyle/>
-          <a:p>
-            <a:r>
-              <a:rPr lang="en-US" dirty="0" smtClean="0"/>
-              <a:t>Latency VS. Throughput</a:t>
-            </a:r>
-          </a:p>
-          <a:p>
-            <a:pPr lvl="1"/>
-            <a:r>
-              <a:rPr lang="en-US" dirty="0" smtClean="0"/>
-              <a:t>Throughput could be improved by increase latency</a:t>
-            </a:r>
-          </a:p>
-          <a:p>
-            <a:pPr lvl="2"/>
-            <a:r>
-              <a:rPr lang="en-US" dirty="0" err="1" smtClean="0"/>
-              <a:t>eg</a:t>
-            </a:r>
-            <a:r>
-              <a:rPr lang="en-US" dirty="0" smtClean="0"/>
-              <a:t>:  how many packets in one interrupts</a:t>
-            </a:r>
-          </a:p>
-          <a:p>
-            <a:pPr lvl="2"/>
-            <a:r>
-              <a:rPr lang="en-US" dirty="0" err="1" smtClean="0"/>
-              <a:t>eg</a:t>
-            </a:r>
-            <a:r>
-              <a:rPr lang="en-US" dirty="0" smtClean="0"/>
-              <a:t>: queue depth in IO stack</a:t>
-            </a:r>
-          </a:p>
-          <a:p>
-            <a:pPr lvl="1"/>
-            <a:r>
-              <a:rPr lang="en-US" dirty="0" smtClean="0"/>
-              <a:t>Signs of real latency problems</a:t>
-            </a:r>
-          </a:p>
-          <a:p>
-            <a:pPr lvl="2"/>
-            <a:r>
-              <a:rPr lang="en-US" altLang="zh-CN" dirty="0" smtClean="0"/>
-              <a:t>Latency </a:t>
-            </a:r>
-            <a:r>
-              <a:rPr lang="en-US" altLang="zh-CN" dirty="0"/>
-              <a:t>is bad, CPU is </a:t>
-            </a:r>
-            <a:r>
-              <a:rPr lang="en-US" altLang="zh-CN" dirty="0" smtClean="0"/>
-              <a:t>overloaded</a:t>
-            </a:r>
-          </a:p>
-          <a:p>
-            <a:pPr lvl="3"/>
-            <a:r>
-              <a:rPr lang="en-US" altLang="zh-CN" dirty="0" smtClean="0"/>
-              <a:t>On-CPU analysis</a:t>
-            </a:r>
-            <a:endParaRPr lang="en-US" altLang="zh-CN" dirty="0"/>
-          </a:p>
-          <a:p>
-            <a:pPr lvl="4"/>
-            <a:r>
-              <a:rPr lang="en-US" altLang="zh-CN" dirty="0"/>
-              <a:t>High CPU run time in application code?</a:t>
-            </a:r>
-          </a:p>
-          <a:p>
-            <a:pPr lvl="4"/>
-            <a:r>
-              <a:rPr lang="en-US" altLang="zh-CN" dirty="0" err="1"/>
-              <a:t>runq</a:t>
-            </a:r>
-            <a:r>
-              <a:rPr lang="en-US" altLang="zh-CN" dirty="0"/>
-              <a:t> waiting?</a:t>
-            </a:r>
-          </a:p>
-          <a:p>
-            <a:pPr lvl="4"/>
-            <a:r>
-              <a:rPr lang="en-US" altLang="zh-CN" dirty="0"/>
-              <a:t>Overhead of context switch</a:t>
-            </a:r>
-            <a:r>
-              <a:rPr lang="en-US" altLang="zh-CN" dirty="0" smtClean="0"/>
-              <a:t>?</a:t>
-            </a:r>
-            <a:endParaRPr lang="en-US" dirty="0" smtClean="0"/>
-          </a:p>
-          <a:p>
-            <a:pPr lvl="2"/>
-            <a:r>
-              <a:rPr lang="en-US" dirty="0" smtClean="0"/>
-              <a:t>Latency is bad, CPU has low utilization at same time</a:t>
-            </a:r>
-          </a:p>
-          <a:p>
-            <a:pPr lvl="3"/>
-            <a:r>
-              <a:rPr lang="en-US" altLang="zh-CN" dirty="0" smtClean="0"/>
-              <a:t>Off-CPU analysis</a:t>
-            </a:r>
-          </a:p>
-          <a:p>
-            <a:pPr lvl="4"/>
-            <a:r>
-              <a:rPr lang="en-US" altLang="zh-CN" dirty="0" smtClean="0"/>
-              <a:t>Block time issue</a:t>
-            </a:r>
-            <a:r>
-              <a:rPr lang="en-US" altLang="zh-CN" dirty="0"/>
-              <a:t>?</a:t>
-            </a:r>
-            <a:endParaRPr lang="en-US" dirty="0" smtClean="0"/>
-          </a:p>
-          <a:p>
-            <a:pPr lvl="4"/>
-            <a:r>
-              <a:rPr lang="en-US" dirty="0" smtClean="0"/>
-              <a:t>Sleep time issue?</a:t>
-            </a:r>
-          </a:p>
-          <a:p>
-            <a:pPr lvl="2"/>
-            <a:endParaRPr lang="en-US" dirty="0" smtClean="0"/>
-          </a:p>
-          <a:p>
-            <a:endParaRPr lang="en-US" dirty="0"/>
-          </a:p>
-        </p:txBody>
-      </p:sp>
-    </p:spTree>
-    <p:extLst>
-      <p:ext uri="{BB962C8B-B14F-4D97-AF65-F5344CB8AC3E}">
-        <p14:creationId xmlns:p14="http://schemas.microsoft.com/office/powerpoint/2010/main" val="3783129428"/>
-      </p:ext>
-    </p:extLst>
-  </p:cSld>
-  <p:clrMapOvr>
-    <a:masterClrMapping/>
-  </p:clrMapOvr>
-</p:sld>
-</file>
-
-<file path=ppt/slides/slide5.xml><?xml version="1.0" encoding="utf-8"?>
-<p:sld xmlns:a="http://schemas.openxmlformats.org/drawingml/2006/main" xmlns:r="http://schemas.openxmlformats.org/officeDocument/2006/relationships" xmlns:p="http://schemas.openxmlformats.org/presentationml/2006/main">
-  <p:cSld>
-    <p:spTree>
-      <p:nvGrpSpPr>
-        <p:cNvPr id="1" name=""/>
-        <p:cNvGrpSpPr/>
-        <p:nvPr/>
-      </p:nvGrpSpPr>
-      <p:grpSpPr>
-        <a:xfrm>
-          <a:off x="0" y="0"/>
-          <a:ext cx="0" cy="0"/>
-          <a:chOff x="0" y="0"/>
-          <a:chExt cx="0" cy="0"/>
-        </a:xfrm>
-      </p:grpSpPr>
-      <p:sp>
-        <p:nvSpPr>
-          <p:cNvPr id="2" name="Title 1"/>
-          <p:cNvSpPr>
-            <a:spLocks noGrp="1"/>
-          </p:cNvSpPr>
-          <p:nvPr>
-            <p:ph type="title"/>
-          </p:nvPr>
-        </p:nvSpPr>
-        <p:spPr/>
-        <p:txBody>
-          <a:bodyPr/>
-          <a:lstStyle/>
-          <a:p>
-            <a:pPr algn="l"/>
-            <a:r>
-              <a:rPr lang="en-US" dirty="0" smtClean="0"/>
               <a:t>Latency analysis challenges</a:t>
             </a:r>
             <a:endParaRPr lang="en-US" dirty="0"/>
@@ -22986,68 +23095,72 @@
           </a:bodyPr>
           <a:lstStyle/>
           <a:p>
-            <a:r>
-              <a:rPr lang="en-US" dirty="0"/>
-              <a:t>How to avoid trial-and-error overheads</a:t>
+            <a:pPr marL="57140" lvl="2" indent="-240030">
+              <a:buFont typeface="Arial"/>
+              <a:buChar char="•"/>
+            </a:pPr>
+            <a:r>
+              <a:rPr lang="en-US" altLang="zh-CN" sz="2800" dirty="0"/>
+              <a:t>Burst randomly</a:t>
             </a:r>
           </a:p>
           <a:p>
-            <a:pPr lvl="1"/>
-            <a:r>
-              <a:rPr lang="en-US" dirty="0"/>
-              <a:t>Latency root cause could be </a:t>
-            </a:r>
-            <a:r>
-              <a:rPr lang="en-US" dirty="0" smtClean="0"/>
-              <a:t>various</a:t>
+            <a:pPr marL="57140" lvl="2" indent="-240030">
+              <a:buFont typeface="Arial"/>
+              <a:buChar char="•"/>
+            </a:pPr>
+            <a:r>
+              <a:rPr lang="en-US" altLang="zh-CN" sz="2800" dirty="0"/>
+              <a:t>In a very short period</a:t>
             </a:r>
           </a:p>
           <a:p>
-            <a:r>
-              <a:rPr lang="en-US" dirty="0" smtClean="0"/>
-              <a:t>The latency is related to system call</a:t>
+            <a:pPr marL="57140" lvl="2" indent="-240030">
+              <a:buFont typeface="Arial"/>
+              <a:buChar char="•"/>
+            </a:pPr>
+            <a:r>
+              <a:rPr lang="en-US" altLang="zh-CN" sz="2800" dirty="0"/>
+              <a:t>Reported/found very late</a:t>
             </a:r>
           </a:p>
           <a:p>
-            <a:pPr lvl="1"/>
-            <a:r>
-              <a:rPr lang="en-US" dirty="0" err="1"/>
-              <a:t>e</a:t>
-            </a:r>
-            <a:r>
-              <a:rPr lang="en-US" dirty="0" err="1" smtClean="0"/>
-              <a:t>g</a:t>
-            </a:r>
-            <a:r>
-              <a:rPr lang="en-US" dirty="0" smtClean="0"/>
-              <a:t>. Async calls, complicated path needs expert</a:t>
+            <a:pPr marL="57140" lvl="2" indent="-240030">
+              <a:buFont typeface="Arial"/>
+              <a:buChar char="•"/>
+            </a:pPr>
+            <a:r>
+              <a:rPr lang="en-US" altLang="zh-CN" sz="2800" dirty="0"/>
+              <a:t>Always postmortem analysis</a:t>
             </a:r>
           </a:p>
           <a:p>
-            <a:r>
-              <a:rPr lang="en-US" dirty="0" smtClean="0"/>
-              <a:t>Need dynamic trace with fine granularity</a:t>
-            </a:r>
+            <a:pPr marL="57140" lvl="2" indent="-240030">
+              <a:buFont typeface="Arial"/>
+              <a:buChar char="•"/>
+            </a:pPr>
+            <a:r>
+              <a:rPr lang="en-US" altLang="zh-CN" sz="2800" dirty="0"/>
+              <a:t>Without enough debug </a:t>
+            </a:r>
+            <a:r>
+              <a:rPr lang="en-US" altLang="zh-CN" sz="2800" dirty="0" smtClean="0"/>
+              <a:t>data</a:t>
+            </a:r>
+            <a:endParaRPr lang="en-US" sz="2800" dirty="0" smtClean="0"/>
           </a:p>
           <a:p>
-            <a:pPr lvl="1"/>
-            <a:r>
-              <a:rPr lang="en-US" dirty="0" err="1"/>
-              <a:t>e</a:t>
-            </a:r>
-            <a:r>
-              <a:rPr lang="en-US" dirty="0" err="1" smtClean="0"/>
-              <a:t>g</a:t>
-            </a:r>
             <a:r>
               <a:rPr lang="en-US" dirty="0" smtClean="0"/>
-              <a:t>. Small issues could be hidden by global trace</a:t>
-            </a:r>
-          </a:p>
-          <a:p>
-            <a:r>
-              <a:rPr lang="en-US" dirty="0" smtClean="0"/>
-              <a:t>Bug reproduce cost is high</a:t>
+              <a:t> </a:t>
+            </a:r>
+            <a:r>
+              <a:rPr lang="en-US" sz="2800" dirty="0" smtClean="0"/>
+              <a:t>Bug </a:t>
+            </a:r>
+            <a:r>
+              <a:rPr lang="en-US" sz="2800" dirty="0" smtClean="0"/>
+              <a:t>reproduce cost is high</a:t>
             </a:r>
           </a:p>
           <a:p>
@@ -23079,7 +23192,7 @@
 </p:sld>
 </file>
 
-<file path=ppt/slides/slide6.xml><?xml version="1.0" encoding="utf-8"?>
+<file path=ppt/slides/slide5.xml><?xml version="1.0" encoding="utf-8"?>
 <p:sld xmlns:a="http://schemas.openxmlformats.org/drawingml/2006/main" xmlns:r="http://schemas.openxmlformats.org/officeDocument/2006/relationships" xmlns:p="http://schemas.openxmlformats.org/presentationml/2006/main">
   <p:cSld>
     <p:spTree>
@@ -24059,6 +24172,218 @@
 </p:sld>
 </file>
 
+<file path=ppt/slides/slide6.xml><?xml version="1.0" encoding="utf-8"?>
+<p:sld xmlns:a="http://schemas.openxmlformats.org/drawingml/2006/main" xmlns:r="http://schemas.openxmlformats.org/officeDocument/2006/relationships" xmlns:p="http://schemas.openxmlformats.org/presentationml/2006/main">
+  <p:cSld>
+    <p:spTree>
+      <p:nvGrpSpPr>
+        <p:cNvPr id="1" name=""/>
+        <p:cNvGrpSpPr/>
+        <p:nvPr/>
+      </p:nvGrpSpPr>
+      <p:grpSpPr>
+        <a:xfrm>
+          <a:off x="0" y="0"/>
+          <a:ext cx="0" cy="0"/>
+          <a:chOff x="0" y="0"/>
+          <a:chExt cx="0" cy="0"/>
+        </a:xfrm>
+      </p:grpSpPr>
+      <p:sp>
+        <p:nvSpPr>
+          <p:cNvPr id="2" name="Title 1"/>
+          <p:cNvSpPr>
+            <a:spLocks noGrp="1"/>
+          </p:cNvSpPr>
+          <p:nvPr>
+            <p:ph type="title"/>
+          </p:nvPr>
+        </p:nvSpPr>
+        <p:spPr/>
+        <p:txBody>
+          <a:bodyPr/>
+          <a:lstStyle/>
+          <a:p>
+            <a:pPr algn="l"/>
+            <a:r>
+              <a:rPr lang="en-US" dirty="0" smtClean="0"/>
+              <a:t>Performance Trade-off</a:t>
+            </a:r>
+            <a:endParaRPr lang="en-US" dirty="0"/>
+          </a:p>
+        </p:txBody>
+      </p:sp>
+      <p:sp>
+        <p:nvSpPr>
+          <p:cNvPr id="3" name="Content Placeholder 2"/>
+          <p:cNvSpPr>
+            <a:spLocks noGrp="1"/>
+          </p:cNvSpPr>
+          <p:nvPr>
+            <p:ph idx="1"/>
+          </p:nvPr>
+        </p:nvSpPr>
+        <p:spPr/>
+        <p:txBody>
+          <a:bodyPr>
+            <a:normAutofit/>
+          </a:bodyPr>
+          <a:lstStyle/>
+          <a:p>
+            <a:r>
+              <a:rPr lang="en-US" dirty="0" smtClean="0"/>
+              <a:t>Latency VS. </a:t>
+            </a:r>
+            <a:r>
+              <a:rPr lang="en-US" dirty="0" smtClean="0"/>
+              <a:t>Throughput/Utilization</a:t>
+            </a:r>
+            <a:endParaRPr lang="en-US" dirty="0" smtClean="0"/>
+          </a:p>
+          <a:p>
+            <a:pPr lvl="1"/>
+            <a:r>
+              <a:rPr lang="en-US" dirty="0" smtClean="0"/>
+              <a:t>Throughput could be improved by increase latency</a:t>
+            </a:r>
+          </a:p>
+          <a:p>
+            <a:pPr lvl="2"/>
+            <a:r>
+              <a:rPr lang="en-US" dirty="0" err="1" smtClean="0"/>
+              <a:t>eg</a:t>
+            </a:r>
+            <a:r>
+              <a:rPr lang="en-US" dirty="0" smtClean="0"/>
+              <a:t>:  how many packets in one interrupts</a:t>
+            </a:r>
+          </a:p>
+          <a:p>
+            <a:pPr lvl="2"/>
+            <a:r>
+              <a:rPr lang="en-US" dirty="0" err="1" smtClean="0"/>
+              <a:t>eg</a:t>
+            </a:r>
+            <a:r>
+              <a:rPr lang="en-US" dirty="0" smtClean="0"/>
+              <a:t>: queue depth in IO stack</a:t>
+            </a:r>
+          </a:p>
+          <a:p>
+            <a:pPr lvl="1"/>
+            <a:r>
+              <a:rPr lang="en-US" dirty="0" smtClean="0"/>
+              <a:t>Signs of real latency problems</a:t>
+            </a:r>
+          </a:p>
+          <a:p>
+            <a:pPr lvl="2"/>
+            <a:r>
+              <a:rPr lang="en-US" altLang="zh-CN" dirty="0" smtClean="0"/>
+              <a:t>Latency </a:t>
+            </a:r>
+            <a:r>
+              <a:rPr lang="en-US" altLang="zh-CN" dirty="0"/>
+              <a:t>is bad, CPU is </a:t>
+            </a:r>
+            <a:r>
+              <a:rPr lang="en-US" altLang="zh-CN" dirty="0" smtClean="0"/>
+              <a:t>overloaded</a:t>
+            </a:r>
+          </a:p>
+          <a:p>
+            <a:pPr lvl="3"/>
+            <a:r>
+              <a:rPr lang="en-US" altLang="zh-CN" dirty="0" smtClean="0"/>
+              <a:t>On-CPU analysis</a:t>
+            </a:r>
+            <a:endParaRPr lang="en-US" altLang="zh-CN" dirty="0"/>
+          </a:p>
+          <a:p>
+            <a:pPr lvl="4"/>
+            <a:r>
+              <a:rPr lang="en-US" altLang="zh-CN" dirty="0"/>
+              <a:t>High CPU run time in application code?</a:t>
+            </a:r>
+          </a:p>
+          <a:p>
+            <a:pPr lvl="4"/>
+            <a:r>
+              <a:rPr lang="en-US" altLang="zh-CN" dirty="0" err="1"/>
+              <a:t>runq</a:t>
+            </a:r>
+            <a:r>
+              <a:rPr lang="en-US" altLang="zh-CN" dirty="0"/>
+              <a:t> waiting?</a:t>
+            </a:r>
+          </a:p>
+          <a:p>
+            <a:pPr lvl="4"/>
+            <a:r>
+              <a:rPr lang="en-US" altLang="zh-CN" dirty="0"/>
+              <a:t>Overhead of context switch</a:t>
+            </a:r>
+            <a:r>
+              <a:rPr lang="en-US" altLang="zh-CN" dirty="0" smtClean="0"/>
+              <a:t>?</a:t>
+            </a:r>
+            <a:endParaRPr lang="en-US" dirty="0" smtClean="0"/>
+          </a:p>
+          <a:p>
+            <a:pPr lvl="2"/>
+            <a:r>
+              <a:rPr lang="en-US" dirty="0" smtClean="0"/>
+              <a:t>Latency is bad, CPU has low utilization at same time</a:t>
+            </a:r>
+          </a:p>
+          <a:p>
+            <a:pPr lvl="3"/>
+            <a:r>
+              <a:rPr lang="en-US" altLang="zh-CN" dirty="0" smtClean="0"/>
+              <a:t>Off-CPU analysis</a:t>
+            </a:r>
+          </a:p>
+          <a:p>
+            <a:pPr lvl="4"/>
+            <a:r>
+              <a:rPr lang="en-US" altLang="zh-CN" dirty="0" smtClean="0"/>
+              <a:t>Block time issue</a:t>
+            </a:r>
+            <a:r>
+              <a:rPr lang="en-US" altLang="zh-CN" dirty="0"/>
+              <a:t>?</a:t>
+            </a:r>
+            <a:endParaRPr lang="en-US" dirty="0" smtClean="0"/>
+          </a:p>
+          <a:p>
+            <a:pPr lvl="4"/>
+            <a:r>
+              <a:rPr lang="en-US" dirty="0" smtClean="0"/>
+              <a:t>Sleep time issue?</a:t>
+            </a:r>
+          </a:p>
+          <a:p>
+            <a:pPr lvl="2"/>
+            <a:endParaRPr lang="en-US" dirty="0" smtClean="0"/>
+          </a:p>
+          <a:p>
+            <a:endParaRPr lang="en-US" dirty="0"/>
+          </a:p>
+        </p:txBody>
+      </p:sp>
+    </p:spTree>
+    <p:extLst>
+      <p:ext uri="{BB962C8B-B14F-4D97-AF65-F5344CB8AC3E}">
+        <p14:creationId xmlns:p14="http://schemas.microsoft.com/office/powerpoint/2010/main" val="3783129428"/>
+      </p:ext>
+    </p:extLst>
+  </p:cSld>
+  <p:clrMapOvr>
+    <a:masterClrMapping/>
+  </p:clrMapOvr>
+</p:sld>
+</file>
+
 <file path=ppt/slides/slide7.xml><?xml version="1.0" encoding="utf-8"?>
 <p:sld xmlns:a="http://schemas.openxmlformats.org/drawingml/2006/main" xmlns:r="http://schemas.openxmlformats.org/officeDocument/2006/relationships" xmlns:p="http://schemas.openxmlformats.org/presentationml/2006/main">
   <p:cSld>
@@ -24134,7 +24459,7 @@
         <p:spPr>
           <a:xfrm>
             <a:off x="391886" y="1371600"/>
-            <a:ext cx="8294914" cy="461665"/>
+            <a:ext cx="8294914" cy="400110"/>
           </a:xfrm>
           <a:prstGeom prst="rect">
             <a:avLst/>
@@ -24152,10 +24477,10 @@
               <a:buChar char="•"/>
             </a:pPr>
             <a:r>
-              <a:rPr lang="en-US" sz="2400" dirty="0" smtClean="0"/>
+              <a:rPr lang="en-US" sz="2000" dirty="0" smtClean="0"/>
               <a:t>RUN TIME = ON CPU TIME + ON RUNQ TIME + SLEEP TIME</a:t>
             </a:r>
-            <a:endParaRPr lang="en-US" sz="2400" dirty="0"/>
+            <a:endParaRPr lang="en-US" sz="2000" dirty="0"/>
           </a:p>
         </p:txBody>
       </p:sp>
@@ -24331,38 +24656,38 @@
 </file>
 
 <file path=ppt/theme/theme1.xml><?xml version="1.0" encoding="utf-8"?>
-<a:theme xmlns:a="http://schemas.openxmlformats.org/drawingml/2006/main" name="Office Theme">
+<a:theme xmlns:a="http://schemas.openxmlformats.org/drawingml/2006/main" name="清晰">
   <a:themeElements>
-    <a:clrScheme name="Office">
+    <a:clrScheme name="清晰">
       <a:dk1>
-        <a:sysClr val="windowText" lastClr="000000"/>
+        <a:srgbClr val="292934"/>
       </a:dk1>
       <a:lt1>
-        <a:sysClr val="window" lastClr="FFFFFF"/>
+        <a:srgbClr val="FFFFFF"/>
       </a:lt1>
       <a:dk2>
-        <a:srgbClr val="1F497D"/>
+        <a:srgbClr val="D2533C"/>
       </a:dk2>
       <a:lt2>
-        <a:srgbClr val="EEECE1"/>
+        <a:srgbClr val="F3F2DC"/>
       </a:lt2>
       <a:accent1>
-        <a:srgbClr val="4F81BD"/>
+        <a:srgbClr val="93A299"/>
       </a:accent1>
       <a:accent2>
-        <a:srgbClr val="C0504D"/>
+        <a:srgbClr val="AD8F67"/>
       </a:accent2>
       <a:accent3>
-        <a:srgbClr val="9BBB59"/>
+        <a:srgbClr val="726056"/>
       </a:accent3>
       <a:accent4>
-        <a:srgbClr val="8064A2"/>
+        <a:srgbClr val="4C5A6A"/>
       </a:accent4>
       <a:accent5>
-        <a:srgbClr val="4BACC6"/>
+        <a:srgbClr val="808DA0"/>
       </a:accent5>
       <a:accent6>
-        <a:srgbClr val="F79646"/>
+        <a:srgbClr val="79463D"/>
       </a:accent6>
       <a:hlink>
         <a:srgbClr val="0000FF"/>
@@ -24371,49 +24696,15 @@
         <a:srgbClr val="800080"/>
       </a:folHlink>
     </a:clrScheme>
-    <a:fontScheme name="Office">
+    <a:fontScheme name="Office 经典 2">
       <a:majorFont>
-        <a:latin typeface="Calibri"/>
+        <a:latin typeface="Arial"/>
         <a:ea typeface=""/>
         <a:cs typeface=""/>
         <a:font script="Jpan" typeface="ＭＳ Ｐゴシック"/>
-        <a:font script="Hang" typeface="맑은 고딕"/>
-        <a:font script="Hans" typeface="宋体"/>
-        <a:font script="Hant" typeface="新細明體"/>
-        <a:font script="Arab" typeface="Times New Roman"/>
-        <a:font script="Hebr" typeface="Times New Roman"/>
-        <a:font script="Thai" typeface="Angsana New"/>
-        <a:font script="Ethi" typeface="Nyala"/>
-        <a:font script="Beng" typeface="Vrinda"/>
-        <a:font script="Gujr" typeface="Shruti"/>
-        <a:font script="Khmr" typeface="MoolBoran"/>
-        <a:font script="Knda" typeface="Tunga"/>
-        <a:font script="Guru" typeface="Raavi"/>
-        <a:font script="Cans" typeface="Euphemia"/>
-        <a:font script="Cher" typeface="Plantagenet Cherokee"/>
-        <a:font script="Yiii" typeface="Microsoft Yi Baiti"/>
-        <a:font script="Tibt" typeface="Microsoft Himalaya"/>
-        <a:font script="Thaa" typeface="MV Boli"/>
-        <a:font script="Deva" typeface="Mangal"/>
-        <a:font script="Telu" typeface="Gautami"/>
-        <a:font script="Taml" typeface="Latha"/>
-        <a:font script="Syrc" typeface="Estrangelo Edessa"/>
-        <a:font script="Orya" typeface="Kalinga"/>
-        <a:font script="Mlym" typeface="Kartika"/>
-        <a:font script="Laoo" typeface="DokChampa"/>
-        <a:font script="Sinh" typeface="Iskoola Pota"/>
-        <a:font script="Mong" typeface="Mongolian Baiti"/>
-        <a:font script="Viet" typeface="Times New Roman"/>
-        <a:font script="Uigh" typeface="Microsoft Uighur"/>
-      </a:majorFont>
-      <a:minorFont>
-        <a:latin typeface="Calibri"/>
-        <a:ea typeface=""/>
-        <a:cs typeface=""/>
-        <a:font script="Jpan" typeface="ＭＳ Ｐゴシック"/>
-        <a:font script="Hang" typeface="맑은 고딕"/>
-        <a:font script="Hans" typeface="宋体"/>
-        <a:font script="Hant" typeface="新細明體"/>
+        <a:font script="Hang" typeface="돋움"/>
+        <a:font script="Hans" typeface="华文新魏"/>
+        <a:font script="Hant" typeface="微軟正黑體"/>
         <a:font script="Arab" typeface="Arial"/>
         <a:font script="Hebr" typeface="Arial"/>
         <a:font script="Thai" typeface="Cordia New"/>
@@ -24439,9 +24730,45 @@
         <a:font script="Mong" typeface="Mongolian Baiti"/>
         <a:font script="Viet" typeface="Arial"/>
         <a:font script="Uigh" typeface="Microsoft Uighur"/>
+        <a:font script="Geor" typeface="Sylfaen"/>
+      </a:majorFont>
+      <a:minorFont>
+        <a:latin typeface="Arial"/>
+        <a:ea typeface=""/>
+        <a:cs typeface=""/>
+        <a:font script="Jpan" typeface="ＭＳ Ｐゴシック"/>
+        <a:font script="Hang" typeface="돋움"/>
+        <a:font script="Hans" typeface="华文新魏"/>
+        <a:font script="Hant" typeface="微軟正黑體"/>
+        <a:font script="Arab" typeface="Arial"/>
+        <a:font script="Hebr" typeface="Arial"/>
+        <a:font script="Thai" typeface="Cordia New"/>
+        <a:font script="Ethi" typeface="Nyala"/>
+        <a:font script="Beng" typeface="Vrinda"/>
+        <a:font script="Gujr" typeface="Shruti"/>
+        <a:font script="Khmr" typeface="DaunPenh"/>
+        <a:font script="Knda" typeface="Tunga"/>
+        <a:font script="Guru" typeface="Raavi"/>
+        <a:font script="Cans" typeface="Euphemia"/>
+        <a:font script="Cher" typeface="Plantagenet Cherokee"/>
+        <a:font script="Yiii" typeface="Microsoft Yi Baiti"/>
+        <a:font script="Tibt" typeface="Microsoft Himalaya"/>
+        <a:font script="Thaa" typeface="MV Boli"/>
+        <a:font script="Deva" typeface="Mangal"/>
+        <a:font script="Telu" typeface="Gautami"/>
+        <a:font script="Taml" typeface="Latha"/>
+        <a:font script="Syrc" typeface="Estrangelo Edessa"/>
+        <a:font script="Orya" typeface="Kalinga"/>
+        <a:font script="Mlym" typeface="Kartika"/>
+        <a:font script="Laoo" typeface="DokChampa"/>
+        <a:font script="Sinh" typeface="Iskoola Pota"/>
+        <a:font script="Mong" typeface="Mongolian Baiti"/>
+        <a:font script="Viet" typeface="Arial"/>
+        <a:font script="Uigh" typeface="Microsoft Uighur"/>
+        <a:font script="Geor" typeface="Sylfaen"/>
       </a:minorFont>
     </a:fontScheme>
-    <a:fmtScheme name="Office">
+    <a:fmtScheme name="清晰">
       <a:fillStyleLst>
         <a:solidFill>
           <a:schemeClr val="phClr"/>
@@ -24451,65 +24778,75 @@
             <a:gs pos="0">
               <a:schemeClr val="phClr">
                 <a:tint val="50000"/>
-                <a:satMod val="300000"/>
+                <a:shade val="86000"/>
+                <a:satMod val="140000"/>
               </a:schemeClr>
             </a:gs>
-            <a:gs pos="35000">
+            <a:gs pos="45000">
               <a:schemeClr val="phClr">
-                <a:tint val="37000"/>
-                <a:satMod val="300000"/>
+                <a:tint val="48000"/>
+                <a:satMod val="150000"/>
               </a:schemeClr>
             </a:gs>
             <a:gs pos="100000">
               <a:schemeClr val="phClr">
-                <a:tint val="15000"/>
-                <a:satMod val="350000"/>
+                <a:tint val="28000"/>
+                <a:satMod val="160000"/>
               </a:schemeClr>
             </a:gs>
           </a:gsLst>
-          <a:lin ang="16200000" scaled="1"/>
+          <a:path path="circle">
+            <a:fillToRect l="100000" t="100000" r="100000" b="100000"/>
+          </a:path>
         </a:gradFill>
         <a:gradFill rotWithShape="1">
           <a:gsLst>
             <a:gs pos="0">
               <a:schemeClr val="phClr">
-                <a:shade val="51000"/>
-                <a:satMod val="130000"/>
+                <a:shade val="70000"/>
+                <a:satMod val="150000"/>
               </a:schemeClr>
             </a:gs>
-            <a:gs pos="80000">
+            <a:gs pos="34000">
               <a:schemeClr val="phClr">
-                <a:shade val="93000"/>
-                <a:satMod val="130000"/>
+                <a:shade val="70000"/>
+                <a:satMod val="140000"/>
+              </a:schemeClr>
+            </a:gs>
+            <a:gs pos="70000">
+              <a:schemeClr val="phClr">
+                <a:tint val="100000"/>
+                <a:shade val="90000"/>
+                <a:satMod val="140000"/>
               </a:schemeClr>
             </a:gs>
             <a:gs pos="100000">
               <a:schemeClr val="phClr">
-                <a:shade val="94000"/>
-                <a:satMod val="135000"/>
+                <a:tint val="100000"/>
+                <a:shade val="100000"/>
+                <a:satMod val="100000"/>
               </a:schemeClr>
             </a:gs>
           </a:gsLst>
-          <a:lin ang="16200000" scaled="0"/>
+          <a:path path="circle">
+            <a:fillToRect l="100000" t="100000" r="100000" b="100000"/>
+          </a:path>
         </a:gradFill>
       </a:fillStyleLst>
       <a:lnStyleLst>
         <a:ln w="9525" cap="flat" cmpd="sng" algn="ctr">
           <a:solidFill>
-            <a:schemeClr val="phClr">
-              <a:shade val="95000"/>
-              <a:satMod val="105000"/>
-            </a:schemeClr>
+            <a:schemeClr val="phClr"/>
           </a:solidFill>
           <a:prstDash val="solid"/>
         </a:ln>
-        <a:ln w="25400" cap="flat" cmpd="sng" algn="ctr">
+        <a:ln w="26425" cap="flat" cmpd="sng" algn="ctr">
           <a:solidFill>
             <a:schemeClr val="phClr"/>
           </a:solidFill>
           <a:prstDash val="solid"/>
         </a:ln>
-        <a:ln w="38100" cap="flat" cmpd="sng" algn="ctr">
+        <a:ln w="44450" cap="flat" cmpd="sng" algn="ctr">
           <a:solidFill>
             <a:schemeClr val="phClr"/>
           </a:solidFill>
@@ -24518,28 +24855,22 @@
       </a:lnStyleLst>
       <a:effectStyleLst>
         <a:effectStyle>
+          <a:effectLst/>
+        </a:effectStyle>
+        <a:effectStyle>
           <a:effectLst>
-            <a:outerShdw blurRad="40000" dist="20000" dir="5400000" rotWithShape="0">
+            <a:outerShdw blurRad="38100" dist="25400" dir="2700000" algn="br" rotWithShape="0">
               <a:srgbClr val="000000">
-                <a:alpha val="38000"/>
+                <a:alpha val="60000"/>
               </a:srgbClr>
             </a:outerShdw>
           </a:effectLst>
         </a:effectStyle>
         <a:effectStyle>
           <a:effectLst>
-            <a:outerShdw blurRad="40000" dist="23000" dir="5400000" rotWithShape="0">
+            <a:outerShdw blurRad="38100" dist="25400" dir="2700000" algn="br" rotWithShape="0">
               <a:srgbClr val="000000">
-                <a:alpha val="35000"/>
-              </a:srgbClr>
-            </a:outerShdw>
-          </a:effectLst>
-        </a:effectStyle>
-        <a:effectStyle>
-          <a:effectLst>
-            <a:outerShdw blurRad="40000" dist="23000" dir="5400000" rotWithShape="0">
-              <a:srgbClr val="000000">
-                <a:alpha val="35000"/>
+                <a:alpha val="60000"/>
               </a:srgbClr>
             </a:outerShdw>
           </a:effectLst>
@@ -24547,12 +24878,18 @@
             <a:camera prst="orthographicFront">
               <a:rot lat="0" lon="0" rev="0"/>
             </a:camera>
-            <a:lightRig rig="threePt" dir="t">
-              <a:rot lat="0" lon="0" rev="1200000"/>
+            <a:lightRig rig="balanced" dir="t">
+              <a:rot lat="0" lon="0" rev="5100000"/>
             </a:lightRig>
           </a:scene3d>
-          <a:sp3d>
-            <a:bevelT w="63500" h="25400"/>
+          <a:sp3d contourW="6350">
+            <a:bevelT w="29210" h="12700"/>
+            <a:contourClr>
+              <a:schemeClr val="phClr">
+                <a:shade val="30000"/>
+                <a:satMod val="130000"/>
+              </a:schemeClr>
+            </a:contourClr>
           </a:sp3d>
         </a:effectStyle>
       </a:effectStyleLst>
@@ -24564,47 +24901,40 @@
           <a:gsLst>
             <a:gs pos="0">
               <a:schemeClr val="phClr">
-                <a:tint val="40000"/>
-                <a:satMod val="350000"/>
+                <a:tint val="85000"/>
+                <a:satMod val="180000"/>
               </a:schemeClr>
             </a:gs>
             <a:gs pos="40000">
               <a:schemeClr val="phClr">
-                <a:tint val="45000"/>
-                <a:shade val="99000"/>
-                <a:satMod val="350000"/>
+                <a:tint val="95000"/>
+                <a:shade val="85000"/>
+                <a:satMod val="150000"/>
               </a:schemeClr>
             </a:gs>
             <a:gs pos="100000">
               <a:schemeClr val="phClr">
-                <a:shade val="20000"/>
-                <a:satMod val="255000"/>
-              </a:schemeClr>
-            </a:gs>
-          </a:gsLst>
-          <a:path path="circle">
-            <a:fillToRect l="50000" t="-80000" r="50000" b="180000"/>
-          </a:path>
-        </a:gradFill>
-        <a:gradFill rotWithShape="1">
-          <a:gsLst>
-            <a:gs pos="0">
-              <a:schemeClr val="phClr">
-                <a:tint val="80000"/>
-                <a:satMod val="300000"/>
-              </a:schemeClr>
-            </a:gs>
-            <a:gs pos="100000">
-              <a:schemeClr val="phClr">
-                <a:shade val="30000"/>
+                <a:shade val="45000"/>
                 <a:satMod val="200000"/>
               </a:schemeClr>
             </a:gs>
           </a:gsLst>
-          <a:path path="circle">
-            <a:fillToRect l="50000" t="50000" r="50000" b="50000"/>
-          </a:path>
+          <a:lin ang="5400000" scaled="0"/>
         </a:gradFill>
+        <a:blipFill rotWithShape="1">
+          <a:blip xmlns:r="http://schemas.openxmlformats.org/officeDocument/2006/relationships" r:embed="rId1">
+            <a:duotone>
+              <a:schemeClr val="phClr">
+                <a:shade val="55000"/>
+              </a:schemeClr>
+              <a:schemeClr val="phClr">
+                <a:tint val="97000"/>
+                <a:satMod val="95000"/>
+              </a:schemeClr>
+            </a:duotone>
+          </a:blip>
+          <a:tile tx="0" ty="0" sx="70000" sy="70000" flip="none" algn="tl"/>
+        </a:blipFill>
       </a:bgFillStyleLst>
     </a:fmtScheme>
   </a:themeElements>

</xml_diff>